<commit_message>
Updating Day 33 Powerpoint
</commit_message>
<xml_diff>
--- a/powerpoints/Day_33.pptx
+++ b/powerpoints/Day_33.pptx
@@ -7,12 +7,21 @@
   <p:sldIdLst>
     <p:sldId id="256" r:id="rId2"/>
     <p:sldId id="257" r:id="rId3"/>
-    <p:sldId id="258" r:id="rId4"/>
-    <p:sldId id="259" r:id="rId5"/>
-    <p:sldId id="262" r:id="rId6"/>
-    <p:sldId id="260" r:id="rId7"/>
-    <p:sldId id="261" r:id="rId8"/>
-    <p:sldId id="264" r:id="rId9"/>
+    <p:sldId id="319" r:id="rId4"/>
+    <p:sldId id="320" r:id="rId5"/>
+    <p:sldId id="321" r:id="rId6"/>
+    <p:sldId id="327" r:id="rId7"/>
+    <p:sldId id="323" r:id="rId8"/>
+    <p:sldId id="322" r:id="rId9"/>
+    <p:sldId id="328" r:id="rId10"/>
+    <p:sldId id="329" r:id="rId11"/>
+    <p:sldId id="330" r:id="rId12"/>
+    <p:sldId id="325" r:id="rId13"/>
+    <p:sldId id="326" r:id="rId14"/>
+    <p:sldId id="262" r:id="rId15"/>
+    <p:sldId id="260" r:id="rId16"/>
+    <p:sldId id="261" r:id="rId17"/>
+    <p:sldId id="264" r:id="rId18"/>
   </p:sldIdLst>
   <p:sldSz cx="9144000" cy="6858000" type="screen4x3"/>
   <p:notesSz cx="7010400" cy="9296400"/>
@@ -36523,7 +36532,7 @@
 </p:sld>
 </file>
 
-<file path=ppt/slides/slide2.xml><?xml version="1.0" encoding="utf-8"?>
+<file path=ppt/slides/slide10.xml><?xml version="1.0" encoding="utf-8"?>
 <p:sld xmlns:a="http://schemas.openxmlformats.org/drawingml/2006/main" xmlns:r="http://schemas.openxmlformats.org/officeDocument/2006/relationships" xmlns:p="http://schemas.openxmlformats.org/presentationml/2006/main">
   <p:cSld>
     <p:spTree>
@@ -36542,13 +36551,7 @@
       </p:grpSpPr>
       <p:sp>
         <p:nvSpPr>
-          <p:cNvPr id="2" name="Title 1">
-            <a:extLst>
-              <a:ext uri="{FF2B5EF4-FFF2-40B4-BE49-F238E27FC236}">
-                <a16:creationId xmlns:a16="http://schemas.microsoft.com/office/drawing/2014/main" id="{87D50B27-A8E9-4330-A597-820DC79F05A9}"/>
-              </a:ext>
-            </a:extLst>
-          </p:cNvPr>
+          <p:cNvPr id="2" name="Title 1"/>
           <p:cNvSpPr>
             <a:spLocks noGrp="1"/>
           </p:cNvSpPr>
@@ -36563,116 +36566,14 @@
           <a:p>
             <a:r>
               <a:rPr lang="en-US" dirty="0"/>
-              <a:t>Servlet Container</a:t>
+              <a:t>Servlet Mapping</a:t>
             </a:r>
           </a:p>
         </p:txBody>
       </p:sp>
       <p:sp>
         <p:nvSpPr>
-          <p:cNvPr id="3" name="Content Placeholder 2">
-            <a:extLst>
-              <a:ext uri="{FF2B5EF4-FFF2-40B4-BE49-F238E27FC236}">
-                <a16:creationId xmlns:a16="http://schemas.microsoft.com/office/drawing/2014/main" id="{3B9D3D13-FCBE-462B-AFDC-73C7DD698A6D}"/>
-              </a:ext>
-            </a:extLst>
-          </p:cNvPr>
-          <p:cNvSpPr>
-            <a:spLocks noGrp="1"/>
-          </p:cNvSpPr>
-          <p:nvPr>
-            <p:ph idx="1"/>
-          </p:nvPr>
-        </p:nvSpPr>
-        <p:spPr/>
-        <p:txBody>
-          <a:bodyPr/>
-          <a:lstStyle/>
-          <a:p>
-            <a:r>
-              <a:rPr lang="en-US" dirty="0"/>
-              <a:t>A </a:t>
-            </a:r>
-            <a:r>
-              <a:rPr lang="en-US" dirty="0">
-                <a:solidFill>
-                  <a:schemeClr val="accent1"/>
-                </a:solidFill>
-              </a:rPr>
-              <a:t>servlet container </a:t>
-            </a:r>
-            <a:r>
-              <a:rPr lang="en-US" dirty="0"/>
-              <a:t>manages the </a:t>
-            </a:r>
-            <a:r>
-              <a:rPr lang="en-US" dirty="0">
-                <a:solidFill>
-                  <a:schemeClr val="accent1"/>
-                </a:solidFill>
-              </a:rPr>
-              <a:t>life cycle </a:t>
-            </a:r>
-            <a:r>
-              <a:rPr lang="en-US" dirty="0"/>
-              <a:t>of a servlet. </a:t>
-            </a:r>
-          </a:p>
-          <a:p>
-            <a:r>
-              <a:rPr lang="en-US" dirty="0"/>
-              <a:t>Servlet is an </a:t>
-            </a:r>
-            <a:r>
-              <a:rPr lang="en-US" dirty="0">
-                <a:solidFill>
-                  <a:schemeClr val="accent1"/>
-                </a:solidFill>
-              </a:rPr>
-              <a:t>interface</a:t>
-            </a:r>
-            <a:r>
-              <a:rPr lang="en-US" dirty="0"/>
-              <a:t> defined in </a:t>
-            </a:r>
-            <a:r>
-              <a:rPr lang="en-US" dirty="0" err="1">
-                <a:solidFill>
-                  <a:schemeClr val="accent1"/>
-                </a:solidFill>
-              </a:rPr>
-              <a:t>javax.servlet</a:t>
-            </a:r>
-            <a:r>
-              <a:rPr lang="en-US" dirty="0">
-                <a:solidFill>
-                  <a:schemeClr val="accent1"/>
-                </a:solidFill>
-              </a:rPr>
-              <a:t> </a:t>
-            </a:r>
-            <a:r>
-              <a:rPr lang="en-US" dirty="0"/>
-              <a:t>package. </a:t>
-            </a:r>
-          </a:p>
-          <a:p>
-            <a:r>
-              <a:rPr lang="en-US" dirty="0"/>
-              <a:t>A servlet container uses the Servlet interface to understand a specific Servlet object and manage it.</a:t>
-            </a:r>
-          </a:p>
-        </p:txBody>
-      </p:sp>
-      <p:sp>
-        <p:nvSpPr>
-          <p:cNvPr id="4" name="Slide Number Placeholder 3">
-            <a:extLst>
-              <a:ext uri="{FF2B5EF4-FFF2-40B4-BE49-F238E27FC236}">
-                <a16:creationId xmlns:a16="http://schemas.microsoft.com/office/drawing/2014/main" id="{00B1C49B-93C2-40C7-8EC5-BD789F40F65A}"/>
-              </a:ext>
-            </a:extLst>
-          </p:cNvPr>
+          <p:cNvPr id="4" name="Slide Number Placeholder 3"/>
           <p:cNvSpPr>
             <a:spLocks noGrp="1"/>
           </p:cNvSpPr>
@@ -36688,16 +36589,846 @@
             <a:fld id="{F6728BC2-ACA3-447C-A909-F3F49211C066}" type="slidenum">
               <a:rPr lang="en-US" smtClean="0"/>
               <a:pPr/>
-              <a:t>1</a:t>
+              <a:t>9</a:t>
             </a:fld>
             <a:endParaRPr lang="en-US" dirty="0"/>
+          </a:p>
+        </p:txBody>
+      </p:sp>
+      <p:sp>
+        <p:nvSpPr>
+          <p:cNvPr id="8" name="Content Placeholder 2">
+            <a:extLst>
+              <a:ext uri="{FF2B5EF4-FFF2-40B4-BE49-F238E27FC236}">
+                <a16:creationId xmlns:a16="http://schemas.microsoft.com/office/drawing/2014/main" id="{D8001D8B-394A-4B27-AFF3-9042F05DA158}"/>
+              </a:ext>
+            </a:extLst>
+          </p:cNvPr>
+          <p:cNvSpPr txBox="1">
+            <a:spLocks/>
+          </p:cNvSpPr>
+          <p:nvPr/>
+        </p:nvSpPr>
+        <p:spPr>
+          <a:xfrm>
+            <a:off x="640579" y="1338469"/>
+            <a:ext cx="7862842" cy="5168049"/>
+          </a:xfrm>
+          <a:prstGeom prst="rect">
+            <a:avLst/>
+          </a:prstGeom>
+          <a:noFill/>
+          <a:ln>
+            <a:noFill/>
+          </a:ln>
+        </p:spPr>
+        <p:txBody>
+          <a:bodyPr spcFirstLastPara="1" wrap="square" lIns="91425" tIns="45700" rIns="91425" bIns="45700" anchor="t" anchorCtr="0">
+            <a:normAutofit/>
+          </a:bodyPr>
+          <a:lstStyle>
+            <a:defPPr marR="0" lvl="0" algn="l" rtl="0">
+              <a:lnSpc>
+                <a:spcPct val="100000"/>
+              </a:lnSpc>
+              <a:spcBef>
+                <a:spcPts val="0"/>
+              </a:spcBef>
+              <a:spcAft>
+                <a:spcPts val="0"/>
+              </a:spcAft>
+            </a:defPPr>
+            <a:lvl1pPr marL="457200" marR="0" lvl="0" indent="-406400" algn="l" rtl="0">
+              <a:lnSpc>
+                <a:spcPct val="100000"/>
+              </a:lnSpc>
+              <a:spcBef>
+                <a:spcPts val="560"/>
+              </a:spcBef>
+              <a:spcAft>
+                <a:spcPts val="0"/>
+              </a:spcAft>
+              <a:buClr>
+                <a:schemeClr val="accent1"/>
+              </a:buClr>
+              <a:buSzPts val="2800"/>
+              <a:buFont typeface="Arial"/>
+              <a:buChar char="•"/>
+              <a:defRPr sz="2800" b="0" i="0" u="none" strike="noStrike" cap="none">
+                <a:solidFill>
+                  <a:schemeClr val="dk2"/>
+                </a:solidFill>
+                <a:latin typeface="Arial"/>
+                <a:ea typeface="Arial"/>
+                <a:cs typeface="Arial"/>
+                <a:sym typeface="Arial"/>
+              </a:defRPr>
+            </a:lvl1pPr>
+            <a:lvl2pPr marL="914400" marR="0" lvl="1" indent="-381000" algn="l" rtl="0">
+              <a:lnSpc>
+                <a:spcPct val="100000"/>
+              </a:lnSpc>
+              <a:spcBef>
+                <a:spcPts val="480"/>
+              </a:spcBef>
+              <a:spcAft>
+                <a:spcPts val="0"/>
+              </a:spcAft>
+              <a:buClr>
+                <a:schemeClr val="accent1"/>
+              </a:buClr>
+              <a:buSzPts val="2400"/>
+              <a:buFont typeface="Arial"/>
+              <a:buChar char="–"/>
+              <a:defRPr sz="2400" b="0" i="0" u="none" strike="noStrike" cap="none">
+                <a:solidFill>
+                  <a:schemeClr val="dk2"/>
+                </a:solidFill>
+                <a:latin typeface="Arial"/>
+                <a:ea typeface="Arial"/>
+                <a:cs typeface="Arial"/>
+                <a:sym typeface="Arial"/>
+              </a:defRPr>
+            </a:lvl2pPr>
+            <a:lvl3pPr marL="1371600" marR="0" lvl="2" indent="-355600" algn="l" rtl="0">
+              <a:lnSpc>
+                <a:spcPct val="100000"/>
+              </a:lnSpc>
+              <a:spcBef>
+                <a:spcPts val="400"/>
+              </a:spcBef>
+              <a:spcAft>
+                <a:spcPts val="0"/>
+              </a:spcAft>
+              <a:buClr>
+                <a:schemeClr val="accent1"/>
+              </a:buClr>
+              <a:buSzPts val="2000"/>
+              <a:buFont typeface="Arial"/>
+              <a:buChar char="•"/>
+              <a:defRPr sz="2000" b="0" i="0" u="none" strike="noStrike" cap="none">
+                <a:solidFill>
+                  <a:schemeClr val="dk2"/>
+                </a:solidFill>
+                <a:latin typeface="Arial"/>
+                <a:ea typeface="Arial"/>
+                <a:cs typeface="Arial"/>
+                <a:sym typeface="Arial"/>
+              </a:defRPr>
+            </a:lvl3pPr>
+            <a:lvl4pPr marL="1828800" marR="0" lvl="3" indent="-342900" algn="l" rtl="0">
+              <a:lnSpc>
+                <a:spcPct val="100000"/>
+              </a:lnSpc>
+              <a:spcBef>
+                <a:spcPts val="360"/>
+              </a:spcBef>
+              <a:spcAft>
+                <a:spcPts val="0"/>
+              </a:spcAft>
+              <a:buClr>
+                <a:schemeClr val="accent1"/>
+              </a:buClr>
+              <a:buSzPts val="1800"/>
+              <a:buFont typeface="Arial"/>
+              <a:buChar char="–"/>
+              <a:defRPr sz="1800" b="0" i="0" u="none" strike="noStrike" cap="none">
+                <a:solidFill>
+                  <a:schemeClr val="dk2"/>
+                </a:solidFill>
+                <a:latin typeface="Arial"/>
+                <a:ea typeface="Arial"/>
+                <a:cs typeface="Arial"/>
+                <a:sym typeface="Arial"/>
+              </a:defRPr>
+            </a:lvl4pPr>
+            <a:lvl5pPr marL="2286000" marR="0" lvl="4" indent="-342900" algn="l" rtl="0">
+              <a:lnSpc>
+                <a:spcPct val="100000"/>
+              </a:lnSpc>
+              <a:spcBef>
+                <a:spcPts val="360"/>
+              </a:spcBef>
+              <a:spcAft>
+                <a:spcPts val="0"/>
+              </a:spcAft>
+              <a:buClr>
+                <a:schemeClr val="accent1"/>
+              </a:buClr>
+              <a:buSzPts val="1800"/>
+              <a:buFont typeface="Arial"/>
+              <a:buChar char="»"/>
+              <a:defRPr sz="1800" b="0" i="0" u="none" strike="noStrike" cap="none">
+                <a:solidFill>
+                  <a:schemeClr val="dk2"/>
+                </a:solidFill>
+                <a:latin typeface="Arial"/>
+                <a:ea typeface="Arial"/>
+                <a:cs typeface="Arial"/>
+                <a:sym typeface="Arial"/>
+              </a:defRPr>
+            </a:lvl5pPr>
+            <a:lvl6pPr marL="2743200" marR="0" lvl="5" indent="-342900" algn="l" rtl="0">
+              <a:lnSpc>
+                <a:spcPct val="100000"/>
+              </a:lnSpc>
+              <a:spcBef>
+                <a:spcPts val="360"/>
+              </a:spcBef>
+              <a:spcAft>
+                <a:spcPts val="0"/>
+              </a:spcAft>
+              <a:buClr>
+                <a:schemeClr val="dk1"/>
+              </a:buClr>
+              <a:buSzPts val="1800"/>
+              <a:buFont typeface="Arial"/>
+              <a:buChar char="•"/>
+              <a:defRPr sz="2000" b="0" i="0" u="none" strike="noStrike" cap="none">
+                <a:solidFill>
+                  <a:schemeClr val="dk1"/>
+                </a:solidFill>
+                <a:latin typeface="Arial"/>
+                <a:ea typeface="Arial"/>
+                <a:cs typeface="Arial"/>
+                <a:sym typeface="Arial"/>
+              </a:defRPr>
+            </a:lvl6pPr>
+            <a:lvl7pPr marL="3200400" marR="0" lvl="6" indent="-342900" algn="l" rtl="0">
+              <a:lnSpc>
+                <a:spcPct val="100000"/>
+              </a:lnSpc>
+              <a:spcBef>
+                <a:spcPts val="360"/>
+              </a:spcBef>
+              <a:spcAft>
+                <a:spcPts val="0"/>
+              </a:spcAft>
+              <a:buClr>
+                <a:schemeClr val="dk1"/>
+              </a:buClr>
+              <a:buSzPts val="1800"/>
+              <a:buFont typeface="Arial"/>
+              <a:buChar char="•"/>
+              <a:defRPr sz="2000" b="0" i="0" u="none" strike="noStrike" cap="none">
+                <a:solidFill>
+                  <a:schemeClr val="dk1"/>
+                </a:solidFill>
+                <a:latin typeface="Arial"/>
+                <a:ea typeface="Arial"/>
+                <a:cs typeface="Arial"/>
+                <a:sym typeface="Arial"/>
+              </a:defRPr>
+            </a:lvl7pPr>
+            <a:lvl8pPr marL="3657600" marR="0" lvl="7" indent="-342900" algn="l" rtl="0">
+              <a:lnSpc>
+                <a:spcPct val="100000"/>
+              </a:lnSpc>
+              <a:spcBef>
+                <a:spcPts val="360"/>
+              </a:spcBef>
+              <a:spcAft>
+                <a:spcPts val="0"/>
+              </a:spcAft>
+              <a:buClr>
+                <a:schemeClr val="dk1"/>
+              </a:buClr>
+              <a:buSzPts val="1800"/>
+              <a:buFont typeface="Arial"/>
+              <a:buChar char="•"/>
+              <a:defRPr sz="2000" b="0" i="0" u="none" strike="noStrike" cap="none">
+                <a:solidFill>
+                  <a:schemeClr val="dk1"/>
+                </a:solidFill>
+                <a:latin typeface="Arial"/>
+                <a:ea typeface="Arial"/>
+                <a:cs typeface="Arial"/>
+                <a:sym typeface="Arial"/>
+              </a:defRPr>
+            </a:lvl8pPr>
+            <a:lvl9pPr marL="4114800" marR="0" lvl="8" indent="-342900" algn="l" rtl="0">
+              <a:lnSpc>
+                <a:spcPct val="100000"/>
+              </a:lnSpc>
+              <a:spcBef>
+                <a:spcPts val="360"/>
+              </a:spcBef>
+              <a:spcAft>
+                <a:spcPts val="0"/>
+              </a:spcAft>
+              <a:buClr>
+                <a:schemeClr val="dk1"/>
+              </a:buClr>
+              <a:buSzPts val="1800"/>
+              <a:buFont typeface="Arial"/>
+              <a:buChar char="•"/>
+              <a:defRPr sz="2000" b="0" i="0" u="none" strike="noStrike" cap="none">
+                <a:solidFill>
+                  <a:schemeClr val="dk1"/>
+                </a:solidFill>
+                <a:latin typeface="Arial"/>
+                <a:ea typeface="Arial"/>
+                <a:cs typeface="Arial"/>
+                <a:sym typeface="Arial"/>
+              </a:defRPr>
+            </a:lvl9pPr>
+          </a:lstStyle>
+          <a:p>
+            <a:endParaRPr lang="en-US" dirty="0"/>
+          </a:p>
+        </p:txBody>
+      </p:sp>
+      <p:sp>
+        <p:nvSpPr>
+          <p:cNvPr id="5" name="Rectangle 4">
+            <a:extLst>
+              <a:ext uri="{FF2B5EF4-FFF2-40B4-BE49-F238E27FC236}">
+                <a16:creationId xmlns:a16="http://schemas.microsoft.com/office/drawing/2014/main" id="{C2436A3B-4484-45C0-9B6E-FF56FF4F2AB0}"/>
+              </a:ext>
+            </a:extLst>
+          </p:cNvPr>
+          <p:cNvSpPr/>
+          <p:nvPr/>
+        </p:nvSpPr>
+        <p:spPr>
+          <a:xfrm>
+            <a:off x="640579" y="1481445"/>
+            <a:ext cx="7862842" cy="4882267"/>
+          </a:xfrm>
+          <a:prstGeom prst="rect">
+            <a:avLst/>
+          </a:prstGeom>
+        </p:spPr>
+        <p:style>
+          <a:lnRef idx="1">
+            <a:schemeClr val="accent2"/>
+          </a:lnRef>
+          <a:fillRef idx="2">
+            <a:schemeClr val="accent2"/>
+          </a:fillRef>
+          <a:effectRef idx="1">
+            <a:schemeClr val="accent2"/>
+          </a:effectRef>
+          <a:fontRef idx="minor">
+            <a:schemeClr val="dk1"/>
+          </a:fontRef>
+        </p:style>
+        <p:txBody>
+          <a:bodyPr rtlCol="0" anchor="ctr">
+            <a:normAutofit/>
+          </a:bodyPr>
+          <a:lstStyle/>
+          <a:p>
+            <a:pPr defTabSz="228600"/>
+            <a:r>
+              <a:rPr lang="en-US" sz="1600" dirty="0">
+                <a:latin typeface="Courier New" panose="02070309020205020404" pitchFamily="49" charset="0"/>
+                <a:cs typeface="Courier New" panose="02070309020205020404" pitchFamily="49" charset="0"/>
+              </a:rPr>
+              <a:t>&lt;</a:t>
+            </a:r>
+            <a:r>
+              <a:rPr lang="en-US" sz="1600" b="1" dirty="0">
+                <a:latin typeface="Courier New" panose="02070309020205020404" pitchFamily="49" charset="0"/>
+                <a:cs typeface="Courier New" panose="02070309020205020404" pitchFamily="49" charset="0"/>
+              </a:rPr>
+              <a:t>web-app</a:t>
+            </a:r>
+            <a:r>
+              <a:rPr lang="en-US" sz="1600" dirty="0">
+                <a:latin typeface="Courier New" panose="02070309020205020404" pitchFamily="49" charset="0"/>
+                <a:cs typeface="Courier New" panose="02070309020205020404" pitchFamily="49" charset="0"/>
+              </a:rPr>
+              <a:t> </a:t>
+            </a:r>
+            <a:r>
+              <a:rPr lang="en-US" sz="1600" dirty="0" err="1">
+                <a:latin typeface="Courier New" panose="02070309020205020404" pitchFamily="49" charset="0"/>
+                <a:cs typeface="Courier New" panose="02070309020205020404" pitchFamily="49" charset="0"/>
+              </a:rPr>
+              <a:t>xmlns</a:t>
+            </a:r>
+            <a:r>
+              <a:rPr lang="en-US" sz="1600" dirty="0">
+                <a:latin typeface="Courier New" panose="02070309020205020404" pitchFamily="49" charset="0"/>
+                <a:cs typeface="Courier New" panose="02070309020205020404" pitchFamily="49" charset="0"/>
+              </a:rPr>
+              <a:t>="</a:t>
+            </a:r>
+            <a:r>
+              <a:rPr lang="en-US" sz="1600" i="1" dirty="0">
+                <a:latin typeface="Courier New" panose="02070309020205020404" pitchFamily="49" charset="0"/>
+                <a:cs typeface="Courier New" panose="02070309020205020404" pitchFamily="49" charset="0"/>
+              </a:rPr>
+              <a:t>http://xmlns.jcp.org/xml/ns/</a:t>
+            </a:r>
+            <a:r>
+              <a:rPr lang="en-US" sz="1600" i="1" dirty="0" err="1">
+                <a:latin typeface="Courier New" panose="02070309020205020404" pitchFamily="49" charset="0"/>
+                <a:cs typeface="Courier New" panose="02070309020205020404" pitchFamily="49" charset="0"/>
+              </a:rPr>
+              <a:t>javaee</a:t>
+            </a:r>
+            <a:r>
+              <a:rPr lang="en-US" sz="1600" dirty="0">
+                <a:latin typeface="Courier New" panose="02070309020205020404" pitchFamily="49" charset="0"/>
+                <a:cs typeface="Courier New" panose="02070309020205020404" pitchFamily="49" charset="0"/>
+              </a:rPr>
+              <a:t>"         					</a:t>
+            </a:r>
+            <a:r>
+              <a:rPr lang="en-US" sz="1600" dirty="0" err="1">
+                <a:latin typeface="Courier New" panose="02070309020205020404" pitchFamily="49" charset="0"/>
+                <a:cs typeface="Courier New" panose="02070309020205020404" pitchFamily="49" charset="0"/>
+              </a:rPr>
+              <a:t>xmlns:xsi</a:t>
+            </a:r>
+            <a:r>
+              <a:rPr lang="en-US" sz="1600" dirty="0">
+                <a:latin typeface="Courier New" panose="02070309020205020404" pitchFamily="49" charset="0"/>
+                <a:cs typeface="Courier New" panose="02070309020205020404" pitchFamily="49" charset="0"/>
+              </a:rPr>
+              <a:t>="</a:t>
+            </a:r>
+            <a:r>
+              <a:rPr lang="en-US" sz="1600" i="1" dirty="0">
+                <a:latin typeface="Courier New" panose="02070309020205020404" pitchFamily="49" charset="0"/>
+                <a:cs typeface="Courier New" panose="02070309020205020404" pitchFamily="49" charset="0"/>
+              </a:rPr>
+              <a:t>http://www.w3.org/2001/</a:t>
+            </a:r>
+            <a:r>
+              <a:rPr lang="en-US" sz="1600" i="1" dirty="0" err="1">
+                <a:latin typeface="Courier New" panose="02070309020205020404" pitchFamily="49" charset="0"/>
+                <a:cs typeface="Courier New" panose="02070309020205020404" pitchFamily="49" charset="0"/>
+              </a:rPr>
+              <a:t>XMLSchema</a:t>
+            </a:r>
+            <a:r>
+              <a:rPr lang="en-US" sz="1600" i="1" dirty="0">
+                <a:latin typeface="Courier New" panose="02070309020205020404" pitchFamily="49" charset="0"/>
+                <a:cs typeface="Courier New" panose="02070309020205020404" pitchFamily="49" charset="0"/>
+              </a:rPr>
+              <a:t>-instance</a:t>
+            </a:r>
+            <a:r>
+              <a:rPr lang="en-US" sz="1600" dirty="0">
+                <a:latin typeface="Courier New" panose="02070309020205020404" pitchFamily="49" charset="0"/>
+                <a:cs typeface="Courier New" panose="02070309020205020404" pitchFamily="49" charset="0"/>
+              </a:rPr>
+              <a:t>”</a:t>
+            </a:r>
+          </a:p>
+          <a:p>
+            <a:pPr defTabSz="228600"/>
+            <a:r>
+              <a:rPr lang="en-US" sz="1600" dirty="0">
+                <a:latin typeface="Courier New" panose="02070309020205020404" pitchFamily="49" charset="0"/>
+                <a:cs typeface="Courier New" panose="02070309020205020404" pitchFamily="49" charset="0"/>
+              </a:rPr>
+              <a:t>				</a:t>
+            </a:r>
+            <a:r>
+              <a:rPr lang="en-US" sz="1600" dirty="0" err="1">
+                <a:latin typeface="Courier New" panose="02070309020205020404" pitchFamily="49" charset="0"/>
+                <a:cs typeface="Courier New" panose="02070309020205020404" pitchFamily="49" charset="0"/>
+              </a:rPr>
+              <a:t>xsi:schemaLocation</a:t>
+            </a:r>
+            <a:r>
+              <a:rPr lang="en-US" sz="1600" dirty="0">
+                <a:latin typeface="Courier New" panose="02070309020205020404" pitchFamily="49" charset="0"/>
+                <a:cs typeface="Courier New" panose="02070309020205020404" pitchFamily="49" charset="0"/>
+              </a:rPr>
+              <a:t>="</a:t>
+            </a:r>
+            <a:r>
+              <a:rPr lang="en-US" sz="1600" i="1" dirty="0">
+                <a:latin typeface="Courier New" panose="02070309020205020404" pitchFamily="49" charset="0"/>
+                <a:cs typeface="Courier New" panose="02070309020205020404" pitchFamily="49" charset="0"/>
+              </a:rPr>
+              <a:t>http://xmlns.jcp.org/xml/ns/</a:t>
+            </a:r>
+            <a:r>
+              <a:rPr lang="en-US" sz="1600" i="1" dirty="0" err="1">
+                <a:latin typeface="Courier New" panose="02070309020205020404" pitchFamily="49" charset="0"/>
+                <a:cs typeface="Courier New" panose="02070309020205020404" pitchFamily="49" charset="0"/>
+              </a:rPr>
+              <a:t>javaee</a:t>
+            </a:r>
+            <a:endParaRPr lang="en-US" sz="1600" i="1" dirty="0">
+              <a:latin typeface="Courier New" panose="02070309020205020404" pitchFamily="49" charset="0"/>
+              <a:cs typeface="Courier New" panose="02070309020205020404" pitchFamily="49" charset="0"/>
+            </a:endParaRPr>
+          </a:p>
+          <a:p>
+            <a:pPr defTabSz="228600"/>
+            <a:r>
+              <a:rPr lang="en-US" sz="1600" i="1" dirty="0">
+                <a:latin typeface="Courier New" panose="02070309020205020404" pitchFamily="49" charset="0"/>
+                <a:cs typeface="Courier New" panose="02070309020205020404" pitchFamily="49" charset="0"/>
+              </a:rPr>
+              <a:t>       	http://xmlns.jcp.org/xml/ns/javaee/web-app_3_1.xsd</a:t>
+            </a:r>
+            <a:r>
+              <a:rPr lang="en-US" sz="1600" dirty="0">
+                <a:latin typeface="Courier New" panose="02070309020205020404" pitchFamily="49" charset="0"/>
+                <a:cs typeface="Courier New" panose="02070309020205020404" pitchFamily="49" charset="0"/>
+              </a:rPr>
+              <a:t>"</a:t>
+            </a:r>
+          </a:p>
+          <a:p>
+            <a:pPr lvl="1" defTabSz="228600"/>
+            <a:r>
+              <a:rPr lang="en-US" sz="1600" dirty="0">
+                <a:latin typeface="Courier New" panose="02070309020205020404" pitchFamily="49" charset="0"/>
+                <a:cs typeface="Courier New" panose="02070309020205020404" pitchFamily="49" charset="0"/>
+              </a:rPr>
+              <a:t>				version="</a:t>
+            </a:r>
+            <a:r>
+              <a:rPr lang="en-US" sz="1600" i="1" dirty="0">
+                <a:latin typeface="Courier New" panose="02070309020205020404" pitchFamily="49" charset="0"/>
+                <a:cs typeface="Courier New" panose="02070309020205020404" pitchFamily="49" charset="0"/>
+              </a:rPr>
+              <a:t>3.1</a:t>
+            </a:r>
+            <a:r>
+              <a:rPr lang="en-US" sz="1600" dirty="0">
+                <a:latin typeface="Courier New" panose="02070309020205020404" pitchFamily="49" charset="0"/>
+                <a:cs typeface="Courier New" panose="02070309020205020404" pitchFamily="49" charset="0"/>
+              </a:rPr>
+              <a:t>"&gt;</a:t>
+            </a:r>
+          </a:p>
+          <a:p>
+            <a:pPr defTabSz="228600"/>
+            <a:endParaRPr lang="en-US" sz="1600" dirty="0">
+              <a:latin typeface="Courier New" panose="02070309020205020404" pitchFamily="49" charset="0"/>
+              <a:cs typeface="Courier New" panose="02070309020205020404" pitchFamily="49" charset="0"/>
+            </a:endParaRPr>
+          </a:p>
+          <a:p>
+            <a:pPr defTabSz="228600"/>
+            <a:r>
+              <a:rPr lang="en-US" sz="1600" dirty="0">
+                <a:latin typeface="Courier New" panose="02070309020205020404" pitchFamily="49" charset="0"/>
+                <a:cs typeface="Courier New" panose="02070309020205020404" pitchFamily="49" charset="0"/>
+              </a:rPr>
+              <a:t>&lt;</a:t>
+            </a:r>
+            <a:r>
+              <a:rPr lang="en-US" sz="1600" b="1" dirty="0">
+                <a:latin typeface="Courier New" panose="02070309020205020404" pitchFamily="49" charset="0"/>
+                <a:cs typeface="Courier New" panose="02070309020205020404" pitchFamily="49" charset="0"/>
+              </a:rPr>
+              <a:t>servlet</a:t>
+            </a:r>
+            <a:r>
+              <a:rPr lang="en-US" sz="1600" dirty="0">
+                <a:latin typeface="Courier New" panose="02070309020205020404" pitchFamily="49" charset="0"/>
+                <a:cs typeface="Courier New" panose="02070309020205020404" pitchFamily="49" charset="0"/>
+              </a:rPr>
+              <a:t>&gt;</a:t>
+            </a:r>
+          </a:p>
+          <a:p>
+            <a:pPr defTabSz="228600"/>
+            <a:r>
+              <a:rPr lang="en-US" sz="1600" dirty="0">
+                <a:latin typeface="Courier New" panose="02070309020205020404" pitchFamily="49" charset="0"/>
+                <a:cs typeface="Courier New" panose="02070309020205020404" pitchFamily="49" charset="0"/>
+              </a:rPr>
+              <a:t>    &lt;</a:t>
+            </a:r>
+            <a:r>
+              <a:rPr lang="en-US" sz="1600" b="1" dirty="0">
+                <a:latin typeface="Courier New" panose="02070309020205020404" pitchFamily="49" charset="0"/>
+                <a:cs typeface="Courier New" panose="02070309020205020404" pitchFamily="49" charset="0"/>
+              </a:rPr>
+              <a:t>servlet-name</a:t>
+            </a:r>
+            <a:r>
+              <a:rPr lang="en-US" sz="1600" dirty="0">
+                <a:latin typeface="Courier New" panose="02070309020205020404" pitchFamily="49" charset="0"/>
+                <a:cs typeface="Courier New" panose="02070309020205020404" pitchFamily="49" charset="0"/>
+              </a:rPr>
+              <a:t>&gt;servlet1&lt;/</a:t>
+            </a:r>
+            <a:r>
+              <a:rPr lang="en-US" sz="1600" b="1" dirty="0">
+                <a:latin typeface="Courier New" panose="02070309020205020404" pitchFamily="49" charset="0"/>
+                <a:cs typeface="Courier New" panose="02070309020205020404" pitchFamily="49" charset="0"/>
+              </a:rPr>
+              <a:t>servlet-name</a:t>
+            </a:r>
+            <a:r>
+              <a:rPr lang="en-US" sz="1600" dirty="0">
+                <a:latin typeface="Courier New" panose="02070309020205020404" pitchFamily="49" charset="0"/>
+                <a:cs typeface="Courier New" panose="02070309020205020404" pitchFamily="49" charset="0"/>
+              </a:rPr>
+              <a:t>&gt;</a:t>
+            </a:r>
+          </a:p>
+          <a:p>
+            <a:pPr defTabSz="228600"/>
+            <a:r>
+              <a:rPr lang="en-US" sz="1600" dirty="0">
+                <a:latin typeface="Courier New" panose="02070309020205020404" pitchFamily="49" charset="0"/>
+                <a:cs typeface="Courier New" panose="02070309020205020404" pitchFamily="49" charset="0"/>
+              </a:rPr>
+              <a:t>		&lt;</a:t>
+            </a:r>
+            <a:r>
+              <a:rPr lang="en-US" sz="1600" b="1" dirty="0">
+                <a:latin typeface="Courier New" panose="02070309020205020404" pitchFamily="49" charset="0"/>
+                <a:cs typeface="Courier New" panose="02070309020205020404" pitchFamily="49" charset="0"/>
+              </a:rPr>
+              <a:t>servlet-class</a:t>
+            </a:r>
+            <a:r>
+              <a:rPr lang="en-US" sz="1600" dirty="0">
+                <a:latin typeface="Courier New" panose="02070309020205020404" pitchFamily="49" charset="0"/>
+                <a:cs typeface="Courier New" panose="02070309020205020404" pitchFamily="49" charset="0"/>
+              </a:rPr>
+              <a:t>&gt;</a:t>
+            </a:r>
+            <a:r>
+              <a:rPr lang="en-US" sz="1600" dirty="0" err="1">
+                <a:latin typeface="Courier New" panose="02070309020205020404" pitchFamily="49" charset="0"/>
+                <a:cs typeface="Courier New" panose="02070309020205020404" pitchFamily="49" charset="0"/>
+              </a:rPr>
+              <a:t>com.revature.MyFirstServlet</a:t>
+            </a:r>
+            <a:r>
+              <a:rPr lang="en-US" sz="1600" dirty="0">
+                <a:latin typeface="Courier New" panose="02070309020205020404" pitchFamily="49" charset="0"/>
+                <a:cs typeface="Courier New" panose="02070309020205020404" pitchFamily="49" charset="0"/>
+              </a:rPr>
+              <a:t>&lt;/</a:t>
+            </a:r>
+            <a:r>
+              <a:rPr lang="en-US" sz="1600" b="1" dirty="0">
+                <a:latin typeface="Courier New" panose="02070309020205020404" pitchFamily="49" charset="0"/>
+                <a:cs typeface="Courier New" panose="02070309020205020404" pitchFamily="49" charset="0"/>
+              </a:rPr>
+              <a:t>servlet-class</a:t>
+            </a:r>
+            <a:r>
+              <a:rPr lang="en-US" sz="1600" dirty="0">
+                <a:latin typeface="Courier New" panose="02070309020205020404" pitchFamily="49" charset="0"/>
+                <a:cs typeface="Courier New" panose="02070309020205020404" pitchFamily="49" charset="0"/>
+              </a:rPr>
+              <a:t>&gt;</a:t>
+            </a:r>
+          </a:p>
+          <a:p>
+            <a:pPr defTabSz="228600"/>
+            <a:r>
+              <a:rPr lang="en-US" sz="1600" dirty="0">
+                <a:latin typeface="Courier New" panose="02070309020205020404" pitchFamily="49" charset="0"/>
+                <a:cs typeface="Courier New" panose="02070309020205020404" pitchFamily="49" charset="0"/>
+              </a:rPr>
+              <a:t>&lt;/</a:t>
+            </a:r>
+            <a:r>
+              <a:rPr lang="en-US" sz="1600" b="1" dirty="0">
+                <a:latin typeface="Courier New" panose="02070309020205020404" pitchFamily="49" charset="0"/>
+                <a:cs typeface="Courier New" panose="02070309020205020404" pitchFamily="49" charset="0"/>
+              </a:rPr>
+              <a:t>servlet</a:t>
+            </a:r>
+            <a:r>
+              <a:rPr lang="en-US" sz="1600" dirty="0">
+                <a:latin typeface="Courier New" panose="02070309020205020404" pitchFamily="49" charset="0"/>
+                <a:cs typeface="Courier New" panose="02070309020205020404" pitchFamily="49" charset="0"/>
+              </a:rPr>
+              <a:t>&gt;</a:t>
+            </a:r>
+          </a:p>
+          <a:p>
+            <a:pPr defTabSz="228600"/>
+            <a:endParaRPr lang="en-US" sz="1600" dirty="0">
+              <a:latin typeface="Courier New" panose="02070309020205020404" pitchFamily="49" charset="0"/>
+              <a:cs typeface="Courier New" panose="02070309020205020404" pitchFamily="49" charset="0"/>
+            </a:endParaRPr>
+          </a:p>
+          <a:p>
+            <a:pPr defTabSz="228600"/>
+            <a:r>
+              <a:rPr lang="en-US" sz="1600" dirty="0">
+                <a:latin typeface="Courier New" panose="02070309020205020404" pitchFamily="49" charset="0"/>
+                <a:cs typeface="Courier New" panose="02070309020205020404" pitchFamily="49" charset="0"/>
+              </a:rPr>
+              <a:t>&lt;</a:t>
+            </a:r>
+            <a:r>
+              <a:rPr lang="en-US" sz="1600" b="1" dirty="0">
+                <a:latin typeface="Courier New" panose="02070309020205020404" pitchFamily="49" charset="0"/>
+                <a:cs typeface="Courier New" panose="02070309020205020404" pitchFamily="49" charset="0"/>
+              </a:rPr>
+              <a:t>servlet-mapping</a:t>
+            </a:r>
+            <a:r>
+              <a:rPr lang="en-US" sz="1600" dirty="0">
+                <a:latin typeface="Courier New" panose="02070309020205020404" pitchFamily="49" charset="0"/>
+                <a:cs typeface="Courier New" panose="02070309020205020404" pitchFamily="49" charset="0"/>
+              </a:rPr>
+              <a:t>&gt;</a:t>
+            </a:r>
+          </a:p>
+          <a:p>
+            <a:pPr defTabSz="228600"/>
+            <a:r>
+              <a:rPr lang="en-US" sz="1600" dirty="0">
+                <a:latin typeface="Courier New" panose="02070309020205020404" pitchFamily="49" charset="0"/>
+                <a:cs typeface="Courier New" panose="02070309020205020404" pitchFamily="49" charset="0"/>
+              </a:rPr>
+              <a:t>    &lt;</a:t>
+            </a:r>
+            <a:r>
+              <a:rPr lang="en-US" sz="1600" b="1" dirty="0">
+                <a:latin typeface="Courier New" panose="02070309020205020404" pitchFamily="49" charset="0"/>
+                <a:cs typeface="Courier New" panose="02070309020205020404" pitchFamily="49" charset="0"/>
+              </a:rPr>
+              <a:t>servlet-name</a:t>
+            </a:r>
+            <a:r>
+              <a:rPr lang="en-US" sz="1600" dirty="0">
+                <a:latin typeface="Courier New" panose="02070309020205020404" pitchFamily="49" charset="0"/>
+                <a:cs typeface="Courier New" panose="02070309020205020404" pitchFamily="49" charset="0"/>
+              </a:rPr>
+              <a:t>&gt;servlet1&lt;/</a:t>
+            </a:r>
+            <a:r>
+              <a:rPr lang="en-US" sz="1600" b="1" dirty="0">
+                <a:latin typeface="Courier New" panose="02070309020205020404" pitchFamily="49" charset="0"/>
+                <a:cs typeface="Courier New" panose="02070309020205020404" pitchFamily="49" charset="0"/>
+              </a:rPr>
+              <a:t>servlet-name</a:t>
+            </a:r>
+            <a:r>
+              <a:rPr lang="en-US" sz="1600" dirty="0">
+                <a:latin typeface="Courier New" panose="02070309020205020404" pitchFamily="49" charset="0"/>
+                <a:cs typeface="Courier New" panose="02070309020205020404" pitchFamily="49" charset="0"/>
+              </a:rPr>
+              <a:t>&gt;       </a:t>
+            </a:r>
+          </a:p>
+          <a:p>
+            <a:pPr defTabSz="228600"/>
+            <a:r>
+              <a:rPr lang="en-US" sz="1600" dirty="0">
+                <a:latin typeface="Courier New" panose="02070309020205020404" pitchFamily="49" charset="0"/>
+                <a:cs typeface="Courier New" panose="02070309020205020404" pitchFamily="49" charset="0"/>
+              </a:rPr>
+              <a:t>		&lt;</a:t>
+            </a:r>
+            <a:r>
+              <a:rPr lang="en-US" sz="1600" b="1" dirty="0" err="1">
+                <a:latin typeface="Courier New" panose="02070309020205020404" pitchFamily="49" charset="0"/>
+                <a:cs typeface="Courier New" panose="02070309020205020404" pitchFamily="49" charset="0"/>
+              </a:rPr>
+              <a:t>url</a:t>
+            </a:r>
+            <a:r>
+              <a:rPr lang="en-US" sz="1600" b="1" dirty="0">
+                <a:latin typeface="Courier New" panose="02070309020205020404" pitchFamily="49" charset="0"/>
+                <a:cs typeface="Courier New" panose="02070309020205020404" pitchFamily="49" charset="0"/>
+              </a:rPr>
+              <a:t>-pattern</a:t>
+            </a:r>
+            <a:r>
+              <a:rPr lang="en-US" sz="1600" dirty="0">
+                <a:latin typeface="Courier New" panose="02070309020205020404" pitchFamily="49" charset="0"/>
+                <a:cs typeface="Courier New" panose="02070309020205020404" pitchFamily="49" charset="0"/>
+              </a:rPr>
+              <a:t>&gt;/index&lt;/</a:t>
+            </a:r>
+            <a:r>
+              <a:rPr lang="en-US" sz="1600" b="1" dirty="0" err="1">
+                <a:latin typeface="Courier New" panose="02070309020205020404" pitchFamily="49" charset="0"/>
+                <a:cs typeface="Courier New" panose="02070309020205020404" pitchFamily="49" charset="0"/>
+              </a:rPr>
+              <a:t>url</a:t>
+            </a:r>
+            <a:r>
+              <a:rPr lang="en-US" sz="1600" b="1" dirty="0">
+                <a:latin typeface="Courier New" panose="02070309020205020404" pitchFamily="49" charset="0"/>
+                <a:cs typeface="Courier New" panose="02070309020205020404" pitchFamily="49" charset="0"/>
+              </a:rPr>
+              <a:t>-pattern</a:t>
+            </a:r>
+            <a:r>
+              <a:rPr lang="en-US" sz="1600" dirty="0">
+                <a:latin typeface="Courier New" panose="02070309020205020404" pitchFamily="49" charset="0"/>
+                <a:cs typeface="Courier New" panose="02070309020205020404" pitchFamily="49" charset="0"/>
+              </a:rPr>
+              <a:t>&gt;</a:t>
+            </a:r>
+          </a:p>
+          <a:p>
+            <a:pPr defTabSz="228600"/>
+            <a:r>
+              <a:rPr lang="en-US" sz="1600" dirty="0">
+                <a:latin typeface="Courier New" panose="02070309020205020404" pitchFamily="49" charset="0"/>
+                <a:cs typeface="Courier New" panose="02070309020205020404" pitchFamily="49" charset="0"/>
+              </a:rPr>
+              <a:t>&lt;/</a:t>
+            </a:r>
+            <a:r>
+              <a:rPr lang="en-US" sz="1600" b="1" dirty="0">
+                <a:latin typeface="Courier New" panose="02070309020205020404" pitchFamily="49" charset="0"/>
+                <a:cs typeface="Courier New" panose="02070309020205020404" pitchFamily="49" charset="0"/>
+              </a:rPr>
+              <a:t>servlet-mapping</a:t>
+            </a:r>
+            <a:r>
+              <a:rPr lang="en-US" sz="1600" dirty="0">
+                <a:latin typeface="Courier New" panose="02070309020205020404" pitchFamily="49" charset="0"/>
+                <a:cs typeface="Courier New" panose="02070309020205020404" pitchFamily="49" charset="0"/>
+              </a:rPr>
+              <a:t>&gt;</a:t>
+            </a:r>
+          </a:p>
+          <a:p>
+            <a:pPr defTabSz="228600"/>
+            <a:endParaRPr lang="en-US" sz="1600" dirty="0">
+              <a:latin typeface="Courier New" panose="02070309020205020404" pitchFamily="49" charset="0"/>
+              <a:cs typeface="Courier New" panose="02070309020205020404" pitchFamily="49" charset="0"/>
+            </a:endParaRPr>
+          </a:p>
+          <a:p>
+            <a:pPr defTabSz="228600"/>
+            <a:r>
+              <a:rPr lang="en-US" sz="1600" dirty="0">
+                <a:latin typeface="Courier New" panose="02070309020205020404" pitchFamily="49" charset="0"/>
+                <a:cs typeface="Courier New" panose="02070309020205020404" pitchFamily="49" charset="0"/>
+              </a:rPr>
+              <a:t>&lt;/</a:t>
+            </a:r>
+            <a:r>
+              <a:rPr lang="en-US" sz="1600" b="1" dirty="0">
+                <a:latin typeface="Courier New" panose="02070309020205020404" pitchFamily="49" charset="0"/>
+                <a:cs typeface="Courier New" panose="02070309020205020404" pitchFamily="49" charset="0"/>
+              </a:rPr>
+              <a:t>web-app</a:t>
+            </a:r>
+            <a:r>
+              <a:rPr lang="en-US" sz="1600" dirty="0">
+                <a:latin typeface="Courier New" panose="02070309020205020404" pitchFamily="49" charset="0"/>
+                <a:cs typeface="Courier New" panose="02070309020205020404" pitchFamily="49" charset="0"/>
+              </a:rPr>
+              <a:t>&gt;</a:t>
+            </a:r>
           </a:p>
         </p:txBody>
       </p:sp>
     </p:spTree>
     <p:extLst>
       <p:ext uri="{BB962C8B-B14F-4D97-AF65-F5344CB8AC3E}">
-        <p14:creationId xmlns:p14="http://schemas.microsoft.com/office/powerpoint/2010/main" val="1332497306"/>
+        <p14:creationId xmlns:p14="http://schemas.microsoft.com/office/powerpoint/2010/main" val="566770337"/>
       </p:ext>
     </p:extLst>
   </p:cSld>
@@ -36707,7 +37438,7 @@
 </p:sld>
 </file>
 
-<file path=ppt/slides/slide3.xml><?xml version="1.0" encoding="utf-8"?>
+<file path=ppt/slides/slide11.xml><?xml version="1.0" encoding="utf-8"?>
 <p:sld xmlns:a="http://schemas.openxmlformats.org/drawingml/2006/main" xmlns:r="http://schemas.openxmlformats.org/officeDocument/2006/relationships" xmlns:p="http://schemas.openxmlformats.org/presentationml/2006/main">
   <p:cSld>
     <p:spTree>
@@ -36726,13 +37457,7 @@
       </p:grpSpPr>
       <p:sp>
         <p:nvSpPr>
-          <p:cNvPr id="2" name="Title 1">
-            <a:extLst>
-              <a:ext uri="{FF2B5EF4-FFF2-40B4-BE49-F238E27FC236}">
-                <a16:creationId xmlns:a16="http://schemas.microsoft.com/office/drawing/2014/main" id="{1C28674B-1518-4682-A159-2FB06D1C1D52}"/>
-              </a:ext>
-            </a:extLst>
-          </p:cNvPr>
+          <p:cNvPr id="2" name="Title 1"/>
           <p:cNvSpPr>
             <a:spLocks noGrp="1"/>
           </p:cNvSpPr>
@@ -36747,131 +37472,14 @@
           <a:p>
             <a:r>
               <a:rPr lang="en-US" dirty="0"/>
-              <a:t>Servlet Interface</a:t>
+              <a:t>Sending Users to Different Locations</a:t>
             </a:r>
           </a:p>
         </p:txBody>
       </p:sp>
       <p:sp>
         <p:nvSpPr>
-          <p:cNvPr id="3" name="Content Placeholder 2">
-            <a:extLst>
-              <a:ext uri="{FF2B5EF4-FFF2-40B4-BE49-F238E27FC236}">
-                <a16:creationId xmlns:a16="http://schemas.microsoft.com/office/drawing/2014/main" id="{E9BD6B6C-8F01-4D3C-B22B-C91026C26468}"/>
-              </a:ext>
-            </a:extLst>
-          </p:cNvPr>
-          <p:cNvSpPr>
-            <a:spLocks noGrp="1"/>
-          </p:cNvSpPr>
-          <p:nvPr>
-            <p:ph idx="1"/>
-          </p:nvPr>
-        </p:nvSpPr>
-        <p:spPr/>
-        <p:txBody>
-          <a:bodyPr/>
-          <a:lstStyle/>
-          <a:p>
-            <a:r>
-              <a:rPr lang="en-US" dirty="0" err="1"/>
-              <a:t>init</a:t>
-            </a:r>
-            <a:r>
-              <a:rPr lang="en-US" dirty="0"/>
-              <a:t>()</a:t>
-            </a:r>
-          </a:p>
-          <a:p>
-            <a:pPr lvl="1"/>
-            <a:r>
-              <a:rPr lang="en-US" dirty="0"/>
-              <a:t>method is used to initialize the servlet</a:t>
-            </a:r>
-          </a:p>
-          <a:p>
-            <a:pPr lvl="1"/>
-            <a:r>
-              <a:rPr lang="en-US" dirty="0"/>
-              <a:t>method is called only once</a:t>
-            </a:r>
-          </a:p>
-          <a:p>
-            <a:r>
-              <a:rPr lang="en-US" dirty="0"/>
-              <a:t>service()</a:t>
-            </a:r>
-          </a:p>
-          <a:p>
-            <a:pPr lvl="1"/>
-            <a:r>
-              <a:rPr lang="en-US" dirty="0"/>
-              <a:t>Called each time a request for the servlet is received</a:t>
-            </a:r>
-          </a:p>
-          <a:p>
-            <a:pPr lvl="1"/>
-            <a:r>
-              <a:rPr lang="en-US" dirty="0"/>
-              <a:t>calls </a:t>
-            </a:r>
-            <a:r>
-              <a:rPr lang="en-US" dirty="0" err="1"/>
-              <a:t>doGet</a:t>
-            </a:r>
-            <a:r>
-              <a:rPr lang="en-US" dirty="0"/>
-              <a:t>(), </a:t>
-            </a:r>
-            <a:r>
-              <a:rPr lang="en-US" dirty="0" err="1"/>
-              <a:t>doPost</a:t>
-            </a:r>
-            <a:r>
-              <a:rPr lang="en-US" dirty="0"/>
-              <a:t>(), </a:t>
-            </a:r>
-            <a:r>
-              <a:rPr lang="en-US" dirty="0" err="1"/>
-              <a:t>doPut</a:t>
-            </a:r>
-            <a:r>
-              <a:rPr lang="en-US" dirty="0"/>
-              <a:t>(), </a:t>
-            </a:r>
-            <a:r>
-              <a:rPr lang="en-US" dirty="0" err="1"/>
-              <a:t>doDelete</a:t>
-            </a:r>
-            <a:r>
-              <a:rPr lang="en-US" dirty="0"/>
-              <a:t>(), etc. methods as appropriate</a:t>
-            </a:r>
-          </a:p>
-          <a:p>
-            <a:r>
-              <a:rPr lang="en-US" dirty="0"/>
-              <a:t>destroy()</a:t>
-            </a:r>
-          </a:p>
-          <a:p>
-            <a:pPr lvl="1"/>
-            <a:r>
-              <a:rPr lang="en-US" dirty="0"/>
-              <a:t>method is called only once at the end of the a servlet's life</a:t>
-            </a:r>
-          </a:p>
-        </p:txBody>
-      </p:sp>
-      <p:sp>
-        <p:nvSpPr>
-          <p:cNvPr id="4" name="Slide Number Placeholder 3">
-            <a:extLst>
-              <a:ext uri="{FF2B5EF4-FFF2-40B4-BE49-F238E27FC236}">
-                <a16:creationId xmlns:a16="http://schemas.microsoft.com/office/drawing/2014/main" id="{2184A5A7-45E0-4F4E-A98F-E1FF9F76E850}"/>
-              </a:ext>
-            </a:extLst>
-          </p:cNvPr>
+          <p:cNvPr id="4" name="Slide Number Placeholder 3"/>
           <p:cNvSpPr>
             <a:spLocks noGrp="1"/>
           </p:cNvSpPr>
@@ -36887,8 +37495,673 @@
             <a:fld id="{F6728BC2-ACA3-447C-A909-F3F49211C066}" type="slidenum">
               <a:rPr lang="en-US" smtClean="0"/>
               <a:pPr/>
-              <a:t>2</a:t>
+              <a:t>10</a:t>
             </a:fld>
+            <a:endParaRPr lang="en-US" dirty="0"/>
+          </a:p>
+        </p:txBody>
+      </p:sp>
+      <p:sp>
+        <p:nvSpPr>
+          <p:cNvPr id="8" name="Content Placeholder 2">
+            <a:extLst>
+              <a:ext uri="{FF2B5EF4-FFF2-40B4-BE49-F238E27FC236}">
+                <a16:creationId xmlns:a16="http://schemas.microsoft.com/office/drawing/2014/main" id="{D8001D8B-394A-4B27-AFF3-9042F05DA158}"/>
+              </a:ext>
+            </a:extLst>
+          </p:cNvPr>
+          <p:cNvSpPr txBox="1">
+            <a:spLocks/>
+          </p:cNvSpPr>
+          <p:nvPr/>
+        </p:nvSpPr>
+        <p:spPr>
+          <a:xfrm>
+            <a:off x="640579" y="1338469"/>
+            <a:ext cx="7862842" cy="5168049"/>
+          </a:xfrm>
+          <a:prstGeom prst="rect">
+            <a:avLst/>
+          </a:prstGeom>
+          <a:noFill/>
+          <a:ln>
+            <a:noFill/>
+          </a:ln>
+        </p:spPr>
+        <p:txBody>
+          <a:bodyPr spcFirstLastPara="1" wrap="square" lIns="91425" tIns="45700" rIns="91425" bIns="45700" anchor="t" anchorCtr="0">
+            <a:normAutofit/>
+          </a:bodyPr>
+          <a:lstStyle>
+            <a:defPPr marR="0" lvl="0" algn="l" rtl="0">
+              <a:lnSpc>
+                <a:spcPct val="100000"/>
+              </a:lnSpc>
+              <a:spcBef>
+                <a:spcPts val="0"/>
+              </a:spcBef>
+              <a:spcAft>
+                <a:spcPts val="0"/>
+              </a:spcAft>
+            </a:defPPr>
+            <a:lvl1pPr marL="457200" marR="0" lvl="0" indent="-406400" algn="l" rtl="0">
+              <a:lnSpc>
+                <a:spcPct val="100000"/>
+              </a:lnSpc>
+              <a:spcBef>
+                <a:spcPts val="560"/>
+              </a:spcBef>
+              <a:spcAft>
+                <a:spcPts val="0"/>
+              </a:spcAft>
+              <a:buClr>
+                <a:schemeClr val="accent1"/>
+              </a:buClr>
+              <a:buSzPts val="2800"/>
+              <a:buFont typeface="Arial"/>
+              <a:buChar char="•"/>
+              <a:defRPr sz="2800" b="0" i="0" u="none" strike="noStrike" cap="none">
+                <a:solidFill>
+                  <a:schemeClr val="dk2"/>
+                </a:solidFill>
+                <a:latin typeface="Arial"/>
+                <a:ea typeface="Arial"/>
+                <a:cs typeface="Arial"/>
+                <a:sym typeface="Arial"/>
+              </a:defRPr>
+            </a:lvl1pPr>
+            <a:lvl2pPr marL="914400" marR="0" lvl="1" indent="-381000" algn="l" rtl="0">
+              <a:lnSpc>
+                <a:spcPct val="100000"/>
+              </a:lnSpc>
+              <a:spcBef>
+                <a:spcPts val="480"/>
+              </a:spcBef>
+              <a:spcAft>
+                <a:spcPts val="0"/>
+              </a:spcAft>
+              <a:buClr>
+                <a:schemeClr val="accent1"/>
+              </a:buClr>
+              <a:buSzPts val="2400"/>
+              <a:buFont typeface="Arial"/>
+              <a:buChar char="–"/>
+              <a:defRPr sz="2400" b="0" i="0" u="none" strike="noStrike" cap="none">
+                <a:solidFill>
+                  <a:schemeClr val="dk2"/>
+                </a:solidFill>
+                <a:latin typeface="Arial"/>
+                <a:ea typeface="Arial"/>
+                <a:cs typeface="Arial"/>
+                <a:sym typeface="Arial"/>
+              </a:defRPr>
+            </a:lvl2pPr>
+            <a:lvl3pPr marL="1371600" marR="0" lvl="2" indent="-355600" algn="l" rtl="0">
+              <a:lnSpc>
+                <a:spcPct val="100000"/>
+              </a:lnSpc>
+              <a:spcBef>
+                <a:spcPts val="400"/>
+              </a:spcBef>
+              <a:spcAft>
+                <a:spcPts val="0"/>
+              </a:spcAft>
+              <a:buClr>
+                <a:schemeClr val="accent1"/>
+              </a:buClr>
+              <a:buSzPts val="2000"/>
+              <a:buFont typeface="Arial"/>
+              <a:buChar char="•"/>
+              <a:defRPr sz="2000" b="0" i="0" u="none" strike="noStrike" cap="none">
+                <a:solidFill>
+                  <a:schemeClr val="dk2"/>
+                </a:solidFill>
+                <a:latin typeface="Arial"/>
+                <a:ea typeface="Arial"/>
+                <a:cs typeface="Arial"/>
+                <a:sym typeface="Arial"/>
+              </a:defRPr>
+            </a:lvl3pPr>
+            <a:lvl4pPr marL="1828800" marR="0" lvl="3" indent="-342900" algn="l" rtl="0">
+              <a:lnSpc>
+                <a:spcPct val="100000"/>
+              </a:lnSpc>
+              <a:spcBef>
+                <a:spcPts val="360"/>
+              </a:spcBef>
+              <a:spcAft>
+                <a:spcPts val="0"/>
+              </a:spcAft>
+              <a:buClr>
+                <a:schemeClr val="accent1"/>
+              </a:buClr>
+              <a:buSzPts val="1800"/>
+              <a:buFont typeface="Arial"/>
+              <a:buChar char="–"/>
+              <a:defRPr sz="1800" b="0" i="0" u="none" strike="noStrike" cap="none">
+                <a:solidFill>
+                  <a:schemeClr val="dk2"/>
+                </a:solidFill>
+                <a:latin typeface="Arial"/>
+                <a:ea typeface="Arial"/>
+                <a:cs typeface="Arial"/>
+                <a:sym typeface="Arial"/>
+              </a:defRPr>
+            </a:lvl4pPr>
+            <a:lvl5pPr marL="2286000" marR="0" lvl="4" indent="-342900" algn="l" rtl="0">
+              <a:lnSpc>
+                <a:spcPct val="100000"/>
+              </a:lnSpc>
+              <a:spcBef>
+                <a:spcPts val="360"/>
+              </a:spcBef>
+              <a:spcAft>
+                <a:spcPts val="0"/>
+              </a:spcAft>
+              <a:buClr>
+                <a:schemeClr val="accent1"/>
+              </a:buClr>
+              <a:buSzPts val="1800"/>
+              <a:buFont typeface="Arial"/>
+              <a:buChar char="»"/>
+              <a:defRPr sz="1800" b="0" i="0" u="none" strike="noStrike" cap="none">
+                <a:solidFill>
+                  <a:schemeClr val="dk2"/>
+                </a:solidFill>
+                <a:latin typeface="Arial"/>
+                <a:ea typeface="Arial"/>
+                <a:cs typeface="Arial"/>
+                <a:sym typeface="Arial"/>
+              </a:defRPr>
+            </a:lvl5pPr>
+            <a:lvl6pPr marL="2743200" marR="0" lvl="5" indent="-342900" algn="l" rtl="0">
+              <a:lnSpc>
+                <a:spcPct val="100000"/>
+              </a:lnSpc>
+              <a:spcBef>
+                <a:spcPts val="360"/>
+              </a:spcBef>
+              <a:spcAft>
+                <a:spcPts val="0"/>
+              </a:spcAft>
+              <a:buClr>
+                <a:schemeClr val="dk1"/>
+              </a:buClr>
+              <a:buSzPts val="1800"/>
+              <a:buFont typeface="Arial"/>
+              <a:buChar char="•"/>
+              <a:defRPr sz="2000" b="0" i="0" u="none" strike="noStrike" cap="none">
+                <a:solidFill>
+                  <a:schemeClr val="dk1"/>
+                </a:solidFill>
+                <a:latin typeface="Arial"/>
+                <a:ea typeface="Arial"/>
+                <a:cs typeface="Arial"/>
+                <a:sym typeface="Arial"/>
+              </a:defRPr>
+            </a:lvl6pPr>
+            <a:lvl7pPr marL="3200400" marR="0" lvl="6" indent="-342900" algn="l" rtl="0">
+              <a:lnSpc>
+                <a:spcPct val="100000"/>
+              </a:lnSpc>
+              <a:spcBef>
+                <a:spcPts val="360"/>
+              </a:spcBef>
+              <a:spcAft>
+                <a:spcPts val="0"/>
+              </a:spcAft>
+              <a:buClr>
+                <a:schemeClr val="dk1"/>
+              </a:buClr>
+              <a:buSzPts val="1800"/>
+              <a:buFont typeface="Arial"/>
+              <a:buChar char="•"/>
+              <a:defRPr sz="2000" b="0" i="0" u="none" strike="noStrike" cap="none">
+                <a:solidFill>
+                  <a:schemeClr val="dk1"/>
+                </a:solidFill>
+                <a:latin typeface="Arial"/>
+                <a:ea typeface="Arial"/>
+                <a:cs typeface="Arial"/>
+                <a:sym typeface="Arial"/>
+              </a:defRPr>
+            </a:lvl7pPr>
+            <a:lvl8pPr marL="3657600" marR="0" lvl="7" indent="-342900" algn="l" rtl="0">
+              <a:lnSpc>
+                <a:spcPct val="100000"/>
+              </a:lnSpc>
+              <a:spcBef>
+                <a:spcPts val="360"/>
+              </a:spcBef>
+              <a:spcAft>
+                <a:spcPts val="0"/>
+              </a:spcAft>
+              <a:buClr>
+                <a:schemeClr val="dk1"/>
+              </a:buClr>
+              <a:buSzPts val="1800"/>
+              <a:buFont typeface="Arial"/>
+              <a:buChar char="•"/>
+              <a:defRPr sz="2000" b="0" i="0" u="none" strike="noStrike" cap="none">
+                <a:solidFill>
+                  <a:schemeClr val="dk1"/>
+                </a:solidFill>
+                <a:latin typeface="Arial"/>
+                <a:ea typeface="Arial"/>
+                <a:cs typeface="Arial"/>
+                <a:sym typeface="Arial"/>
+              </a:defRPr>
+            </a:lvl8pPr>
+            <a:lvl9pPr marL="4114800" marR="0" lvl="8" indent="-342900" algn="l" rtl="0">
+              <a:lnSpc>
+                <a:spcPct val="100000"/>
+              </a:lnSpc>
+              <a:spcBef>
+                <a:spcPts val="360"/>
+              </a:spcBef>
+              <a:spcAft>
+                <a:spcPts val="0"/>
+              </a:spcAft>
+              <a:buClr>
+                <a:schemeClr val="dk1"/>
+              </a:buClr>
+              <a:buSzPts val="1800"/>
+              <a:buFont typeface="Arial"/>
+              <a:buChar char="•"/>
+              <a:defRPr sz="2000" b="0" i="0" u="none" strike="noStrike" cap="none">
+                <a:solidFill>
+                  <a:schemeClr val="dk1"/>
+                </a:solidFill>
+                <a:latin typeface="Arial"/>
+                <a:ea typeface="Arial"/>
+                <a:cs typeface="Arial"/>
+                <a:sym typeface="Arial"/>
+              </a:defRPr>
+            </a:lvl9pPr>
+          </a:lstStyle>
+          <a:p>
+            <a:endParaRPr lang="en-US" dirty="0"/>
+          </a:p>
+        </p:txBody>
+      </p:sp>
+      <p:sp>
+        <p:nvSpPr>
+          <p:cNvPr id="6" name="Content Placeholder 2">
+            <a:extLst>
+              <a:ext uri="{FF2B5EF4-FFF2-40B4-BE49-F238E27FC236}">
+                <a16:creationId xmlns:a16="http://schemas.microsoft.com/office/drawing/2014/main" id="{BFCD4FB5-B5E3-45BE-8041-2E28810E25CD}"/>
+              </a:ext>
+            </a:extLst>
+          </p:cNvPr>
+          <p:cNvSpPr txBox="1">
+            <a:spLocks/>
+          </p:cNvSpPr>
+          <p:nvPr/>
+        </p:nvSpPr>
+        <p:spPr>
+          <a:xfrm>
+            <a:off x="792979" y="1490869"/>
+            <a:ext cx="7862842" cy="5168049"/>
+          </a:xfrm>
+          <a:prstGeom prst="rect">
+            <a:avLst/>
+          </a:prstGeom>
+          <a:noFill/>
+          <a:ln>
+            <a:noFill/>
+          </a:ln>
+        </p:spPr>
+        <p:txBody>
+          <a:bodyPr spcFirstLastPara="1" wrap="square" lIns="91425" tIns="45700" rIns="91425" bIns="45700" anchor="t" anchorCtr="0">
+            <a:normAutofit fontScale="85000" lnSpcReduction="20000"/>
+          </a:bodyPr>
+          <a:lstStyle>
+            <a:defPPr marR="0" lvl="0" algn="l" rtl="0">
+              <a:lnSpc>
+                <a:spcPct val="100000"/>
+              </a:lnSpc>
+              <a:spcBef>
+                <a:spcPts val="0"/>
+              </a:spcBef>
+              <a:spcAft>
+                <a:spcPts val="0"/>
+              </a:spcAft>
+            </a:defPPr>
+            <a:lvl1pPr marL="457200" marR="0" lvl="0" indent="-406400" algn="l" rtl="0">
+              <a:lnSpc>
+                <a:spcPct val="100000"/>
+              </a:lnSpc>
+              <a:spcBef>
+                <a:spcPts val="560"/>
+              </a:spcBef>
+              <a:spcAft>
+                <a:spcPts val="0"/>
+              </a:spcAft>
+              <a:buClr>
+                <a:schemeClr val="accent1"/>
+              </a:buClr>
+              <a:buSzPts val="2800"/>
+              <a:buFont typeface="Arial"/>
+              <a:buChar char="•"/>
+              <a:defRPr sz="2800" b="0" i="0" u="none" strike="noStrike" cap="none">
+                <a:solidFill>
+                  <a:schemeClr val="dk2"/>
+                </a:solidFill>
+                <a:latin typeface="Arial"/>
+                <a:ea typeface="Arial"/>
+                <a:cs typeface="Arial"/>
+                <a:sym typeface="Arial"/>
+              </a:defRPr>
+            </a:lvl1pPr>
+            <a:lvl2pPr marL="914400" marR="0" lvl="1" indent="-381000" algn="l" rtl="0">
+              <a:lnSpc>
+                <a:spcPct val="100000"/>
+              </a:lnSpc>
+              <a:spcBef>
+                <a:spcPts val="480"/>
+              </a:spcBef>
+              <a:spcAft>
+                <a:spcPts val="0"/>
+              </a:spcAft>
+              <a:buClr>
+                <a:schemeClr val="accent1"/>
+              </a:buClr>
+              <a:buSzPts val="2400"/>
+              <a:buFont typeface="Arial"/>
+              <a:buChar char="–"/>
+              <a:defRPr sz="2400" b="0" i="0" u="none" strike="noStrike" cap="none">
+                <a:solidFill>
+                  <a:schemeClr val="dk2"/>
+                </a:solidFill>
+                <a:latin typeface="Arial"/>
+                <a:ea typeface="Arial"/>
+                <a:cs typeface="Arial"/>
+                <a:sym typeface="Arial"/>
+              </a:defRPr>
+            </a:lvl2pPr>
+            <a:lvl3pPr marL="1371600" marR="0" lvl="2" indent="-355600" algn="l" rtl="0">
+              <a:lnSpc>
+                <a:spcPct val="100000"/>
+              </a:lnSpc>
+              <a:spcBef>
+                <a:spcPts val="400"/>
+              </a:spcBef>
+              <a:spcAft>
+                <a:spcPts val="0"/>
+              </a:spcAft>
+              <a:buClr>
+                <a:schemeClr val="accent1"/>
+              </a:buClr>
+              <a:buSzPts val="2000"/>
+              <a:buFont typeface="Arial"/>
+              <a:buChar char="•"/>
+              <a:defRPr sz="2000" b="0" i="0" u="none" strike="noStrike" cap="none">
+                <a:solidFill>
+                  <a:schemeClr val="dk2"/>
+                </a:solidFill>
+                <a:latin typeface="Arial"/>
+                <a:ea typeface="Arial"/>
+                <a:cs typeface="Arial"/>
+                <a:sym typeface="Arial"/>
+              </a:defRPr>
+            </a:lvl3pPr>
+            <a:lvl4pPr marL="1828800" marR="0" lvl="3" indent="-342900" algn="l" rtl="0">
+              <a:lnSpc>
+                <a:spcPct val="100000"/>
+              </a:lnSpc>
+              <a:spcBef>
+                <a:spcPts val="360"/>
+              </a:spcBef>
+              <a:spcAft>
+                <a:spcPts val="0"/>
+              </a:spcAft>
+              <a:buClr>
+                <a:schemeClr val="accent1"/>
+              </a:buClr>
+              <a:buSzPts val="1800"/>
+              <a:buFont typeface="Arial"/>
+              <a:buChar char="–"/>
+              <a:defRPr sz="1800" b="0" i="0" u="none" strike="noStrike" cap="none">
+                <a:solidFill>
+                  <a:schemeClr val="dk2"/>
+                </a:solidFill>
+                <a:latin typeface="Arial"/>
+                <a:ea typeface="Arial"/>
+                <a:cs typeface="Arial"/>
+                <a:sym typeface="Arial"/>
+              </a:defRPr>
+            </a:lvl4pPr>
+            <a:lvl5pPr marL="2286000" marR="0" lvl="4" indent="-342900" algn="l" rtl="0">
+              <a:lnSpc>
+                <a:spcPct val="100000"/>
+              </a:lnSpc>
+              <a:spcBef>
+                <a:spcPts val="360"/>
+              </a:spcBef>
+              <a:spcAft>
+                <a:spcPts val="0"/>
+              </a:spcAft>
+              <a:buClr>
+                <a:schemeClr val="accent1"/>
+              </a:buClr>
+              <a:buSzPts val="1800"/>
+              <a:buFont typeface="Arial"/>
+              <a:buChar char="»"/>
+              <a:defRPr sz="1800" b="0" i="0" u="none" strike="noStrike" cap="none">
+                <a:solidFill>
+                  <a:schemeClr val="dk2"/>
+                </a:solidFill>
+                <a:latin typeface="Arial"/>
+                <a:ea typeface="Arial"/>
+                <a:cs typeface="Arial"/>
+                <a:sym typeface="Arial"/>
+              </a:defRPr>
+            </a:lvl5pPr>
+            <a:lvl6pPr marL="2743200" marR="0" lvl="5" indent="-342900" algn="l" rtl="0">
+              <a:lnSpc>
+                <a:spcPct val="100000"/>
+              </a:lnSpc>
+              <a:spcBef>
+                <a:spcPts val="360"/>
+              </a:spcBef>
+              <a:spcAft>
+                <a:spcPts val="0"/>
+              </a:spcAft>
+              <a:buClr>
+                <a:schemeClr val="dk1"/>
+              </a:buClr>
+              <a:buSzPts val="1800"/>
+              <a:buFont typeface="Arial"/>
+              <a:buChar char="•"/>
+              <a:defRPr sz="2000" b="0" i="0" u="none" strike="noStrike" cap="none">
+                <a:solidFill>
+                  <a:schemeClr val="dk1"/>
+                </a:solidFill>
+                <a:latin typeface="Arial"/>
+                <a:ea typeface="Arial"/>
+                <a:cs typeface="Arial"/>
+                <a:sym typeface="Arial"/>
+              </a:defRPr>
+            </a:lvl6pPr>
+            <a:lvl7pPr marL="3200400" marR="0" lvl="6" indent="-342900" algn="l" rtl="0">
+              <a:lnSpc>
+                <a:spcPct val="100000"/>
+              </a:lnSpc>
+              <a:spcBef>
+                <a:spcPts val="360"/>
+              </a:spcBef>
+              <a:spcAft>
+                <a:spcPts val="0"/>
+              </a:spcAft>
+              <a:buClr>
+                <a:schemeClr val="dk1"/>
+              </a:buClr>
+              <a:buSzPts val="1800"/>
+              <a:buFont typeface="Arial"/>
+              <a:buChar char="•"/>
+              <a:defRPr sz="2000" b="0" i="0" u="none" strike="noStrike" cap="none">
+                <a:solidFill>
+                  <a:schemeClr val="dk1"/>
+                </a:solidFill>
+                <a:latin typeface="Arial"/>
+                <a:ea typeface="Arial"/>
+                <a:cs typeface="Arial"/>
+                <a:sym typeface="Arial"/>
+              </a:defRPr>
+            </a:lvl7pPr>
+            <a:lvl8pPr marL="3657600" marR="0" lvl="7" indent="-342900" algn="l" rtl="0">
+              <a:lnSpc>
+                <a:spcPct val="100000"/>
+              </a:lnSpc>
+              <a:spcBef>
+                <a:spcPts val="360"/>
+              </a:spcBef>
+              <a:spcAft>
+                <a:spcPts val="0"/>
+              </a:spcAft>
+              <a:buClr>
+                <a:schemeClr val="dk1"/>
+              </a:buClr>
+              <a:buSzPts val="1800"/>
+              <a:buFont typeface="Arial"/>
+              <a:buChar char="•"/>
+              <a:defRPr sz="2000" b="0" i="0" u="none" strike="noStrike" cap="none">
+                <a:solidFill>
+                  <a:schemeClr val="dk1"/>
+                </a:solidFill>
+                <a:latin typeface="Arial"/>
+                <a:ea typeface="Arial"/>
+                <a:cs typeface="Arial"/>
+                <a:sym typeface="Arial"/>
+              </a:defRPr>
+            </a:lvl8pPr>
+            <a:lvl9pPr marL="4114800" marR="0" lvl="8" indent="-342900" algn="l" rtl="0">
+              <a:lnSpc>
+                <a:spcPct val="100000"/>
+              </a:lnSpc>
+              <a:spcBef>
+                <a:spcPts val="360"/>
+              </a:spcBef>
+              <a:spcAft>
+                <a:spcPts val="0"/>
+              </a:spcAft>
+              <a:buClr>
+                <a:schemeClr val="dk1"/>
+              </a:buClr>
+              <a:buSzPts val="1800"/>
+              <a:buFont typeface="Arial"/>
+              <a:buChar char="•"/>
+              <a:defRPr sz="2000" b="0" i="0" u="none" strike="noStrike" cap="none">
+                <a:solidFill>
+                  <a:schemeClr val="dk1"/>
+                </a:solidFill>
+                <a:latin typeface="Arial"/>
+                <a:ea typeface="Arial"/>
+                <a:cs typeface="Arial"/>
+                <a:sym typeface="Arial"/>
+              </a:defRPr>
+            </a:lvl9pPr>
+          </a:lstStyle>
+          <a:p>
+            <a:r>
+              <a:rPr lang="en-US" dirty="0" err="1"/>
+              <a:t>SendRedirect</a:t>
+            </a:r>
+            <a:r>
+              <a:rPr lang="en-US" dirty="0"/>
+              <a:t>:</a:t>
+            </a:r>
+          </a:p>
+          <a:p>
+            <a:pPr lvl="1"/>
+            <a:r>
+              <a:rPr lang="en-US" dirty="0"/>
+              <a:t>Supplied by the response object</a:t>
+            </a:r>
+          </a:p>
+          <a:p>
+            <a:pPr lvl="1"/>
+            <a:r>
+              <a:rPr lang="en-US" dirty="0"/>
+              <a:t>Method signature: </a:t>
+            </a:r>
+            <a:r>
+              <a:rPr lang="en-US" dirty="0" err="1"/>
+              <a:t>response.sendRedirect</a:t>
+            </a:r>
+            <a:r>
+              <a:rPr lang="en-US" dirty="0"/>
+              <a:t>(location [String])</a:t>
+            </a:r>
+          </a:p>
+          <a:p>
+            <a:pPr lvl="1"/>
+            <a:r>
+              <a:rPr lang="en-US" dirty="0"/>
+              <a:t>This sends a response back to the client and a new request back.</a:t>
+            </a:r>
+          </a:p>
+          <a:p>
+            <a:pPr lvl="1"/>
+            <a:r>
+              <a:rPr lang="en-US" dirty="0"/>
+              <a:t>The information from the previous request is lost</a:t>
+            </a:r>
+          </a:p>
+          <a:p>
+            <a:r>
+              <a:rPr lang="en-US" dirty="0"/>
+              <a:t>Forward:</a:t>
+            </a:r>
+          </a:p>
+          <a:p>
+            <a:pPr lvl="1"/>
+            <a:r>
+              <a:rPr lang="en-US" dirty="0"/>
+              <a:t>Supplied by the request object</a:t>
+            </a:r>
+          </a:p>
+          <a:p>
+            <a:pPr lvl="1"/>
+            <a:r>
+              <a:rPr lang="en-US" dirty="0"/>
+              <a:t>Method is declared in the request dispatcher interface</a:t>
+            </a:r>
+          </a:p>
+          <a:p>
+            <a:pPr lvl="1"/>
+            <a:r>
+              <a:rPr lang="en-US" dirty="0"/>
+              <a:t>When using forward, the request never leaves the server</a:t>
+            </a:r>
+          </a:p>
+          <a:p>
+            <a:pPr lvl="1"/>
+            <a:r>
+              <a:rPr lang="en-US" dirty="0"/>
+              <a:t>You cannot dispatch to another location (it must come from resources within the same project or ones that are immediately available)</a:t>
+            </a:r>
+          </a:p>
+          <a:p>
+            <a:pPr lvl="1"/>
+            <a:r>
+              <a:rPr lang="en-US" dirty="0"/>
+              <a:t>This action makes a singe request rather than 2, and therefore is faster</a:t>
+            </a:r>
+          </a:p>
+          <a:p>
+            <a:pPr lvl="1"/>
+            <a:r>
+              <a:rPr lang="en-US" dirty="0"/>
+              <a:t>The browser is not made aware of the move to a new location.</a:t>
+            </a:r>
+          </a:p>
+          <a:p>
+            <a:pPr lvl="1"/>
+            <a:endParaRPr lang="en-US" dirty="0"/>
+          </a:p>
+          <a:p>
+            <a:pPr lvl="1"/>
             <a:endParaRPr lang="en-US" dirty="0"/>
           </a:p>
         </p:txBody>
@@ -36896,7 +38169,7 @@
     </p:spTree>
     <p:extLst>
       <p:ext uri="{BB962C8B-B14F-4D97-AF65-F5344CB8AC3E}">
-        <p14:creationId xmlns:p14="http://schemas.microsoft.com/office/powerpoint/2010/main" val="109544656"/>
+        <p14:creationId xmlns:p14="http://schemas.microsoft.com/office/powerpoint/2010/main" val="3265300657"/>
       </p:ext>
     </p:extLst>
   </p:cSld>
@@ -36906,7 +38179,7 @@
 </p:sld>
 </file>
 
-<file path=ppt/slides/slide4.xml><?xml version="1.0" encoding="utf-8"?>
+<file path=ppt/slides/slide12.xml><?xml version="1.0" encoding="utf-8"?>
 <p:sld xmlns:a="http://schemas.openxmlformats.org/drawingml/2006/main" xmlns:r="http://schemas.openxmlformats.org/officeDocument/2006/relationships" xmlns:p="http://schemas.openxmlformats.org/presentationml/2006/main">
   <p:cSld>
     <p:spTree>
@@ -36925,13 +38198,7 @@
       </p:grpSpPr>
       <p:sp>
         <p:nvSpPr>
-          <p:cNvPr id="2" name="Title 1">
-            <a:extLst>
-              <a:ext uri="{FF2B5EF4-FFF2-40B4-BE49-F238E27FC236}">
-                <a16:creationId xmlns:a16="http://schemas.microsoft.com/office/drawing/2014/main" id="{CA0B396C-9F54-46AD-9458-AB99DF818130}"/>
-              </a:ext>
-            </a:extLst>
-          </p:cNvPr>
+          <p:cNvPr id="2" name="Title 1"/>
           <p:cNvSpPr>
             <a:spLocks noGrp="1"/>
           </p:cNvSpPr>
@@ -36946,52 +38213,19 @@
           <a:p>
             <a:r>
               <a:rPr lang="en-US" dirty="0"/>
-              <a:t>Lifecycle of a Servlet</a:t>
+              <a:t>Request-Response </a:t>
             </a:r>
+            <a:r>
+              <a:rPr lang="en-US" dirty="0" err="1"/>
+              <a:t>LifeCycle</a:t>
+            </a:r>
+            <a:endParaRPr lang="en-US" dirty="0"/>
           </a:p>
         </p:txBody>
       </p:sp>
-      <p:pic>
-        <p:nvPicPr>
-          <p:cNvPr id="5" name="Content Placeholder 4">
-            <a:extLst>
-              <a:ext uri="{FF2B5EF4-FFF2-40B4-BE49-F238E27FC236}">
-                <a16:creationId xmlns:a16="http://schemas.microsoft.com/office/drawing/2014/main" id="{D05CCDE8-B729-4388-88D9-C636C456EDC7}"/>
-              </a:ext>
-            </a:extLst>
-          </p:cNvPr>
-          <p:cNvPicPr>
-            <a:picLocks noGrp="1" noChangeAspect="1"/>
-          </p:cNvPicPr>
-          <p:nvPr>
-            <p:ph idx="1"/>
-          </p:nvPr>
-        </p:nvPicPr>
-        <p:blipFill>
-          <a:blip r:embed="rId2"/>
-          <a:stretch>
-            <a:fillRect/>
-          </a:stretch>
-        </p:blipFill>
-        <p:spPr>
-          <a:xfrm>
-            <a:off x="1257300" y="2096294"/>
-            <a:ext cx="6629400" cy="3295650"/>
-          </a:xfrm>
-          <a:prstGeom prst="rect">
-            <a:avLst/>
-          </a:prstGeom>
-        </p:spPr>
-      </p:pic>
       <p:sp>
         <p:nvSpPr>
-          <p:cNvPr id="4" name="Slide Number Placeholder 3">
-            <a:extLst>
-              <a:ext uri="{FF2B5EF4-FFF2-40B4-BE49-F238E27FC236}">
-                <a16:creationId xmlns:a16="http://schemas.microsoft.com/office/drawing/2014/main" id="{90BF107A-C207-4C1F-9143-4DAEF41615C0}"/>
-              </a:ext>
-            </a:extLst>
-          </p:cNvPr>
+          <p:cNvPr id="4" name="Slide Number Placeholder 3"/>
           <p:cNvSpPr>
             <a:spLocks noGrp="1"/>
           </p:cNvSpPr>
@@ -37007,16 +38241,396 @@
             <a:fld id="{F6728BC2-ACA3-447C-A909-F3F49211C066}" type="slidenum">
               <a:rPr lang="en-US" smtClean="0"/>
               <a:pPr/>
-              <a:t>3</a:t>
+              <a:t>11</a:t>
             </a:fld>
             <a:endParaRPr lang="en-US" dirty="0"/>
+          </a:p>
+        </p:txBody>
+      </p:sp>
+      <p:sp>
+        <p:nvSpPr>
+          <p:cNvPr id="8" name="Content Placeholder 2">
+            <a:extLst>
+              <a:ext uri="{FF2B5EF4-FFF2-40B4-BE49-F238E27FC236}">
+                <a16:creationId xmlns:a16="http://schemas.microsoft.com/office/drawing/2014/main" id="{D8001D8B-394A-4B27-AFF3-9042F05DA158}"/>
+              </a:ext>
+            </a:extLst>
+          </p:cNvPr>
+          <p:cNvSpPr txBox="1">
+            <a:spLocks/>
+          </p:cNvSpPr>
+          <p:nvPr/>
+        </p:nvSpPr>
+        <p:spPr>
+          <a:xfrm>
+            <a:off x="640579" y="1338469"/>
+            <a:ext cx="7862842" cy="5025243"/>
+          </a:xfrm>
+          <a:prstGeom prst="rect">
+            <a:avLst/>
+          </a:prstGeom>
+          <a:noFill/>
+          <a:ln>
+            <a:noFill/>
+          </a:ln>
+        </p:spPr>
+        <p:txBody>
+          <a:bodyPr spcFirstLastPara="1" wrap="square" lIns="91425" tIns="45700" rIns="91425" bIns="45700" anchor="t" anchorCtr="0">
+            <a:normAutofit fontScale="70000" lnSpcReduction="20000"/>
+          </a:bodyPr>
+          <a:lstStyle>
+            <a:defPPr marR="0" lvl="0" algn="l" rtl="0">
+              <a:lnSpc>
+                <a:spcPct val="100000"/>
+              </a:lnSpc>
+              <a:spcBef>
+                <a:spcPts val="0"/>
+              </a:spcBef>
+              <a:spcAft>
+                <a:spcPts val="0"/>
+              </a:spcAft>
+            </a:defPPr>
+            <a:lvl1pPr marL="457200" marR="0" lvl="0" indent="-406400" algn="l" rtl="0">
+              <a:lnSpc>
+                <a:spcPct val="100000"/>
+              </a:lnSpc>
+              <a:spcBef>
+                <a:spcPts val="560"/>
+              </a:spcBef>
+              <a:spcAft>
+                <a:spcPts val="0"/>
+              </a:spcAft>
+              <a:buClr>
+                <a:schemeClr val="accent1"/>
+              </a:buClr>
+              <a:buSzPts val="2800"/>
+              <a:buFont typeface="Arial"/>
+              <a:buChar char="•"/>
+              <a:defRPr sz="2800" b="0" i="0" u="none" strike="noStrike" cap="none">
+                <a:solidFill>
+                  <a:schemeClr val="dk2"/>
+                </a:solidFill>
+                <a:latin typeface="Arial"/>
+                <a:ea typeface="Arial"/>
+                <a:cs typeface="Arial"/>
+                <a:sym typeface="Arial"/>
+              </a:defRPr>
+            </a:lvl1pPr>
+            <a:lvl2pPr marL="914400" marR="0" lvl="1" indent="-381000" algn="l" rtl="0">
+              <a:lnSpc>
+                <a:spcPct val="100000"/>
+              </a:lnSpc>
+              <a:spcBef>
+                <a:spcPts val="480"/>
+              </a:spcBef>
+              <a:spcAft>
+                <a:spcPts val="0"/>
+              </a:spcAft>
+              <a:buClr>
+                <a:schemeClr val="accent1"/>
+              </a:buClr>
+              <a:buSzPts val="2400"/>
+              <a:buFont typeface="Arial"/>
+              <a:buChar char="–"/>
+              <a:defRPr sz="2400" b="0" i="0" u="none" strike="noStrike" cap="none">
+                <a:solidFill>
+                  <a:schemeClr val="dk2"/>
+                </a:solidFill>
+                <a:latin typeface="Arial"/>
+                <a:ea typeface="Arial"/>
+                <a:cs typeface="Arial"/>
+                <a:sym typeface="Arial"/>
+              </a:defRPr>
+            </a:lvl2pPr>
+            <a:lvl3pPr marL="1371600" marR="0" lvl="2" indent="-355600" algn="l" rtl="0">
+              <a:lnSpc>
+                <a:spcPct val="100000"/>
+              </a:lnSpc>
+              <a:spcBef>
+                <a:spcPts val="400"/>
+              </a:spcBef>
+              <a:spcAft>
+                <a:spcPts val="0"/>
+              </a:spcAft>
+              <a:buClr>
+                <a:schemeClr val="accent1"/>
+              </a:buClr>
+              <a:buSzPts val="2000"/>
+              <a:buFont typeface="Arial"/>
+              <a:buChar char="•"/>
+              <a:defRPr sz="2000" b="0" i="0" u="none" strike="noStrike" cap="none">
+                <a:solidFill>
+                  <a:schemeClr val="dk2"/>
+                </a:solidFill>
+                <a:latin typeface="Arial"/>
+                <a:ea typeface="Arial"/>
+                <a:cs typeface="Arial"/>
+                <a:sym typeface="Arial"/>
+              </a:defRPr>
+            </a:lvl3pPr>
+            <a:lvl4pPr marL="1828800" marR="0" lvl="3" indent="-342900" algn="l" rtl="0">
+              <a:lnSpc>
+                <a:spcPct val="100000"/>
+              </a:lnSpc>
+              <a:spcBef>
+                <a:spcPts val="360"/>
+              </a:spcBef>
+              <a:spcAft>
+                <a:spcPts val="0"/>
+              </a:spcAft>
+              <a:buClr>
+                <a:schemeClr val="accent1"/>
+              </a:buClr>
+              <a:buSzPts val="1800"/>
+              <a:buFont typeface="Arial"/>
+              <a:buChar char="–"/>
+              <a:defRPr sz="1800" b="0" i="0" u="none" strike="noStrike" cap="none">
+                <a:solidFill>
+                  <a:schemeClr val="dk2"/>
+                </a:solidFill>
+                <a:latin typeface="Arial"/>
+                <a:ea typeface="Arial"/>
+                <a:cs typeface="Arial"/>
+                <a:sym typeface="Arial"/>
+              </a:defRPr>
+            </a:lvl4pPr>
+            <a:lvl5pPr marL="2286000" marR="0" lvl="4" indent="-342900" algn="l" rtl="0">
+              <a:lnSpc>
+                <a:spcPct val="100000"/>
+              </a:lnSpc>
+              <a:spcBef>
+                <a:spcPts val="360"/>
+              </a:spcBef>
+              <a:spcAft>
+                <a:spcPts val="0"/>
+              </a:spcAft>
+              <a:buClr>
+                <a:schemeClr val="accent1"/>
+              </a:buClr>
+              <a:buSzPts val="1800"/>
+              <a:buFont typeface="Arial"/>
+              <a:buChar char="»"/>
+              <a:defRPr sz="1800" b="0" i="0" u="none" strike="noStrike" cap="none">
+                <a:solidFill>
+                  <a:schemeClr val="dk2"/>
+                </a:solidFill>
+                <a:latin typeface="Arial"/>
+                <a:ea typeface="Arial"/>
+                <a:cs typeface="Arial"/>
+                <a:sym typeface="Arial"/>
+              </a:defRPr>
+            </a:lvl5pPr>
+            <a:lvl6pPr marL="2743200" marR="0" lvl="5" indent="-342900" algn="l" rtl="0">
+              <a:lnSpc>
+                <a:spcPct val="100000"/>
+              </a:lnSpc>
+              <a:spcBef>
+                <a:spcPts val="360"/>
+              </a:spcBef>
+              <a:spcAft>
+                <a:spcPts val="0"/>
+              </a:spcAft>
+              <a:buClr>
+                <a:schemeClr val="dk1"/>
+              </a:buClr>
+              <a:buSzPts val="1800"/>
+              <a:buFont typeface="Arial"/>
+              <a:buChar char="•"/>
+              <a:defRPr sz="2000" b="0" i="0" u="none" strike="noStrike" cap="none">
+                <a:solidFill>
+                  <a:schemeClr val="dk1"/>
+                </a:solidFill>
+                <a:latin typeface="Arial"/>
+                <a:ea typeface="Arial"/>
+                <a:cs typeface="Arial"/>
+                <a:sym typeface="Arial"/>
+              </a:defRPr>
+            </a:lvl6pPr>
+            <a:lvl7pPr marL="3200400" marR="0" lvl="6" indent="-342900" algn="l" rtl="0">
+              <a:lnSpc>
+                <a:spcPct val="100000"/>
+              </a:lnSpc>
+              <a:spcBef>
+                <a:spcPts val="360"/>
+              </a:spcBef>
+              <a:spcAft>
+                <a:spcPts val="0"/>
+              </a:spcAft>
+              <a:buClr>
+                <a:schemeClr val="dk1"/>
+              </a:buClr>
+              <a:buSzPts val="1800"/>
+              <a:buFont typeface="Arial"/>
+              <a:buChar char="•"/>
+              <a:defRPr sz="2000" b="0" i="0" u="none" strike="noStrike" cap="none">
+                <a:solidFill>
+                  <a:schemeClr val="dk1"/>
+                </a:solidFill>
+                <a:latin typeface="Arial"/>
+                <a:ea typeface="Arial"/>
+                <a:cs typeface="Arial"/>
+                <a:sym typeface="Arial"/>
+              </a:defRPr>
+            </a:lvl7pPr>
+            <a:lvl8pPr marL="3657600" marR="0" lvl="7" indent="-342900" algn="l" rtl="0">
+              <a:lnSpc>
+                <a:spcPct val="100000"/>
+              </a:lnSpc>
+              <a:spcBef>
+                <a:spcPts val="360"/>
+              </a:spcBef>
+              <a:spcAft>
+                <a:spcPts val="0"/>
+              </a:spcAft>
+              <a:buClr>
+                <a:schemeClr val="dk1"/>
+              </a:buClr>
+              <a:buSzPts val="1800"/>
+              <a:buFont typeface="Arial"/>
+              <a:buChar char="•"/>
+              <a:defRPr sz="2000" b="0" i="0" u="none" strike="noStrike" cap="none">
+                <a:solidFill>
+                  <a:schemeClr val="dk1"/>
+                </a:solidFill>
+                <a:latin typeface="Arial"/>
+                <a:ea typeface="Arial"/>
+                <a:cs typeface="Arial"/>
+                <a:sym typeface="Arial"/>
+              </a:defRPr>
+            </a:lvl8pPr>
+            <a:lvl9pPr marL="4114800" marR="0" lvl="8" indent="-342900" algn="l" rtl="0">
+              <a:lnSpc>
+                <a:spcPct val="100000"/>
+              </a:lnSpc>
+              <a:spcBef>
+                <a:spcPts val="360"/>
+              </a:spcBef>
+              <a:spcAft>
+                <a:spcPts val="0"/>
+              </a:spcAft>
+              <a:buClr>
+                <a:schemeClr val="dk1"/>
+              </a:buClr>
+              <a:buSzPts val="1800"/>
+              <a:buFont typeface="Arial"/>
+              <a:buChar char="•"/>
+              <a:defRPr sz="2000" b="0" i="0" u="none" strike="noStrike" cap="none">
+                <a:solidFill>
+                  <a:schemeClr val="dk1"/>
+                </a:solidFill>
+                <a:latin typeface="Arial"/>
+                <a:ea typeface="Arial"/>
+                <a:cs typeface="Arial"/>
+                <a:sym typeface="Arial"/>
+              </a:defRPr>
+            </a:lvl9pPr>
+          </a:lstStyle>
+          <a:p>
+            <a:pPr marL="565150" indent="-514350">
+              <a:buFont typeface="+mj-lt"/>
+              <a:buAutoNum type="arabicPeriod"/>
+            </a:pPr>
+            <a:r>
+              <a:rPr lang="en-US" dirty="0"/>
+              <a:t>Client sends request to server</a:t>
+            </a:r>
+          </a:p>
+          <a:p>
+            <a:pPr marL="565150" indent="-514350">
+              <a:buFont typeface="+mj-lt"/>
+              <a:buAutoNum type="arabicPeriod"/>
+            </a:pPr>
+            <a:r>
+              <a:rPr lang="en-US" dirty="0"/>
+              <a:t>(If the server is on), it creates an empty (flat) response file and forwards both the request and response to the web container.</a:t>
+            </a:r>
+          </a:p>
+          <a:p>
+            <a:pPr marL="1022350" lvl="1" indent="-514350"/>
+            <a:r>
+              <a:rPr lang="en-US" dirty="0"/>
+              <a:t>Web Container – does a lot of “heavy-lifting”. It references an application’s deployment descriptor (web.xml), which is a configuration file that tells the server how to deploy the content.	</a:t>
+            </a:r>
+          </a:p>
+          <a:p>
+            <a:pPr marL="565150" indent="-514350">
+              <a:buFont typeface="+mj-lt"/>
+              <a:buAutoNum type="arabicPeriod"/>
+            </a:pPr>
+            <a:r>
+              <a:rPr lang="en-US" dirty="0"/>
+              <a:t>The web container checks the deployment descriptor for where to send the request and response.</a:t>
+            </a:r>
+          </a:p>
+          <a:p>
+            <a:pPr marL="565150" indent="-514350">
+              <a:buFont typeface="+mj-lt"/>
+              <a:buAutoNum type="arabicPeriod"/>
+            </a:pPr>
+            <a:r>
+              <a:rPr lang="en-US" dirty="0"/>
+              <a:t>The web container wraps the request and response as Java Objects (</a:t>
+            </a:r>
+            <a:r>
+              <a:rPr lang="en-US" dirty="0" err="1"/>
+              <a:t>HttpServletRequest</a:t>
+            </a:r>
+            <a:r>
+              <a:rPr lang="en-US" dirty="0"/>
+              <a:t> and </a:t>
+            </a:r>
+            <a:r>
+              <a:rPr lang="en-US" dirty="0" err="1"/>
+              <a:t>HttpServletResponse</a:t>
+            </a:r>
+            <a:r>
+              <a:rPr lang="en-US" dirty="0"/>
+              <a:t>) and sends them to the appropriate servlet.</a:t>
+            </a:r>
+          </a:p>
+          <a:p>
+            <a:pPr marL="1022350" lvl="1" indent="-514350"/>
+            <a:r>
+              <a:rPr lang="en-US" dirty="0"/>
+              <a:t>Here, the Servlet life-cycle takes place, in which services are performed and the response is populated.</a:t>
+            </a:r>
+          </a:p>
+          <a:p>
+            <a:pPr marL="565150" indent="-514350">
+              <a:buFont typeface="+mj-lt"/>
+              <a:buAutoNum type="arabicPeriod"/>
+            </a:pPr>
+            <a:r>
+              <a:rPr lang="en-US" dirty="0"/>
+              <a:t>The servlet passes the request and newly populated response back to the web container.</a:t>
+            </a:r>
+          </a:p>
+          <a:p>
+            <a:pPr marL="565150" indent="-514350">
+              <a:buFont typeface="+mj-lt"/>
+              <a:buAutoNum type="arabicPeriod"/>
+            </a:pPr>
+            <a:r>
+              <a:rPr lang="en-US" dirty="0"/>
+              <a:t>The Web container unwraps the request and response and sends them to the server</a:t>
+            </a:r>
+          </a:p>
+          <a:p>
+            <a:pPr marL="565150" indent="-514350">
+              <a:buFont typeface="+mj-lt"/>
+              <a:buAutoNum type="arabicPeriod"/>
+            </a:pPr>
+            <a:r>
+              <a:rPr lang="en-US" dirty="0"/>
+              <a:t>The server passes the request and response back to the client.</a:t>
+            </a:r>
           </a:p>
         </p:txBody>
       </p:sp>
     </p:spTree>
     <p:extLst>
       <p:ext uri="{BB962C8B-B14F-4D97-AF65-F5344CB8AC3E}">
-        <p14:creationId xmlns:p14="http://schemas.microsoft.com/office/powerpoint/2010/main" val="2672087409"/>
+        <p14:creationId xmlns:p14="http://schemas.microsoft.com/office/powerpoint/2010/main" val="1597951800"/>
       </p:ext>
     </p:extLst>
   </p:cSld>
@@ -37026,7 +38640,118 @@
 </p:sld>
 </file>
 
-<file path=ppt/slides/slide5.xml><?xml version="1.0" encoding="utf-8"?>
+<file path=ppt/slides/slide13.xml><?xml version="1.0" encoding="utf-8"?>
+<p:sld xmlns:a="http://schemas.openxmlformats.org/drawingml/2006/main" xmlns:r="http://schemas.openxmlformats.org/officeDocument/2006/relationships" xmlns:p="http://schemas.openxmlformats.org/presentationml/2006/main">
+  <p:cSld>
+    <p:spTree>
+      <p:nvGrpSpPr>
+        <p:cNvPr id="1" name=""/>
+        <p:cNvGrpSpPr/>
+        <p:nvPr/>
+      </p:nvGrpSpPr>
+      <p:grpSpPr>
+        <a:xfrm>
+          <a:off x="0" y="0"/>
+          <a:ext cx="0" cy="0"/>
+          <a:chOff x="0" y="0"/>
+          <a:chExt cx="0" cy="0"/>
+        </a:xfrm>
+      </p:grpSpPr>
+      <p:sp>
+        <p:nvSpPr>
+          <p:cNvPr id="2" name="Title 1"/>
+          <p:cNvSpPr>
+            <a:spLocks noGrp="1"/>
+          </p:cNvSpPr>
+          <p:nvPr>
+            <p:ph type="title"/>
+          </p:nvPr>
+        </p:nvSpPr>
+        <p:spPr/>
+        <p:txBody>
+          <a:bodyPr/>
+          <a:lstStyle/>
+          <a:p>
+            <a:r>
+              <a:rPr lang="en-US" dirty="0"/>
+              <a:t>Request-Response </a:t>
+            </a:r>
+            <a:r>
+              <a:rPr lang="en-US" dirty="0" err="1"/>
+              <a:t>LifeCycle</a:t>
+            </a:r>
+            <a:endParaRPr lang="en-US" dirty="0"/>
+          </a:p>
+        </p:txBody>
+      </p:sp>
+      <p:sp>
+        <p:nvSpPr>
+          <p:cNvPr id="4" name="Slide Number Placeholder 3"/>
+          <p:cNvSpPr>
+            <a:spLocks noGrp="1"/>
+          </p:cNvSpPr>
+          <p:nvPr>
+            <p:ph type="sldNum" sz="quarter" idx="12"/>
+          </p:nvPr>
+        </p:nvSpPr>
+        <p:spPr/>
+        <p:txBody>
+          <a:bodyPr/>
+          <a:lstStyle/>
+          <a:p>
+            <a:fld id="{F6728BC2-ACA3-447C-A909-F3F49211C066}" type="slidenum">
+              <a:rPr lang="en-US" smtClean="0"/>
+              <a:pPr/>
+              <a:t>12</a:t>
+            </a:fld>
+            <a:endParaRPr lang="en-US" dirty="0"/>
+          </a:p>
+        </p:txBody>
+      </p:sp>
+      <p:pic>
+        <p:nvPicPr>
+          <p:cNvPr id="5" name="Picture 4" descr="Diagram&#10;&#10;Description automatically generated">
+            <a:extLst>
+              <a:ext uri="{FF2B5EF4-FFF2-40B4-BE49-F238E27FC236}">
+                <a16:creationId xmlns:a16="http://schemas.microsoft.com/office/drawing/2014/main" id="{3C73E6F1-7BC9-4717-AD41-59A00A363056}"/>
+              </a:ext>
+            </a:extLst>
+          </p:cNvPr>
+          <p:cNvPicPr>
+            <a:picLocks noChangeAspect="1"/>
+          </p:cNvPicPr>
+          <p:nvPr/>
+        </p:nvPicPr>
+        <p:blipFill>
+          <a:blip r:embed="rId2"/>
+          <a:stretch>
+            <a:fillRect/>
+          </a:stretch>
+        </p:blipFill>
+        <p:spPr>
+          <a:xfrm>
+            <a:off x="0" y="1474278"/>
+            <a:ext cx="9144000" cy="4889434"/>
+          </a:xfrm>
+          <a:prstGeom prst="rect">
+            <a:avLst/>
+          </a:prstGeom>
+        </p:spPr>
+      </p:pic>
+    </p:spTree>
+    <p:extLst>
+      <p:ext uri="{BB962C8B-B14F-4D97-AF65-F5344CB8AC3E}">
+        <p14:creationId xmlns:p14="http://schemas.microsoft.com/office/powerpoint/2010/main" val="1045716059"/>
+      </p:ext>
+    </p:extLst>
+  </p:cSld>
+  <p:clrMapOvr>
+    <a:masterClrMapping/>
+  </p:clrMapOvr>
+</p:sld>
+</file>
+
+<file path=ppt/slides/slide14.xml><?xml version="1.0" encoding="utf-8"?>
 <p:sld xmlns:a="http://schemas.openxmlformats.org/drawingml/2006/main" xmlns:r="http://schemas.openxmlformats.org/officeDocument/2006/relationships" xmlns:p="http://schemas.openxmlformats.org/presentationml/2006/main">
   <p:cSld>
     <p:spTree>
@@ -37455,7 +39180,7 @@
             <a:fld id="{F6728BC2-ACA3-447C-A909-F3F49211C066}" type="slidenum">
               <a:rPr lang="en-US" smtClean="0"/>
               <a:pPr/>
-              <a:t>4</a:t>
+              <a:t>13</a:t>
             </a:fld>
             <a:endParaRPr lang="en-US" dirty="0"/>
           </a:p>
@@ -37474,7 +39199,7 @@
 </p:sld>
 </file>
 
-<file path=ppt/slides/slide6.xml><?xml version="1.0" encoding="utf-8"?>
+<file path=ppt/slides/slide15.xml><?xml version="1.0" encoding="utf-8"?>
 <p:sld xmlns:a="http://schemas.openxmlformats.org/drawingml/2006/main" xmlns:r="http://schemas.openxmlformats.org/officeDocument/2006/relationships" xmlns:p="http://schemas.openxmlformats.org/presentationml/2006/main">
   <p:cSld>
     <p:spTree>
@@ -37566,7 +39291,7 @@
                   <a:spcPts val="600"/>
                 </a:spcAft>
               </a:pPr>
-              <a:t>5</a:t>
+              <a:t>14</a:t>
             </a:fld>
             <a:endParaRPr lang="en-US"/>
           </a:p>
@@ -37815,7 +39540,7 @@
 </p:sld>
 </file>
 
-<file path=ppt/slides/slide7.xml><?xml version="1.0" encoding="utf-8"?>
+<file path=ppt/slides/slide16.xml><?xml version="1.0" encoding="utf-8"?>
 <p:sld xmlns:a="http://schemas.openxmlformats.org/drawingml/2006/main" xmlns:r="http://schemas.openxmlformats.org/officeDocument/2006/relationships" xmlns:p="http://schemas.openxmlformats.org/presentationml/2006/main">
   <p:cSld>
     <p:spTree>
@@ -37884,7 +39609,7 @@
             <a:fld id="{F6728BC2-ACA3-447C-A909-F3F49211C066}" type="slidenum">
               <a:rPr lang="en-US" smtClean="0"/>
               <a:pPr/>
-              <a:t>6</a:t>
+              <a:t>15</a:t>
             </a:fld>
             <a:endParaRPr lang="en-US" dirty="0"/>
           </a:p>
@@ -38509,7 +40234,7 @@
 </p:sld>
 </file>
 
-<file path=ppt/slides/slide8.xml><?xml version="1.0" encoding="utf-8"?>
+<file path=ppt/slides/slide17.xml><?xml version="1.0" encoding="utf-8"?>
 <p:sld xmlns:a="http://schemas.openxmlformats.org/drawingml/2006/main" xmlns:r="http://schemas.openxmlformats.org/officeDocument/2006/relationships" xmlns:p="http://schemas.openxmlformats.org/presentationml/2006/main">
   <p:cSld>
     <p:spTree>
@@ -38575,7 +40300,7 @@
             <a:fld id="{F6728BC2-ACA3-447C-A909-F3F49211C066}" type="slidenum">
               <a:rPr lang="en-US" smtClean="0"/>
               <a:pPr/>
-              <a:t>7</a:t>
+              <a:t>16</a:t>
             </a:fld>
             <a:endParaRPr lang="en-US" dirty="0"/>
           </a:p>
@@ -38585,6 +40310,2369 @@
     <p:extLst>
       <p:ext uri="{BB962C8B-B14F-4D97-AF65-F5344CB8AC3E}">
         <p14:creationId xmlns:p14="http://schemas.microsoft.com/office/powerpoint/2010/main" val="474089397"/>
+      </p:ext>
+    </p:extLst>
+  </p:cSld>
+  <p:clrMapOvr>
+    <a:masterClrMapping/>
+  </p:clrMapOvr>
+</p:sld>
+</file>
+
+<file path=ppt/slides/slide2.xml><?xml version="1.0" encoding="utf-8"?>
+<p:sld xmlns:a="http://schemas.openxmlformats.org/drawingml/2006/main" xmlns:r="http://schemas.openxmlformats.org/officeDocument/2006/relationships" xmlns:p="http://schemas.openxmlformats.org/presentationml/2006/main">
+  <p:cSld>
+    <p:spTree>
+      <p:nvGrpSpPr>
+        <p:cNvPr id="1" name=""/>
+        <p:cNvGrpSpPr/>
+        <p:nvPr/>
+      </p:nvGrpSpPr>
+      <p:grpSpPr>
+        <a:xfrm>
+          <a:off x="0" y="0"/>
+          <a:ext cx="0" cy="0"/>
+          <a:chOff x="0" y="0"/>
+          <a:chExt cx="0" cy="0"/>
+        </a:xfrm>
+      </p:grpSpPr>
+      <p:sp>
+        <p:nvSpPr>
+          <p:cNvPr id="2" name="Title 1">
+            <a:extLst>
+              <a:ext uri="{FF2B5EF4-FFF2-40B4-BE49-F238E27FC236}">
+                <a16:creationId xmlns:a16="http://schemas.microsoft.com/office/drawing/2014/main" id="{87D50B27-A8E9-4330-A597-820DC79F05A9}"/>
+              </a:ext>
+            </a:extLst>
+          </p:cNvPr>
+          <p:cNvSpPr>
+            <a:spLocks noGrp="1"/>
+          </p:cNvSpPr>
+          <p:nvPr>
+            <p:ph type="title"/>
+          </p:nvPr>
+        </p:nvSpPr>
+        <p:spPr/>
+        <p:txBody>
+          <a:bodyPr/>
+          <a:lstStyle/>
+          <a:p>
+            <a:r>
+              <a:rPr lang="en-US" dirty="0"/>
+              <a:t>Servlet Container</a:t>
+            </a:r>
+          </a:p>
+        </p:txBody>
+      </p:sp>
+      <p:sp>
+        <p:nvSpPr>
+          <p:cNvPr id="3" name="Content Placeholder 2">
+            <a:extLst>
+              <a:ext uri="{FF2B5EF4-FFF2-40B4-BE49-F238E27FC236}">
+                <a16:creationId xmlns:a16="http://schemas.microsoft.com/office/drawing/2014/main" id="{3B9D3D13-FCBE-462B-AFDC-73C7DD698A6D}"/>
+              </a:ext>
+            </a:extLst>
+          </p:cNvPr>
+          <p:cNvSpPr>
+            <a:spLocks noGrp="1"/>
+          </p:cNvSpPr>
+          <p:nvPr>
+            <p:ph idx="1"/>
+          </p:nvPr>
+        </p:nvSpPr>
+        <p:spPr/>
+        <p:txBody>
+          <a:bodyPr/>
+          <a:lstStyle/>
+          <a:p>
+            <a:r>
+              <a:rPr lang="en-US" dirty="0"/>
+              <a:t>A </a:t>
+            </a:r>
+            <a:r>
+              <a:rPr lang="en-US" dirty="0">
+                <a:solidFill>
+                  <a:schemeClr val="accent1"/>
+                </a:solidFill>
+              </a:rPr>
+              <a:t>servlet container </a:t>
+            </a:r>
+            <a:r>
+              <a:rPr lang="en-US" dirty="0"/>
+              <a:t>manages the </a:t>
+            </a:r>
+            <a:r>
+              <a:rPr lang="en-US" dirty="0">
+                <a:solidFill>
+                  <a:schemeClr val="accent1"/>
+                </a:solidFill>
+              </a:rPr>
+              <a:t>life cycle </a:t>
+            </a:r>
+            <a:r>
+              <a:rPr lang="en-US" dirty="0"/>
+              <a:t>of a servlet. </a:t>
+            </a:r>
+          </a:p>
+          <a:p>
+            <a:r>
+              <a:rPr lang="en-US" dirty="0"/>
+              <a:t>Servlet is an </a:t>
+            </a:r>
+            <a:r>
+              <a:rPr lang="en-US" dirty="0">
+                <a:solidFill>
+                  <a:schemeClr val="accent1"/>
+                </a:solidFill>
+              </a:rPr>
+              <a:t>interface</a:t>
+            </a:r>
+            <a:r>
+              <a:rPr lang="en-US" dirty="0"/>
+              <a:t> defined in </a:t>
+            </a:r>
+            <a:r>
+              <a:rPr lang="en-US" dirty="0" err="1">
+                <a:solidFill>
+                  <a:schemeClr val="accent1"/>
+                </a:solidFill>
+              </a:rPr>
+              <a:t>javax.servlet</a:t>
+            </a:r>
+            <a:r>
+              <a:rPr lang="en-US" dirty="0">
+                <a:solidFill>
+                  <a:schemeClr val="accent1"/>
+                </a:solidFill>
+              </a:rPr>
+              <a:t> </a:t>
+            </a:r>
+            <a:r>
+              <a:rPr lang="en-US" dirty="0"/>
+              <a:t>package. </a:t>
+            </a:r>
+          </a:p>
+          <a:p>
+            <a:r>
+              <a:rPr lang="en-US" dirty="0"/>
+              <a:t>A servlet container uses the Servlet interface to understand a specific Servlet object and manage it.</a:t>
+            </a:r>
+          </a:p>
+        </p:txBody>
+      </p:sp>
+      <p:sp>
+        <p:nvSpPr>
+          <p:cNvPr id="4" name="Slide Number Placeholder 3">
+            <a:extLst>
+              <a:ext uri="{FF2B5EF4-FFF2-40B4-BE49-F238E27FC236}">
+                <a16:creationId xmlns:a16="http://schemas.microsoft.com/office/drawing/2014/main" id="{00B1C49B-93C2-40C7-8EC5-BD789F40F65A}"/>
+              </a:ext>
+            </a:extLst>
+          </p:cNvPr>
+          <p:cNvSpPr>
+            <a:spLocks noGrp="1"/>
+          </p:cNvSpPr>
+          <p:nvPr>
+            <p:ph type="sldNum" sz="quarter" idx="12"/>
+          </p:nvPr>
+        </p:nvSpPr>
+        <p:spPr/>
+        <p:txBody>
+          <a:bodyPr/>
+          <a:lstStyle/>
+          <a:p>
+            <a:fld id="{F6728BC2-ACA3-447C-A909-F3F49211C066}" type="slidenum">
+              <a:rPr lang="en-US" smtClean="0"/>
+              <a:pPr/>
+              <a:t>1</a:t>
+            </a:fld>
+            <a:endParaRPr lang="en-US" dirty="0"/>
+          </a:p>
+        </p:txBody>
+      </p:sp>
+    </p:spTree>
+    <p:extLst>
+      <p:ext uri="{BB962C8B-B14F-4D97-AF65-F5344CB8AC3E}">
+        <p14:creationId xmlns:p14="http://schemas.microsoft.com/office/powerpoint/2010/main" val="1332497306"/>
+      </p:ext>
+    </p:extLst>
+  </p:cSld>
+  <p:clrMapOvr>
+    <a:masterClrMapping/>
+  </p:clrMapOvr>
+</p:sld>
+</file>
+
+<file path=ppt/slides/slide3.xml><?xml version="1.0" encoding="utf-8"?>
+<p:sld xmlns:a="http://schemas.openxmlformats.org/drawingml/2006/main" xmlns:r="http://schemas.openxmlformats.org/officeDocument/2006/relationships" xmlns:p="http://schemas.openxmlformats.org/presentationml/2006/main">
+  <p:cSld>
+    <p:spTree>
+      <p:nvGrpSpPr>
+        <p:cNvPr id="1" name=""/>
+        <p:cNvGrpSpPr/>
+        <p:nvPr/>
+      </p:nvGrpSpPr>
+      <p:grpSpPr>
+        <a:xfrm>
+          <a:off x="0" y="0"/>
+          <a:ext cx="0" cy="0"/>
+          <a:chOff x="0" y="0"/>
+          <a:chExt cx="0" cy="0"/>
+        </a:xfrm>
+      </p:grpSpPr>
+      <p:sp>
+        <p:nvSpPr>
+          <p:cNvPr id="2" name="Title 1"/>
+          <p:cNvSpPr>
+            <a:spLocks noGrp="1"/>
+          </p:cNvSpPr>
+          <p:nvPr>
+            <p:ph type="title"/>
+          </p:nvPr>
+        </p:nvSpPr>
+        <p:spPr/>
+        <p:txBody>
+          <a:bodyPr/>
+          <a:lstStyle/>
+          <a:p>
+            <a:r>
+              <a:rPr lang="en-US" dirty="0"/>
+              <a:t>Servlet Container</a:t>
+            </a:r>
+          </a:p>
+        </p:txBody>
+      </p:sp>
+      <p:sp>
+        <p:nvSpPr>
+          <p:cNvPr id="3" name="Content Placeholder 2"/>
+          <p:cNvSpPr>
+            <a:spLocks noGrp="1"/>
+          </p:cNvSpPr>
+          <p:nvPr>
+            <p:ph idx="1"/>
+          </p:nvPr>
+        </p:nvSpPr>
+        <p:spPr>
+          <a:xfrm>
+            <a:off x="380010" y="1350323"/>
+            <a:ext cx="8383980" cy="3022894"/>
+          </a:xfrm>
+        </p:spPr>
+        <p:txBody>
+          <a:bodyPr>
+            <a:normAutofit fontScale="92500" lnSpcReduction="10000"/>
+          </a:bodyPr>
+          <a:lstStyle/>
+          <a:p>
+            <a:r>
+              <a:rPr lang="en-US" dirty="0"/>
+              <a:t>The Servlet Container is a component of applications (which use servlets) that interacts with Java servlets. It is responsible for: </a:t>
+            </a:r>
+          </a:p>
+          <a:p>
+            <a:pPr lvl="1"/>
+            <a:r>
+              <a:rPr lang="en-US" dirty="0"/>
+              <a:t>managing the life-cycle of servlets</a:t>
+            </a:r>
+          </a:p>
+          <a:p>
+            <a:pPr lvl="1"/>
+            <a:r>
+              <a:rPr lang="en-US" dirty="0"/>
+              <a:t>mapping a URL to a particular servlet</a:t>
+            </a:r>
+          </a:p>
+          <a:p>
+            <a:pPr lvl="1"/>
+            <a:r>
+              <a:rPr lang="en-US" dirty="0"/>
+              <a:t>ensuring that the URL requester has the correct access rights</a:t>
+            </a:r>
+          </a:p>
+          <a:p>
+            <a:pPr lvl="1"/>
+            <a:r>
+              <a:rPr lang="en-US" dirty="0"/>
+              <a:t>and some other services</a:t>
+            </a:r>
+          </a:p>
+        </p:txBody>
+      </p:sp>
+      <p:sp>
+        <p:nvSpPr>
+          <p:cNvPr id="4" name="Slide Number Placeholder 3"/>
+          <p:cNvSpPr>
+            <a:spLocks noGrp="1"/>
+          </p:cNvSpPr>
+          <p:nvPr>
+            <p:ph type="sldNum" sz="quarter" idx="12"/>
+          </p:nvPr>
+        </p:nvSpPr>
+        <p:spPr/>
+        <p:txBody>
+          <a:bodyPr/>
+          <a:lstStyle/>
+          <a:p>
+            <a:fld id="{F6728BC2-ACA3-447C-A909-F3F49211C066}" type="slidenum">
+              <a:rPr lang="en-US" smtClean="0"/>
+              <a:pPr/>
+              <a:t>2</a:t>
+            </a:fld>
+            <a:endParaRPr lang="en-US" dirty="0"/>
+          </a:p>
+        </p:txBody>
+      </p:sp>
+      <p:pic>
+        <p:nvPicPr>
+          <p:cNvPr id="6" name="Picture 5" descr="Graphical user interface, diagram&#10;&#10;Description automatically generated with medium confidence">
+            <a:extLst>
+              <a:ext uri="{FF2B5EF4-FFF2-40B4-BE49-F238E27FC236}">
+                <a16:creationId xmlns:a16="http://schemas.microsoft.com/office/drawing/2014/main" id="{556E7236-CB8C-467B-BFDD-BF3316A4153F}"/>
+              </a:ext>
+            </a:extLst>
+          </p:cNvPr>
+          <p:cNvPicPr>
+            <a:picLocks noChangeAspect="1"/>
+          </p:cNvPicPr>
+          <p:nvPr/>
+        </p:nvPicPr>
+        <p:blipFill>
+          <a:blip r:embed="rId2"/>
+          <a:stretch>
+            <a:fillRect/>
+          </a:stretch>
+        </p:blipFill>
+        <p:spPr>
+          <a:xfrm>
+            <a:off x="2024062" y="4536499"/>
+            <a:ext cx="5095875" cy="2009775"/>
+          </a:xfrm>
+          <a:prstGeom prst="rect">
+            <a:avLst/>
+          </a:prstGeom>
+        </p:spPr>
+      </p:pic>
+    </p:spTree>
+    <p:extLst>
+      <p:ext uri="{BB962C8B-B14F-4D97-AF65-F5344CB8AC3E}">
+        <p14:creationId xmlns:p14="http://schemas.microsoft.com/office/powerpoint/2010/main" val="1123030990"/>
+      </p:ext>
+    </p:extLst>
+  </p:cSld>
+  <p:clrMapOvr>
+    <a:masterClrMapping/>
+  </p:clrMapOvr>
+</p:sld>
+</file>
+
+<file path=ppt/slides/slide4.xml><?xml version="1.0" encoding="utf-8"?>
+<p:sld xmlns:a="http://schemas.openxmlformats.org/drawingml/2006/main" xmlns:r="http://schemas.openxmlformats.org/officeDocument/2006/relationships" xmlns:p="http://schemas.openxmlformats.org/presentationml/2006/main">
+  <p:cSld>
+    <p:spTree>
+      <p:nvGrpSpPr>
+        <p:cNvPr id="1" name=""/>
+        <p:cNvGrpSpPr/>
+        <p:nvPr/>
+      </p:nvGrpSpPr>
+      <p:grpSpPr>
+        <a:xfrm>
+          <a:off x="0" y="0"/>
+          <a:ext cx="0" cy="0"/>
+          <a:chOff x="0" y="0"/>
+          <a:chExt cx="0" cy="0"/>
+        </a:xfrm>
+      </p:grpSpPr>
+      <p:sp>
+        <p:nvSpPr>
+          <p:cNvPr id="2" name="Title 1"/>
+          <p:cNvSpPr>
+            <a:spLocks noGrp="1"/>
+          </p:cNvSpPr>
+          <p:nvPr>
+            <p:ph type="title"/>
+          </p:nvPr>
+        </p:nvSpPr>
+        <p:spPr/>
+        <p:txBody>
+          <a:bodyPr/>
+          <a:lstStyle/>
+          <a:p>
+            <a:r>
+              <a:rPr lang="en-US" dirty="0"/>
+              <a:t>Servlet Life Cycle</a:t>
+            </a:r>
+          </a:p>
+        </p:txBody>
+      </p:sp>
+      <p:sp>
+        <p:nvSpPr>
+          <p:cNvPr id="3" name="Content Placeholder 2"/>
+          <p:cNvSpPr>
+            <a:spLocks noGrp="1"/>
+          </p:cNvSpPr>
+          <p:nvPr>
+            <p:ph idx="1"/>
+          </p:nvPr>
+        </p:nvSpPr>
+        <p:spPr>
+          <a:xfrm>
+            <a:off x="380010" y="1445757"/>
+            <a:ext cx="8383980" cy="4917955"/>
+          </a:xfrm>
+        </p:spPr>
+        <p:txBody>
+          <a:bodyPr>
+            <a:normAutofit fontScale="62500" lnSpcReduction="20000"/>
+          </a:bodyPr>
+          <a:lstStyle/>
+          <a:p>
+            <a:pPr marL="565150" indent="-514350">
+              <a:buFont typeface="+mj-lt"/>
+              <a:buAutoNum type="arabicPeriod"/>
+            </a:pPr>
+            <a:r>
+              <a:rPr lang="en-US" b="1" dirty="0"/>
+              <a:t>Servlet is Loaded</a:t>
+            </a:r>
+          </a:p>
+          <a:p>
+            <a:pPr marL="1022350" lvl="1" indent="-514350"/>
+            <a:r>
+              <a:rPr lang="en-US" dirty="0"/>
+              <a:t>When the application server (such as Tomcat) starts up, the servlet contain deploys and loads all servlet classes.</a:t>
+            </a:r>
+          </a:p>
+          <a:p>
+            <a:pPr marL="565150" indent="-514350">
+              <a:buFont typeface="+mj-lt"/>
+              <a:buAutoNum type="arabicPeriod"/>
+            </a:pPr>
+            <a:r>
+              <a:rPr lang="en-US" b="1" dirty="0"/>
+              <a:t>Servlet instance Created</a:t>
+            </a:r>
+          </a:p>
+          <a:p>
+            <a:pPr marL="1022350" lvl="1" indent="-514350"/>
+            <a:r>
+              <a:rPr lang="en-US" dirty="0"/>
+              <a:t>Once all servlet classes are loaded, the servlet contain creates only one instance of each servlet class.</a:t>
+            </a:r>
+          </a:p>
+          <a:p>
+            <a:pPr marL="1022350" lvl="1" indent="-514350"/>
+            <a:r>
+              <a:rPr lang="en-US" dirty="0"/>
+              <a:t>All requests to the servlet are executed on that same servlet instance.</a:t>
+            </a:r>
+          </a:p>
+          <a:p>
+            <a:pPr marL="1022350" lvl="1" indent="-514350"/>
+            <a:r>
+              <a:rPr lang="en-US" dirty="0"/>
+              <a:t>Some applications can create multiple instances of a servlet to handle high-volumes of incoming requests, but this is not the default behavior.</a:t>
+            </a:r>
+          </a:p>
+          <a:p>
+            <a:pPr marL="565150" indent="-514350">
+              <a:buFont typeface="+mj-lt"/>
+              <a:buAutoNum type="arabicPeriod"/>
+            </a:pPr>
+            <a:r>
+              <a:rPr lang="en-US" b="1" dirty="0" err="1">
+                <a:latin typeface="Courier New" panose="02070309020205020404" pitchFamily="49" charset="0"/>
+                <a:cs typeface="Courier New" panose="02070309020205020404" pitchFamily="49" charset="0"/>
+              </a:rPr>
+              <a:t>init</a:t>
+            </a:r>
+            <a:r>
+              <a:rPr lang="en-US" b="1" dirty="0">
+                <a:latin typeface="Courier New" panose="02070309020205020404" pitchFamily="49" charset="0"/>
+                <a:cs typeface="Courier New" panose="02070309020205020404" pitchFamily="49" charset="0"/>
+              </a:rPr>
+              <a:t>() </a:t>
+            </a:r>
+            <a:r>
+              <a:rPr lang="en-US" b="1" dirty="0"/>
+              <a:t>method invoked once</a:t>
+            </a:r>
+          </a:p>
+          <a:p>
+            <a:pPr marL="1022350" lvl="1" indent="-514350"/>
+            <a:r>
+              <a:rPr lang="en-US" dirty="0"/>
+              <a:t>Once all servlet classes are instantiated, the</a:t>
+            </a:r>
+            <a:r>
+              <a:rPr lang="en-US" dirty="0">
+                <a:latin typeface="Courier New" panose="02070309020205020404" pitchFamily="49" charset="0"/>
+                <a:cs typeface="Courier New" panose="02070309020205020404" pitchFamily="49" charset="0"/>
+              </a:rPr>
+              <a:t> </a:t>
+            </a:r>
+            <a:r>
+              <a:rPr lang="en-US" dirty="0" err="1">
+                <a:latin typeface="Courier New" panose="02070309020205020404" pitchFamily="49" charset="0"/>
+                <a:cs typeface="Courier New" panose="02070309020205020404" pitchFamily="49" charset="0"/>
+              </a:rPr>
+              <a:t>init</a:t>
+            </a:r>
+            <a:r>
+              <a:rPr lang="en-US" dirty="0">
+                <a:latin typeface="Courier New" panose="02070309020205020404" pitchFamily="49" charset="0"/>
+                <a:cs typeface="Courier New" panose="02070309020205020404" pitchFamily="49" charset="0"/>
+              </a:rPr>
+              <a:t>() </a:t>
+            </a:r>
+            <a:r>
+              <a:rPr lang="en-US" dirty="0"/>
+              <a:t>method is invoked once, and only once for each instantiated servlet, which initialized the servlet.</a:t>
+            </a:r>
+          </a:p>
+          <a:p>
+            <a:pPr marL="565150" indent="-514350">
+              <a:buFont typeface="+mj-lt"/>
+              <a:buAutoNum type="arabicPeriod"/>
+            </a:pPr>
+            <a:r>
+              <a:rPr lang="en-US" b="1" dirty="0">
+                <a:latin typeface="Courier New" panose="02070309020205020404" pitchFamily="49" charset="0"/>
+                <a:cs typeface="Courier New" panose="02070309020205020404" pitchFamily="49" charset="0"/>
+              </a:rPr>
+              <a:t>service()</a:t>
+            </a:r>
+            <a:r>
+              <a:rPr lang="en-US" b="1" dirty="0"/>
+              <a:t> method invoked repeatedly for each client request</a:t>
+            </a:r>
+          </a:p>
+          <a:p>
+            <a:pPr marL="1022350" lvl="1" indent="-514350"/>
+            <a:r>
+              <a:rPr lang="en-US" dirty="0"/>
+              <a:t>The servlet contain calls the service method each time a request for the servlet is received. The service method determines the type of request (GET, POST, PUT, DELETE, </a:t>
+            </a:r>
+            <a:r>
+              <a:rPr lang="en-US" dirty="0" err="1"/>
+              <a:t>etc</a:t>
+            </a:r>
+            <a:r>
+              <a:rPr lang="en-US" dirty="0"/>
+              <a:t>…) and also performs the respective </a:t>
+            </a:r>
+            <a:r>
+              <a:rPr lang="en-US" dirty="0" err="1">
+                <a:latin typeface="Courier New" panose="02070309020205020404" pitchFamily="49" charset="0"/>
+                <a:cs typeface="Courier New" panose="02070309020205020404" pitchFamily="49" charset="0"/>
+              </a:rPr>
+              <a:t>doGet</a:t>
+            </a:r>
+            <a:r>
+              <a:rPr lang="en-US" dirty="0">
+                <a:latin typeface="Courier New" panose="02070309020205020404" pitchFamily="49" charset="0"/>
+                <a:cs typeface="Courier New" panose="02070309020205020404" pitchFamily="49" charset="0"/>
+              </a:rPr>
+              <a:t>(), </a:t>
+            </a:r>
+            <a:r>
+              <a:rPr lang="en-US" dirty="0" err="1">
+                <a:latin typeface="Courier New" panose="02070309020205020404" pitchFamily="49" charset="0"/>
+                <a:cs typeface="Courier New" panose="02070309020205020404" pitchFamily="49" charset="0"/>
+              </a:rPr>
+              <a:t>doPost</a:t>
+            </a:r>
+            <a:r>
+              <a:rPr lang="en-US" dirty="0">
+                <a:latin typeface="Courier New" panose="02070309020205020404" pitchFamily="49" charset="0"/>
+                <a:cs typeface="Courier New" panose="02070309020205020404" pitchFamily="49" charset="0"/>
+              </a:rPr>
+              <a:t>(), </a:t>
+            </a:r>
+            <a:r>
+              <a:rPr lang="en-US" dirty="0" err="1">
+                <a:latin typeface="Courier New" panose="02070309020205020404" pitchFamily="49" charset="0"/>
+                <a:cs typeface="Courier New" panose="02070309020205020404" pitchFamily="49" charset="0"/>
+              </a:rPr>
+              <a:t>doPut</a:t>
+            </a:r>
+            <a:r>
+              <a:rPr lang="en-US" dirty="0">
+                <a:latin typeface="Courier New" panose="02070309020205020404" pitchFamily="49" charset="0"/>
+                <a:cs typeface="Courier New" panose="02070309020205020404" pitchFamily="49" charset="0"/>
+              </a:rPr>
+              <a:t>(), </a:t>
+            </a:r>
+            <a:r>
+              <a:rPr lang="en-US" dirty="0" err="1">
+                <a:latin typeface="Courier New" panose="02070309020205020404" pitchFamily="49" charset="0"/>
+                <a:cs typeface="Courier New" panose="02070309020205020404" pitchFamily="49" charset="0"/>
+              </a:rPr>
+              <a:t>doDelete</a:t>
+            </a:r>
+            <a:r>
+              <a:rPr lang="en-US" dirty="0">
+                <a:latin typeface="Courier New" panose="02070309020205020404" pitchFamily="49" charset="0"/>
+                <a:cs typeface="Courier New" panose="02070309020205020404" pitchFamily="49" charset="0"/>
+              </a:rPr>
+              <a:t>() </a:t>
+            </a:r>
+            <a:r>
+              <a:rPr lang="en-US" dirty="0"/>
+              <a:t>method</a:t>
+            </a:r>
+          </a:p>
+          <a:p>
+            <a:pPr marL="565150" indent="-514350">
+              <a:buFont typeface="+mj-lt"/>
+              <a:buAutoNum type="arabicPeriod"/>
+            </a:pPr>
+            <a:r>
+              <a:rPr lang="en-US" b="1" dirty="0"/>
+              <a:t>Invoke the </a:t>
+            </a:r>
+            <a:r>
+              <a:rPr lang="en-US" b="1" dirty="0">
+                <a:latin typeface="Courier New" panose="02070309020205020404" pitchFamily="49" charset="0"/>
+                <a:cs typeface="Courier New" panose="02070309020205020404" pitchFamily="49" charset="0"/>
+              </a:rPr>
+              <a:t>destroy()</a:t>
+            </a:r>
+            <a:r>
+              <a:rPr lang="en-US" b="1" dirty="0"/>
+              <a:t> method once</a:t>
+            </a:r>
+          </a:p>
+          <a:p>
+            <a:pPr marL="1022350" lvl="1" indent="-514350"/>
+            <a:r>
+              <a:rPr lang="en-US" dirty="0"/>
+              <a:t>The servlet container will call the </a:t>
+            </a:r>
+            <a:r>
+              <a:rPr lang="en-US" dirty="0">
+                <a:latin typeface="Courier New" panose="02070309020205020404" pitchFamily="49" charset="0"/>
+                <a:cs typeface="Courier New" panose="02070309020205020404" pitchFamily="49" charset="0"/>
+              </a:rPr>
+              <a:t>destroy() </a:t>
+            </a:r>
+            <a:r>
+              <a:rPr lang="en-US" dirty="0"/>
+              <a:t>method prior to removing the servlet instance from the service.</a:t>
+            </a:r>
+          </a:p>
+        </p:txBody>
+      </p:sp>
+      <p:sp>
+        <p:nvSpPr>
+          <p:cNvPr id="4" name="Slide Number Placeholder 3"/>
+          <p:cNvSpPr>
+            <a:spLocks noGrp="1"/>
+          </p:cNvSpPr>
+          <p:nvPr>
+            <p:ph type="sldNum" sz="quarter" idx="12"/>
+          </p:nvPr>
+        </p:nvSpPr>
+        <p:spPr/>
+        <p:txBody>
+          <a:bodyPr/>
+          <a:lstStyle/>
+          <a:p>
+            <a:fld id="{F6728BC2-ACA3-447C-A909-F3F49211C066}" type="slidenum">
+              <a:rPr lang="en-US" smtClean="0"/>
+              <a:pPr/>
+              <a:t>3</a:t>
+            </a:fld>
+            <a:endParaRPr lang="en-US" dirty="0"/>
+          </a:p>
+        </p:txBody>
+      </p:sp>
+    </p:spTree>
+    <p:extLst>
+      <p:ext uri="{BB962C8B-B14F-4D97-AF65-F5344CB8AC3E}">
+        <p14:creationId xmlns:p14="http://schemas.microsoft.com/office/powerpoint/2010/main" val="456498062"/>
+      </p:ext>
+    </p:extLst>
+  </p:cSld>
+  <p:clrMapOvr>
+    <a:masterClrMapping/>
+  </p:clrMapOvr>
+</p:sld>
+</file>
+
+<file path=ppt/slides/slide5.xml><?xml version="1.0" encoding="utf-8"?>
+<p:sld xmlns:a="http://schemas.openxmlformats.org/drawingml/2006/main" xmlns:r="http://schemas.openxmlformats.org/officeDocument/2006/relationships" xmlns:p="http://schemas.openxmlformats.org/presentationml/2006/main">
+  <p:cSld>
+    <p:spTree>
+      <p:nvGrpSpPr>
+        <p:cNvPr id="1" name=""/>
+        <p:cNvGrpSpPr/>
+        <p:nvPr/>
+      </p:nvGrpSpPr>
+      <p:grpSpPr>
+        <a:xfrm>
+          <a:off x="0" y="0"/>
+          <a:ext cx="0" cy="0"/>
+          <a:chOff x="0" y="0"/>
+          <a:chExt cx="0" cy="0"/>
+        </a:xfrm>
+      </p:grpSpPr>
+      <p:sp>
+        <p:nvSpPr>
+          <p:cNvPr id="2" name="Title 1"/>
+          <p:cNvSpPr>
+            <a:spLocks noGrp="1"/>
+          </p:cNvSpPr>
+          <p:nvPr>
+            <p:ph type="title"/>
+          </p:nvPr>
+        </p:nvSpPr>
+        <p:spPr/>
+        <p:txBody>
+          <a:bodyPr/>
+          <a:lstStyle/>
+          <a:p>
+            <a:r>
+              <a:rPr lang="en-US" dirty="0"/>
+              <a:t>Servlet Life Cycle</a:t>
+            </a:r>
+          </a:p>
+        </p:txBody>
+      </p:sp>
+      <p:sp>
+        <p:nvSpPr>
+          <p:cNvPr id="4" name="Slide Number Placeholder 3"/>
+          <p:cNvSpPr>
+            <a:spLocks noGrp="1"/>
+          </p:cNvSpPr>
+          <p:nvPr>
+            <p:ph type="sldNum" sz="quarter" idx="12"/>
+          </p:nvPr>
+        </p:nvSpPr>
+        <p:spPr/>
+        <p:txBody>
+          <a:bodyPr/>
+          <a:lstStyle/>
+          <a:p>
+            <a:fld id="{F6728BC2-ACA3-447C-A909-F3F49211C066}" type="slidenum">
+              <a:rPr lang="en-US" smtClean="0"/>
+              <a:pPr/>
+              <a:t>4</a:t>
+            </a:fld>
+            <a:endParaRPr lang="en-US" dirty="0"/>
+          </a:p>
+        </p:txBody>
+      </p:sp>
+      <p:pic>
+        <p:nvPicPr>
+          <p:cNvPr id="7" name="Picture 6" descr="Diagram&#10;&#10;Description automatically generated">
+            <a:extLst>
+              <a:ext uri="{FF2B5EF4-FFF2-40B4-BE49-F238E27FC236}">
+                <a16:creationId xmlns:a16="http://schemas.microsoft.com/office/drawing/2014/main" id="{8700F06C-59E1-4E4E-8308-26A949918A6D}"/>
+              </a:ext>
+            </a:extLst>
+          </p:cNvPr>
+          <p:cNvPicPr>
+            <a:picLocks noChangeAspect="1"/>
+          </p:cNvPicPr>
+          <p:nvPr/>
+        </p:nvPicPr>
+        <p:blipFill>
+          <a:blip r:embed="rId2"/>
+          <a:stretch>
+            <a:fillRect/>
+          </a:stretch>
+        </p:blipFill>
+        <p:spPr>
+          <a:xfrm>
+            <a:off x="298646" y="1635171"/>
+            <a:ext cx="8546707" cy="4248794"/>
+          </a:xfrm>
+          <a:prstGeom prst="rect">
+            <a:avLst/>
+          </a:prstGeom>
+        </p:spPr>
+      </p:pic>
+    </p:spTree>
+    <p:extLst>
+      <p:ext uri="{BB962C8B-B14F-4D97-AF65-F5344CB8AC3E}">
+        <p14:creationId xmlns:p14="http://schemas.microsoft.com/office/powerpoint/2010/main" val="1049551377"/>
+      </p:ext>
+    </p:extLst>
+  </p:cSld>
+  <p:clrMapOvr>
+    <a:masterClrMapping/>
+  </p:clrMapOvr>
+</p:sld>
+</file>
+
+<file path=ppt/slides/slide6.xml><?xml version="1.0" encoding="utf-8"?>
+<p:sld xmlns:a="http://schemas.openxmlformats.org/drawingml/2006/main" xmlns:r="http://schemas.openxmlformats.org/officeDocument/2006/relationships" xmlns:p="http://schemas.openxmlformats.org/presentationml/2006/main">
+  <p:cSld>
+    <p:spTree>
+      <p:nvGrpSpPr>
+        <p:cNvPr id="1" name=""/>
+        <p:cNvGrpSpPr/>
+        <p:nvPr/>
+      </p:nvGrpSpPr>
+      <p:grpSpPr>
+        <a:xfrm>
+          <a:off x="0" y="0"/>
+          <a:ext cx="0" cy="0"/>
+          <a:chOff x="0" y="0"/>
+          <a:chExt cx="0" cy="0"/>
+        </a:xfrm>
+      </p:grpSpPr>
+      <p:sp>
+        <p:nvSpPr>
+          <p:cNvPr id="2" name="Title 1"/>
+          <p:cNvSpPr>
+            <a:spLocks noGrp="1"/>
+          </p:cNvSpPr>
+          <p:nvPr>
+            <p:ph type="title"/>
+          </p:nvPr>
+        </p:nvSpPr>
+        <p:spPr/>
+        <p:txBody>
+          <a:bodyPr/>
+          <a:lstStyle/>
+          <a:p>
+            <a:r>
+              <a:rPr lang="en-US" dirty="0"/>
+              <a:t>Servlet API</a:t>
+            </a:r>
+          </a:p>
+        </p:txBody>
+      </p:sp>
+      <p:sp>
+        <p:nvSpPr>
+          <p:cNvPr id="4" name="Slide Number Placeholder 3"/>
+          <p:cNvSpPr>
+            <a:spLocks noGrp="1"/>
+          </p:cNvSpPr>
+          <p:nvPr>
+            <p:ph type="sldNum" sz="quarter" idx="12"/>
+          </p:nvPr>
+        </p:nvSpPr>
+        <p:spPr/>
+        <p:txBody>
+          <a:bodyPr/>
+          <a:lstStyle/>
+          <a:p>
+            <a:fld id="{F6728BC2-ACA3-447C-A909-F3F49211C066}" type="slidenum">
+              <a:rPr lang="en-US" smtClean="0"/>
+              <a:pPr/>
+              <a:t>5</a:t>
+            </a:fld>
+            <a:endParaRPr lang="en-US" dirty="0"/>
+          </a:p>
+        </p:txBody>
+      </p:sp>
+      <p:sp>
+        <p:nvSpPr>
+          <p:cNvPr id="8" name="Content Placeholder 2">
+            <a:extLst>
+              <a:ext uri="{FF2B5EF4-FFF2-40B4-BE49-F238E27FC236}">
+                <a16:creationId xmlns:a16="http://schemas.microsoft.com/office/drawing/2014/main" id="{D8001D8B-394A-4B27-AFF3-9042F05DA158}"/>
+              </a:ext>
+            </a:extLst>
+          </p:cNvPr>
+          <p:cNvSpPr txBox="1">
+            <a:spLocks/>
+          </p:cNvSpPr>
+          <p:nvPr/>
+        </p:nvSpPr>
+        <p:spPr>
+          <a:xfrm>
+            <a:off x="640579" y="1338469"/>
+            <a:ext cx="7862842" cy="5168049"/>
+          </a:xfrm>
+          <a:prstGeom prst="rect">
+            <a:avLst/>
+          </a:prstGeom>
+          <a:noFill/>
+          <a:ln>
+            <a:noFill/>
+          </a:ln>
+        </p:spPr>
+        <p:txBody>
+          <a:bodyPr spcFirstLastPara="1" wrap="square" lIns="91425" tIns="45700" rIns="91425" bIns="45700" anchor="t" anchorCtr="0">
+            <a:normAutofit fontScale="77500" lnSpcReduction="20000"/>
+          </a:bodyPr>
+          <a:lstStyle>
+            <a:defPPr marR="0" lvl="0" algn="l" rtl="0">
+              <a:lnSpc>
+                <a:spcPct val="100000"/>
+              </a:lnSpc>
+              <a:spcBef>
+                <a:spcPts val="0"/>
+              </a:spcBef>
+              <a:spcAft>
+                <a:spcPts val="0"/>
+              </a:spcAft>
+            </a:defPPr>
+            <a:lvl1pPr marL="457200" marR="0" lvl="0" indent="-406400" algn="l" rtl="0">
+              <a:lnSpc>
+                <a:spcPct val="100000"/>
+              </a:lnSpc>
+              <a:spcBef>
+                <a:spcPts val="560"/>
+              </a:spcBef>
+              <a:spcAft>
+                <a:spcPts val="0"/>
+              </a:spcAft>
+              <a:buClr>
+                <a:schemeClr val="accent1"/>
+              </a:buClr>
+              <a:buSzPts val="2800"/>
+              <a:buFont typeface="Arial"/>
+              <a:buChar char="•"/>
+              <a:defRPr sz="2800" b="0" i="0" u="none" strike="noStrike" cap="none">
+                <a:solidFill>
+                  <a:schemeClr val="dk2"/>
+                </a:solidFill>
+                <a:latin typeface="Arial"/>
+                <a:ea typeface="Arial"/>
+                <a:cs typeface="Arial"/>
+                <a:sym typeface="Arial"/>
+              </a:defRPr>
+            </a:lvl1pPr>
+            <a:lvl2pPr marL="914400" marR="0" lvl="1" indent="-381000" algn="l" rtl="0">
+              <a:lnSpc>
+                <a:spcPct val="100000"/>
+              </a:lnSpc>
+              <a:spcBef>
+                <a:spcPts val="480"/>
+              </a:spcBef>
+              <a:spcAft>
+                <a:spcPts val="0"/>
+              </a:spcAft>
+              <a:buClr>
+                <a:schemeClr val="accent1"/>
+              </a:buClr>
+              <a:buSzPts val="2400"/>
+              <a:buFont typeface="Arial"/>
+              <a:buChar char="–"/>
+              <a:defRPr sz="2400" b="0" i="0" u="none" strike="noStrike" cap="none">
+                <a:solidFill>
+                  <a:schemeClr val="dk2"/>
+                </a:solidFill>
+                <a:latin typeface="Arial"/>
+                <a:ea typeface="Arial"/>
+                <a:cs typeface="Arial"/>
+                <a:sym typeface="Arial"/>
+              </a:defRPr>
+            </a:lvl2pPr>
+            <a:lvl3pPr marL="1371600" marR="0" lvl="2" indent="-355600" algn="l" rtl="0">
+              <a:lnSpc>
+                <a:spcPct val="100000"/>
+              </a:lnSpc>
+              <a:spcBef>
+                <a:spcPts val="400"/>
+              </a:spcBef>
+              <a:spcAft>
+                <a:spcPts val="0"/>
+              </a:spcAft>
+              <a:buClr>
+                <a:schemeClr val="accent1"/>
+              </a:buClr>
+              <a:buSzPts val="2000"/>
+              <a:buFont typeface="Arial"/>
+              <a:buChar char="•"/>
+              <a:defRPr sz="2000" b="0" i="0" u="none" strike="noStrike" cap="none">
+                <a:solidFill>
+                  <a:schemeClr val="dk2"/>
+                </a:solidFill>
+                <a:latin typeface="Arial"/>
+                <a:ea typeface="Arial"/>
+                <a:cs typeface="Arial"/>
+                <a:sym typeface="Arial"/>
+              </a:defRPr>
+            </a:lvl3pPr>
+            <a:lvl4pPr marL="1828800" marR="0" lvl="3" indent="-342900" algn="l" rtl="0">
+              <a:lnSpc>
+                <a:spcPct val="100000"/>
+              </a:lnSpc>
+              <a:spcBef>
+                <a:spcPts val="360"/>
+              </a:spcBef>
+              <a:spcAft>
+                <a:spcPts val="0"/>
+              </a:spcAft>
+              <a:buClr>
+                <a:schemeClr val="accent1"/>
+              </a:buClr>
+              <a:buSzPts val="1800"/>
+              <a:buFont typeface="Arial"/>
+              <a:buChar char="–"/>
+              <a:defRPr sz="1800" b="0" i="0" u="none" strike="noStrike" cap="none">
+                <a:solidFill>
+                  <a:schemeClr val="dk2"/>
+                </a:solidFill>
+                <a:latin typeface="Arial"/>
+                <a:ea typeface="Arial"/>
+                <a:cs typeface="Arial"/>
+                <a:sym typeface="Arial"/>
+              </a:defRPr>
+            </a:lvl4pPr>
+            <a:lvl5pPr marL="2286000" marR="0" lvl="4" indent="-342900" algn="l" rtl="0">
+              <a:lnSpc>
+                <a:spcPct val="100000"/>
+              </a:lnSpc>
+              <a:spcBef>
+                <a:spcPts val="360"/>
+              </a:spcBef>
+              <a:spcAft>
+                <a:spcPts val="0"/>
+              </a:spcAft>
+              <a:buClr>
+                <a:schemeClr val="accent1"/>
+              </a:buClr>
+              <a:buSzPts val="1800"/>
+              <a:buFont typeface="Arial"/>
+              <a:buChar char="»"/>
+              <a:defRPr sz="1800" b="0" i="0" u="none" strike="noStrike" cap="none">
+                <a:solidFill>
+                  <a:schemeClr val="dk2"/>
+                </a:solidFill>
+                <a:latin typeface="Arial"/>
+                <a:ea typeface="Arial"/>
+                <a:cs typeface="Arial"/>
+                <a:sym typeface="Arial"/>
+              </a:defRPr>
+            </a:lvl5pPr>
+            <a:lvl6pPr marL="2743200" marR="0" lvl="5" indent="-342900" algn="l" rtl="0">
+              <a:lnSpc>
+                <a:spcPct val="100000"/>
+              </a:lnSpc>
+              <a:spcBef>
+                <a:spcPts val="360"/>
+              </a:spcBef>
+              <a:spcAft>
+                <a:spcPts val="0"/>
+              </a:spcAft>
+              <a:buClr>
+                <a:schemeClr val="dk1"/>
+              </a:buClr>
+              <a:buSzPts val="1800"/>
+              <a:buFont typeface="Arial"/>
+              <a:buChar char="•"/>
+              <a:defRPr sz="2000" b="0" i="0" u="none" strike="noStrike" cap="none">
+                <a:solidFill>
+                  <a:schemeClr val="dk1"/>
+                </a:solidFill>
+                <a:latin typeface="Arial"/>
+                <a:ea typeface="Arial"/>
+                <a:cs typeface="Arial"/>
+                <a:sym typeface="Arial"/>
+              </a:defRPr>
+            </a:lvl6pPr>
+            <a:lvl7pPr marL="3200400" marR="0" lvl="6" indent="-342900" algn="l" rtl="0">
+              <a:lnSpc>
+                <a:spcPct val="100000"/>
+              </a:lnSpc>
+              <a:spcBef>
+                <a:spcPts val="360"/>
+              </a:spcBef>
+              <a:spcAft>
+                <a:spcPts val="0"/>
+              </a:spcAft>
+              <a:buClr>
+                <a:schemeClr val="dk1"/>
+              </a:buClr>
+              <a:buSzPts val="1800"/>
+              <a:buFont typeface="Arial"/>
+              <a:buChar char="•"/>
+              <a:defRPr sz="2000" b="0" i="0" u="none" strike="noStrike" cap="none">
+                <a:solidFill>
+                  <a:schemeClr val="dk1"/>
+                </a:solidFill>
+                <a:latin typeface="Arial"/>
+                <a:ea typeface="Arial"/>
+                <a:cs typeface="Arial"/>
+                <a:sym typeface="Arial"/>
+              </a:defRPr>
+            </a:lvl7pPr>
+            <a:lvl8pPr marL="3657600" marR="0" lvl="7" indent="-342900" algn="l" rtl="0">
+              <a:lnSpc>
+                <a:spcPct val="100000"/>
+              </a:lnSpc>
+              <a:spcBef>
+                <a:spcPts val="360"/>
+              </a:spcBef>
+              <a:spcAft>
+                <a:spcPts val="0"/>
+              </a:spcAft>
+              <a:buClr>
+                <a:schemeClr val="dk1"/>
+              </a:buClr>
+              <a:buSzPts val="1800"/>
+              <a:buFont typeface="Arial"/>
+              <a:buChar char="•"/>
+              <a:defRPr sz="2000" b="0" i="0" u="none" strike="noStrike" cap="none">
+                <a:solidFill>
+                  <a:schemeClr val="dk1"/>
+                </a:solidFill>
+                <a:latin typeface="Arial"/>
+                <a:ea typeface="Arial"/>
+                <a:cs typeface="Arial"/>
+                <a:sym typeface="Arial"/>
+              </a:defRPr>
+            </a:lvl8pPr>
+            <a:lvl9pPr marL="4114800" marR="0" lvl="8" indent="-342900" algn="l" rtl="0">
+              <a:lnSpc>
+                <a:spcPct val="100000"/>
+              </a:lnSpc>
+              <a:spcBef>
+                <a:spcPts val="360"/>
+              </a:spcBef>
+              <a:spcAft>
+                <a:spcPts val="0"/>
+              </a:spcAft>
+              <a:buClr>
+                <a:schemeClr val="dk1"/>
+              </a:buClr>
+              <a:buSzPts val="1800"/>
+              <a:buFont typeface="Arial"/>
+              <a:buChar char="•"/>
+              <a:defRPr sz="2000" b="0" i="0" u="none" strike="noStrike" cap="none">
+                <a:solidFill>
+                  <a:schemeClr val="dk1"/>
+                </a:solidFill>
+                <a:latin typeface="Arial"/>
+                <a:ea typeface="Arial"/>
+                <a:cs typeface="Arial"/>
+                <a:sym typeface="Arial"/>
+              </a:defRPr>
+            </a:lvl9pPr>
+          </a:lstStyle>
+          <a:p>
+            <a:r>
+              <a:rPr lang="en-US" dirty="0"/>
+              <a:t>The Servlet API includes the classes and interfaces required to build servlets. </a:t>
+            </a:r>
+          </a:p>
+          <a:p>
+            <a:r>
+              <a:rPr lang="en-US" dirty="0"/>
+              <a:t>These interfaces and classes are represented in two packages:</a:t>
+            </a:r>
+          </a:p>
+          <a:p>
+            <a:pPr lvl="1"/>
+            <a:r>
+              <a:rPr lang="en-US" dirty="0" err="1"/>
+              <a:t>javax.servlet</a:t>
+            </a:r>
+            <a:endParaRPr lang="en-US" dirty="0"/>
+          </a:p>
+          <a:p>
+            <a:pPr lvl="1"/>
+            <a:r>
+              <a:rPr lang="en-US" dirty="0" err="1"/>
+              <a:t>javax.servlet.http</a:t>
+            </a:r>
+            <a:endParaRPr lang="en-US" dirty="0"/>
+          </a:p>
+          <a:p>
+            <a:r>
+              <a:rPr lang="en-US" dirty="0"/>
+              <a:t>The Servlet interface is the root interface of the servlet class hierarchy.</a:t>
+            </a:r>
+          </a:p>
+          <a:p>
+            <a:r>
+              <a:rPr lang="en-US" dirty="0"/>
+              <a:t>The </a:t>
+            </a:r>
+            <a:r>
+              <a:rPr lang="en-US" dirty="0" err="1"/>
+              <a:t>GenericServlet</a:t>
+            </a:r>
+            <a:r>
+              <a:rPr lang="en-US" dirty="0"/>
+              <a:t> class implements the Servlet, </a:t>
+            </a:r>
+            <a:r>
+              <a:rPr lang="en-US" dirty="0" err="1"/>
+              <a:t>ServletConfig</a:t>
+            </a:r>
+            <a:r>
+              <a:rPr lang="en-US" dirty="0"/>
+              <a:t>, and Serializable interfaces.</a:t>
+            </a:r>
+          </a:p>
+          <a:p>
+            <a:r>
+              <a:rPr lang="en-US" dirty="0"/>
+              <a:t>The </a:t>
+            </a:r>
+            <a:r>
+              <a:rPr lang="en-US" dirty="0" err="1"/>
+              <a:t>HttpServlet</a:t>
+            </a:r>
+            <a:r>
+              <a:rPr lang="en-US" dirty="0"/>
+              <a:t> class extends the Generic Servlet class, and provides methods such as </a:t>
+            </a:r>
+            <a:r>
+              <a:rPr lang="en-US" dirty="0" err="1"/>
+              <a:t>doGet</a:t>
+            </a:r>
+            <a:r>
+              <a:rPr lang="en-US" dirty="0"/>
+              <a:t>, </a:t>
+            </a:r>
+            <a:r>
+              <a:rPr lang="en-US" dirty="0" err="1"/>
+              <a:t>doPost</a:t>
+            </a:r>
+            <a:r>
+              <a:rPr lang="en-US" dirty="0"/>
+              <a:t>, </a:t>
+            </a:r>
+            <a:r>
+              <a:rPr lang="en-US" dirty="0" err="1"/>
+              <a:t>doDelete</a:t>
+            </a:r>
+            <a:r>
+              <a:rPr lang="en-US" dirty="0"/>
+              <a:t>, </a:t>
+            </a:r>
+            <a:r>
+              <a:rPr lang="en-US" dirty="0" err="1"/>
+              <a:t>etc</a:t>
+            </a:r>
+            <a:r>
+              <a:rPr lang="en-US" dirty="0"/>
+              <a:t>…</a:t>
+            </a:r>
+          </a:p>
+          <a:p>
+            <a:r>
+              <a:rPr lang="en-US" dirty="0"/>
+              <a:t>User-defined servlets can be created by implementing the Servlet interface or extending the </a:t>
+            </a:r>
+            <a:r>
+              <a:rPr lang="en-US" dirty="0" err="1"/>
+              <a:t>GenericServlet</a:t>
+            </a:r>
+            <a:r>
+              <a:rPr lang="en-US" dirty="0"/>
+              <a:t> class; however, it is most common to extend the </a:t>
+            </a:r>
+            <a:r>
+              <a:rPr lang="en-US" dirty="0" err="1"/>
+              <a:t>HttpServlet</a:t>
+            </a:r>
+            <a:r>
+              <a:rPr lang="en-US" dirty="0"/>
+              <a:t> class.</a:t>
+            </a:r>
+          </a:p>
+        </p:txBody>
+      </p:sp>
+    </p:spTree>
+    <p:extLst>
+      <p:ext uri="{BB962C8B-B14F-4D97-AF65-F5344CB8AC3E}">
+        <p14:creationId xmlns:p14="http://schemas.microsoft.com/office/powerpoint/2010/main" val="642593471"/>
+      </p:ext>
+    </p:extLst>
+  </p:cSld>
+  <p:clrMapOvr>
+    <a:masterClrMapping/>
+  </p:clrMapOvr>
+</p:sld>
+</file>
+
+<file path=ppt/slides/slide7.xml><?xml version="1.0" encoding="utf-8"?>
+<p:sld xmlns:a="http://schemas.openxmlformats.org/drawingml/2006/main" xmlns:r="http://schemas.openxmlformats.org/officeDocument/2006/relationships" xmlns:p="http://schemas.openxmlformats.org/presentationml/2006/main">
+  <p:cSld>
+    <p:spTree>
+      <p:nvGrpSpPr>
+        <p:cNvPr id="1" name=""/>
+        <p:cNvGrpSpPr/>
+        <p:nvPr/>
+      </p:nvGrpSpPr>
+      <p:grpSpPr>
+        <a:xfrm>
+          <a:off x="0" y="0"/>
+          <a:ext cx="0" cy="0"/>
+          <a:chOff x="0" y="0"/>
+          <a:chExt cx="0" cy="0"/>
+        </a:xfrm>
+      </p:grpSpPr>
+      <p:sp>
+        <p:nvSpPr>
+          <p:cNvPr id="2" name="Title 1"/>
+          <p:cNvSpPr>
+            <a:spLocks noGrp="1"/>
+          </p:cNvSpPr>
+          <p:nvPr>
+            <p:ph type="title"/>
+          </p:nvPr>
+        </p:nvSpPr>
+        <p:spPr/>
+        <p:txBody>
+          <a:bodyPr/>
+          <a:lstStyle/>
+          <a:p>
+            <a:r>
+              <a:rPr lang="en-US" dirty="0"/>
+              <a:t>Servlet API</a:t>
+            </a:r>
+          </a:p>
+        </p:txBody>
+      </p:sp>
+      <p:sp>
+        <p:nvSpPr>
+          <p:cNvPr id="4" name="Slide Number Placeholder 3"/>
+          <p:cNvSpPr>
+            <a:spLocks noGrp="1"/>
+          </p:cNvSpPr>
+          <p:nvPr>
+            <p:ph type="sldNum" sz="quarter" idx="12"/>
+          </p:nvPr>
+        </p:nvSpPr>
+        <p:spPr/>
+        <p:txBody>
+          <a:bodyPr/>
+          <a:lstStyle/>
+          <a:p>
+            <a:fld id="{F6728BC2-ACA3-447C-A909-F3F49211C066}" type="slidenum">
+              <a:rPr lang="en-US" smtClean="0"/>
+              <a:pPr/>
+              <a:t>6</a:t>
+            </a:fld>
+            <a:endParaRPr lang="en-US" dirty="0"/>
+          </a:p>
+        </p:txBody>
+      </p:sp>
+      <p:pic>
+        <p:nvPicPr>
+          <p:cNvPr id="5" name="Picture 2" descr="Image preview">
+            <a:extLst>
+              <a:ext uri="{FF2B5EF4-FFF2-40B4-BE49-F238E27FC236}">
+                <a16:creationId xmlns:a16="http://schemas.microsoft.com/office/drawing/2014/main" id="{24714325-B925-4924-8B50-75A124171D71}"/>
+              </a:ext>
+            </a:extLst>
+          </p:cNvPr>
+          <p:cNvPicPr>
+            <a:picLocks noChangeAspect="1" noChangeArrowheads="1"/>
+          </p:cNvPicPr>
+          <p:nvPr/>
+        </p:nvPicPr>
+        <p:blipFill>
+          <a:blip r:embed="rId2">
+            <a:extLst>
+              <a:ext uri="{28A0092B-C50C-407E-A947-70E740481C1C}">
+                <a14:useLocalDpi xmlns:a14="http://schemas.microsoft.com/office/drawing/2010/main" val="0"/>
+              </a:ext>
+            </a:extLst>
+          </a:blip>
+          <a:srcRect/>
+          <a:stretch>
+            <a:fillRect/>
+          </a:stretch>
+        </p:blipFill>
+        <p:spPr bwMode="auto">
+          <a:xfrm>
+            <a:off x="1249224" y="1219200"/>
+            <a:ext cx="6645552" cy="5451676"/>
+          </a:xfrm>
+          <a:prstGeom prst="rect">
+            <a:avLst/>
+          </a:prstGeom>
+          <a:noFill/>
+          <a:extLst>
+            <a:ext uri="{909E8E84-426E-40DD-AFC4-6F175D3DCCD1}">
+              <a14:hiddenFill xmlns:a14="http://schemas.microsoft.com/office/drawing/2010/main">
+                <a:solidFill>
+                  <a:srgbClr val="FFFFFF"/>
+                </a:solidFill>
+              </a14:hiddenFill>
+            </a:ext>
+          </a:extLst>
+        </p:spPr>
+      </p:pic>
+    </p:spTree>
+    <p:extLst>
+      <p:ext uri="{BB962C8B-B14F-4D97-AF65-F5344CB8AC3E}">
+        <p14:creationId xmlns:p14="http://schemas.microsoft.com/office/powerpoint/2010/main" val="613592757"/>
+      </p:ext>
+    </p:extLst>
+  </p:cSld>
+  <p:clrMapOvr>
+    <a:masterClrMapping/>
+  </p:clrMapOvr>
+</p:sld>
+</file>
+
+<file path=ppt/slides/slide8.xml><?xml version="1.0" encoding="utf-8"?>
+<p:sld xmlns:a="http://schemas.openxmlformats.org/drawingml/2006/main" xmlns:r="http://schemas.openxmlformats.org/officeDocument/2006/relationships" xmlns:p="http://schemas.openxmlformats.org/presentationml/2006/main">
+  <p:cSld>
+    <p:spTree>
+      <p:nvGrpSpPr>
+        <p:cNvPr id="1" name=""/>
+        <p:cNvGrpSpPr/>
+        <p:nvPr/>
+      </p:nvGrpSpPr>
+      <p:grpSpPr>
+        <a:xfrm>
+          <a:off x="0" y="0"/>
+          <a:ext cx="0" cy="0"/>
+          <a:chOff x="0" y="0"/>
+          <a:chExt cx="0" cy="0"/>
+        </a:xfrm>
+      </p:grpSpPr>
+      <p:sp>
+        <p:nvSpPr>
+          <p:cNvPr id="2" name="Title 1"/>
+          <p:cNvSpPr>
+            <a:spLocks noGrp="1"/>
+          </p:cNvSpPr>
+          <p:nvPr>
+            <p:ph type="title"/>
+          </p:nvPr>
+        </p:nvSpPr>
+        <p:spPr/>
+        <p:txBody>
+          <a:bodyPr/>
+          <a:lstStyle/>
+          <a:p>
+            <a:r>
+              <a:rPr lang="en-US" dirty="0"/>
+              <a:t>Deployment Descriptor</a:t>
+            </a:r>
+          </a:p>
+        </p:txBody>
+      </p:sp>
+      <p:sp>
+        <p:nvSpPr>
+          <p:cNvPr id="4" name="Slide Number Placeholder 3"/>
+          <p:cNvSpPr>
+            <a:spLocks noGrp="1"/>
+          </p:cNvSpPr>
+          <p:nvPr>
+            <p:ph type="sldNum" sz="quarter" idx="12"/>
+          </p:nvPr>
+        </p:nvSpPr>
+        <p:spPr/>
+        <p:txBody>
+          <a:bodyPr/>
+          <a:lstStyle/>
+          <a:p>
+            <a:fld id="{F6728BC2-ACA3-447C-A909-F3F49211C066}" type="slidenum">
+              <a:rPr lang="en-US" smtClean="0"/>
+              <a:pPr/>
+              <a:t>7</a:t>
+            </a:fld>
+            <a:endParaRPr lang="en-US" dirty="0"/>
+          </a:p>
+        </p:txBody>
+      </p:sp>
+      <p:sp>
+        <p:nvSpPr>
+          <p:cNvPr id="8" name="Content Placeholder 2">
+            <a:extLst>
+              <a:ext uri="{FF2B5EF4-FFF2-40B4-BE49-F238E27FC236}">
+                <a16:creationId xmlns:a16="http://schemas.microsoft.com/office/drawing/2014/main" id="{D8001D8B-394A-4B27-AFF3-9042F05DA158}"/>
+              </a:ext>
+            </a:extLst>
+          </p:cNvPr>
+          <p:cNvSpPr txBox="1">
+            <a:spLocks/>
+          </p:cNvSpPr>
+          <p:nvPr/>
+        </p:nvSpPr>
+        <p:spPr>
+          <a:xfrm>
+            <a:off x="640579" y="1338469"/>
+            <a:ext cx="7862842" cy="5168049"/>
+          </a:xfrm>
+          <a:prstGeom prst="rect">
+            <a:avLst/>
+          </a:prstGeom>
+          <a:noFill/>
+          <a:ln>
+            <a:noFill/>
+          </a:ln>
+        </p:spPr>
+        <p:txBody>
+          <a:bodyPr spcFirstLastPara="1" wrap="square" lIns="91425" tIns="45700" rIns="91425" bIns="45700" anchor="t" anchorCtr="0">
+            <a:normAutofit fontScale="77500" lnSpcReduction="20000"/>
+          </a:bodyPr>
+          <a:lstStyle>
+            <a:defPPr marR="0" lvl="0" algn="l" rtl="0">
+              <a:lnSpc>
+                <a:spcPct val="100000"/>
+              </a:lnSpc>
+              <a:spcBef>
+                <a:spcPts val="0"/>
+              </a:spcBef>
+              <a:spcAft>
+                <a:spcPts val="0"/>
+              </a:spcAft>
+            </a:defPPr>
+            <a:lvl1pPr marL="457200" marR="0" lvl="0" indent="-406400" algn="l" rtl="0">
+              <a:lnSpc>
+                <a:spcPct val="100000"/>
+              </a:lnSpc>
+              <a:spcBef>
+                <a:spcPts val="560"/>
+              </a:spcBef>
+              <a:spcAft>
+                <a:spcPts val="0"/>
+              </a:spcAft>
+              <a:buClr>
+                <a:schemeClr val="accent1"/>
+              </a:buClr>
+              <a:buSzPts val="2800"/>
+              <a:buFont typeface="Arial"/>
+              <a:buChar char="•"/>
+              <a:defRPr sz="2800" b="0" i="0" u="none" strike="noStrike" cap="none">
+                <a:solidFill>
+                  <a:schemeClr val="dk2"/>
+                </a:solidFill>
+                <a:latin typeface="Arial"/>
+                <a:ea typeface="Arial"/>
+                <a:cs typeface="Arial"/>
+                <a:sym typeface="Arial"/>
+              </a:defRPr>
+            </a:lvl1pPr>
+            <a:lvl2pPr marL="914400" marR="0" lvl="1" indent="-381000" algn="l" rtl="0">
+              <a:lnSpc>
+                <a:spcPct val="100000"/>
+              </a:lnSpc>
+              <a:spcBef>
+                <a:spcPts val="480"/>
+              </a:spcBef>
+              <a:spcAft>
+                <a:spcPts val="0"/>
+              </a:spcAft>
+              <a:buClr>
+                <a:schemeClr val="accent1"/>
+              </a:buClr>
+              <a:buSzPts val="2400"/>
+              <a:buFont typeface="Arial"/>
+              <a:buChar char="–"/>
+              <a:defRPr sz="2400" b="0" i="0" u="none" strike="noStrike" cap="none">
+                <a:solidFill>
+                  <a:schemeClr val="dk2"/>
+                </a:solidFill>
+                <a:latin typeface="Arial"/>
+                <a:ea typeface="Arial"/>
+                <a:cs typeface="Arial"/>
+                <a:sym typeface="Arial"/>
+              </a:defRPr>
+            </a:lvl2pPr>
+            <a:lvl3pPr marL="1371600" marR="0" lvl="2" indent="-355600" algn="l" rtl="0">
+              <a:lnSpc>
+                <a:spcPct val="100000"/>
+              </a:lnSpc>
+              <a:spcBef>
+                <a:spcPts val="400"/>
+              </a:spcBef>
+              <a:spcAft>
+                <a:spcPts val="0"/>
+              </a:spcAft>
+              <a:buClr>
+                <a:schemeClr val="accent1"/>
+              </a:buClr>
+              <a:buSzPts val="2000"/>
+              <a:buFont typeface="Arial"/>
+              <a:buChar char="•"/>
+              <a:defRPr sz="2000" b="0" i="0" u="none" strike="noStrike" cap="none">
+                <a:solidFill>
+                  <a:schemeClr val="dk2"/>
+                </a:solidFill>
+                <a:latin typeface="Arial"/>
+                <a:ea typeface="Arial"/>
+                <a:cs typeface="Arial"/>
+                <a:sym typeface="Arial"/>
+              </a:defRPr>
+            </a:lvl3pPr>
+            <a:lvl4pPr marL="1828800" marR="0" lvl="3" indent="-342900" algn="l" rtl="0">
+              <a:lnSpc>
+                <a:spcPct val="100000"/>
+              </a:lnSpc>
+              <a:spcBef>
+                <a:spcPts val="360"/>
+              </a:spcBef>
+              <a:spcAft>
+                <a:spcPts val="0"/>
+              </a:spcAft>
+              <a:buClr>
+                <a:schemeClr val="accent1"/>
+              </a:buClr>
+              <a:buSzPts val="1800"/>
+              <a:buFont typeface="Arial"/>
+              <a:buChar char="–"/>
+              <a:defRPr sz="1800" b="0" i="0" u="none" strike="noStrike" cap="none">
+                <a:solidFill>
+                  <a:schemeClr val="dk2"/>
+                </a:solidFill>
+                <a:latin typeface="Arial"/>
+                <a:ea typeface="Arial"/>
+                <a:cs typeface="Arial"/>
+                <a:sym typeface="Arial"/>
+              </a:defRPr>
+            </a:lvl4pPr>
+            <a:lvl5pPr marL="2286000" marR="0" lvl="4" indent="-342900" algn="l" rtl="0">
+              <a:lnSpc>
+                <a:spcPct val="100000"/>
+              </a:lnSpc>
+              <a:spcBef>
+                <a:spcPts val="360"/>
+              </a:spcBef>
+              <a:spcAft>
+                <a:spcPts val="0"/>
+              </a:spcAft>
+              <a:buClr>
+                <a:schemeClr val="accent1"/>
+              </a:buClr>
+              <a:buSzPts val="1800"/>
+              <a:buFont typeface="Arial"/>
+              <a:buChar char="»"/>
+              <a:defRPr sz="1800" b="0" i="0" u="none" strike="noStrike" cap="none">
+                <a:solidFill>
+                  <a:schemeClr val="dk2"/>
+                </a:solidFill>
+                <a:latin typeface="Arial"/>
+                <a:ea typeface="Arial"/>
+                <a:cs typeface="Arial"/>
+                <a:sym typeface="Arial"/>
+              </a:defRPr>
+            </a:lvl5pPr>
+            <a:lvl6pPr marL="2743200" marR="0" lvl="5" indent="-342900" algn="l" rtl="0">
+              <a:lnSpc>
+                <a:spcPct val="100000"/>
+              </a:lnSpc>
+              <a:spcBef>
+                <a:spcPts val="360"/>
+              </a:spcBef>
+              <a:spcAft>
+                <a:spcPts val="0"/>
+              </a:spcAft>
+              <a:buClr>
+                <a:schemeClr val="dk1"/>
+              </a:buClr>
+              <a:buSzPts val="1800"/>
+              <a:buFont typeface="Arial"/>
+              <a:buChar char="•"/>
+              <a:defRPr sz="2000" b="0" i="0" u="none" strike="noStrike" cap="none">
+                <a:solidFill>
+                  <a:schemeClr val="dk1"/>
+                </a:solidFill>
+                <a:latin typeface="Arial"/>
+                <a:ea typeface="Arial"/>
+                <a:cs typeface="Arial"/>
+                <a:sym typeface="Arial"/>
+              </a:defRPr>
+            </a:lvl6pPr>
+            <a:lvl7pPr marL="3200400" marR="0" lvl="6" indent="-342900" algn="l" rtl="0">
+              <a:lnSpc>
+                <a:spcPct val="100000"/>
+              </a:lnSpc>
+              <a:spcBef>
+                <a:spcPts val="360"/>
+              </a:spcBef>
+              <a:spcAft>
+                <a:spcPts val="0"/>
+              </a:spcAft>
+              <a:buClr>
+                <a:schemeClr val="dk1"/>
+              </a:buClr>
+              <a:buSzPts val="1800"/>
+              <a:buFont typeface="Arial"/>
+              <a:buChar char="•"/>
+              <a:defRPr sz="2000" b="0" i="0" u="none" strike="noStrike" cap="none">
+                <a:solidFill>
+                  <a:schemeClr val="dk1"/>
+                </a:solidFill>
+                <a:latin typeface="Arial"/>
+                <a:ea typeface="Arial"/>
+                <a:cs typeface="Arial"/>
+                <a:sym typeface="Arial"/>
+              </a:defRPr>
+            </a:lvl7pPr>
+            <a:lvl8pPr marL="3657600" marR="0" lvl="7" indent="-342900" algn="l" rtl="0">
+              <a:lnSpc>
+                <a:spcPct val="100000"/>
+              </a:lnSpc>
+              <a:spcBef>
+                <a:spcPts val="360"/>
+              </a:spcBef>
+              <a:spcAft>
+                <a:spcPts val="0"/>
+              </a:spcAft>
+              <a:buClr>
+                <a:schemeClr val="dk1"/>
+              </a:buClr>
+              <a:buSzPts val="1800"/>
+              <a:buFont typeface="Arial"/>
+              <a:buChar char="•"/>
+              <a:defRPr sz="2000" b="0" i="0" u="none" strike="noStrike" cap="none">
+                <a:solidFill>
+                  <a:schemeClr val="dk1"/>
+                </a:solidFill>
+                <a:latin typeface="Arial"/>
+                <a:ea typeface="Arial"/>
+                <a:cs typeface="Arial"/>
+                <a:sym typeface="Arial"/>
+              </a:defRPr>
+            </a:lvl8pPr>
+            <a:lvl9pPr marL="4114800" marR="0" lvl="8" indent="-342900" algn="l" rtl="0">
+              <a:lnSpc>
+                <a:spcPct val="100000"/>
+              </a:lnSpc>
+              <a:spcBef>
+                <a:spcPts val="360"/>
+              </a:spcBef>
+              <a:spcAft>
+                <a:spcPts val="0"/>
+              </a:spcAft>
+              <a:buClr>
+                <a:schemeClr val="dk1"/>
+              </a:buClr>
+              <a:buSzPts val="1800"/>
+              <a:buFont typeface="Arial"/>
+              <a:buChar char="•"/>
+              <a:defRPr sz="2000" b="0" i="0" u="none" strike="noStrike" cap="none">
+                <a:solidFill>
+                  <a:schemeClr val="dk1"/>
+                </a:solidFill>
+                <a:latin typeface="Arial"/>
+                <a:ea typeface="Arial"/>
+                <a:cs typeface="Arial"/>
+                <a:sym typeface="Arial"/>
+              </a:defRPr>
+            </a:lvl9pPr>
+          </a:lstStyle>
+          <a:p>
+            <a:r>
+              <a:rPr lang="en-US" dirty="0"/>
+              <a:t>Java web applications use a deployment descriptor file to define the </a:t>
+            </a:r>
+            <a:r>
+              <a:rPr lang="en-US" dirty="0" err="1"/>
+              <a:t>urls</a:t>
+            </a:r>
+            <a:r>
+              <a:rPr lang="en-US" dirty="0"/>
+              <a:t> that map to servlets, and determine which URLs require authentication and/or additional information.</a:t>
+            </a:r>
+          </a:p>
+          <a:p>
+            <a:r>
+              <a:rPr lang="en-US" dirty="0"/>
+              <a:t>Deployment descriptor files specify the classes, resources and configurations for the application and how the web server uses them to serve HTTP requests.</a:t>
+            </a:r>
+          </a:p>
+          <a:p>
+            <a:r>
+              <a:rPr lang="en-US" dirty="0"/>
+              <a:t>For Servlets, the deployment descriptor is a file called web.xml and resides within the application’s WEB-INF directory</a:t>
+            </a:r>
+          </a:p>
+          <a:p>
+            <a:r>
+              <a:rPr lang="en-US" dirty="0"/>
+              <a:t>The web.xml defines mappings between URL paths and servlets that will handle requests.</a:t>
+            </a:r>
+          </a:p>
+          <a:p>
+            <a:r>
+              <a:rPr lang="en-US" dirty="0"/>
+              <a:t>The application server uses this configuration to find the servlet that handles a given request and calls the servlet methods that correspond to the HTTP request method used.</a:t>
+            </a:r>
+          </a:p>
+        </p:txBody>
+      </p:sp>
+    </p:spTree>
+    <p:extLst>
+      <p:ext uri="{BB962C8B-B14F-4D97-AF65-F5344CB8AC3E}">
+        <p14:creationId xmlns:p14="http://schemas.microsoft.com/office/powerpoint/2010/main" val="3556268449"/>
+      </p:ext>
+    </p:extLst>
+  </p:cSld>
+  <p:clrMapOvr>
+    <a:masterClrMapping/>
+  </p:clrMapOvr>
+</p:sld>
+</file>
+
+<file path=ppt/slides/slide9.xml><?xml version="1.0" encoding="utf-8"?>
+<p:sld xmlns:a="http://schemas.openxmlformats.org/drawingml/2006/main" xmlns:r="http://schemas.openxmlformats.org/officeDocument/2006/relationships" xmlns:p="http://schemas.openxmlformats.org/presentationml/2006/main">
+  <p:cSld>
+    <p:spTree>
+      <p:nvGrpSpPr>
+        <p:cNvPr id="1" name=""/>
+        <p:cNvGrpSpPr/>
+        <p:nvPr/>
+      </p:nvGrpSpPr>
+      <p:grpSpPr>
+        <a:xfrm>
+          <a:off x="0" y="0"/>
+          <a:ext cx="0" cy="0"/>
+          <a:chOff x="0" y="0"/>
+          <a:chExt cx="0" cy="0"/>
+        </a:xfrm>
+      </p:grpSpPr>
+      <p:sp>
+        <p:nvSpPr>
+          <p:cNvPr id="2" name="Title 1"/>
+          <p:cNvSpPr>
+            <a:spLocks noGrp="1"/>
+          </p:cNvSpPr>
+          <p:nvPr>
+            <p:ph type="title"/>
+          </p:nvPr>
+        </p:nvSpPr>
+        <p:spPr/>
+        <p:txBody>
+          <a:bodyPr/>
+          <a:lstStyle/>
+          <a:p>
+            <a:r>
+              <a:rPr lang="en-US" dirty="0"/>
+              <a:t>Servlet Mapping</a:t>
+            </a:r>
+          </a:p>
+        </p:txBody>
+      </p:sp>
+      <p:sp>
+        <p:nvSpPr>
+          <p:cNvPr id="4" name="Slide Number Placeholder 3"/>
+          <p:cNvSpPr>
+            <a:spLocks noGrp="1"/>
+          </p:cNvSpPr>
+          <p:nvPr>
+            <p:ph type="sldNum" sz="quarter" idx="12"/>
+          </p:nvPr>
+        </p:nvSpPr>
+        <p:spPr/>
+        <p:txBody>
+          <a:bodyPr/>
+          <a:lstStyle/>
+          <a:p>
+            <a:fld id="{F6728BC2-ACA3-447C-A909-F3F49211C066}" type="slidenum">
+              <a:rPr lang="en-US" smtClean="0"/>
+              <a:pPr/>
+              <a:t>8</a:t>
+            </a:fld>
+            <a:endParaRPr lang="en-US" dirty="0"/>
+          </a:p>
+        </p:txBody>
+      </p:sp>
+      <p:sp>
+        <p:nvSpPr>
+          <p:cNvPr id="8" name="Content Placeholder 2">
+            <a:extLst>
+              <a:ext uri="{FF2B5EF4-FFF2-40B4-BE49-F238E27FC236}">
+                <a16:creationId xmlns:a16="http://schemas.microsoft.com/office/drawing/2014/main" id="{D8001D8B-394A-4B27-AFF3-9042F05DA158}"/>
+              </a:ext>
+            </a:extLst>
+          </p:cNvPr>
+          <p:cNvSpPr txBox="1">
+            <a:spLocks/>
+          </p:cNvSpPr>
+          <p:nvPr/>
+        </p:nvSpPr>
+        <p:spPr>
+          <a:xfrm>
+            <a:off x="640579" y="1338469"/>
+            <a:ext cx="7862842" cy="5168049"/>
+          </a:xfrm>
+          <a:prstGeom prst="rect">
+            <a:avLst/>
+          </a:prstGeom>
+          <a:noFill/>
+          <a:ln>
+            <a:noFill/>
+          </a:ln>
+        </p:spPr>
+        <p:txBody>
+          <a:bodyPr spcFirstLastPara="1" wrap="square" lIns="91425" tIns="45700" rIns="91425" bIns="45700" anchor="t" anchorCtr="0">
+            <a:normAutofit fontScale="85000" lnSpcReduction="20000"/>
+          </a:bodyPr>
+          <a:lstStyle>
+            <a:defPPr marR="0" lvl="0" algn="l" rtl="0">
+              <a:lnSpc>
+                <a:spcPct val="100000"/>
+              </a:lnSpc>
+              <a:spcBef>
+                <a:spcPts val="0"/>
+              </a:spcBef>
+              <a:spcAft>
+                <a:spcPts val="0"/>
+              </a:spcAft>
+            </a:defPPr>
+            <a:lvl1pPr marL="457200" marR="0" lvl="0" indent="-406400" algn="l" rtl="0">
+              <a:lnSpc>
+                <a:spcPct val="100000"/>
+              </a:lnSpc>
+              <a:spcBef>
+                <a:spcPts val="560"/>
+              </a:spcBef>
+              <a:spcAft>
+                <a:spcPts val="0"/>
+              </a:spcAft>
+              <a:buClr>
+                <a:schemeClr val="accent1"/>
+              </a:buClr>
+              <a:buSzPts val="2800"/>
+              <a:buFont typeface="Arial"/>
+              <a:buChar char="•"/>
+              <a:defRPr sz="2800" b="0" i="0" u="none" strike="noStrike" cap="none">
+                <a:solidFill>
+                  <a:schemeClr val="dk2"/>
+                </a:solidFill>
+                <a:latin typeface="Arial"/>
+                <a:ea typeface="Arial"/>
+                <a:cs typeface="Arial"/>
+                <a:sym typeface="Arial"/>
+              </a:defRPr>
+            </a:lvl1pPr>
+            <a:lvl2pPr marL="914400" marR="0" lvl="1" indent="-381000" algn="l" rtl="0">
+              <a:lnSpc>
+                <a:spcPct val="100000"/>
+              </a:lnSpc>
+              <a:spcBef>
+                <a:spcPts val="480"/>
+              </a:spcBef>
+              <a:spcAft>
+                <a:spcPts val="0"/>
+              </a:spcAft>
+              <a:buClr>
+                <a:schemeClr val="accent1"/>
+              </a:buClr>
+              <a:buSzPts val="2400"/>
+              <a:buFont typeface="Arial"/>
+              <a:buChar char="–"/>
+              <a:defRPr sz="2400" b="0" i="0" u="none" strike="noStrike" cap="none">
+                <a:solidFill>
+                  <a:schemeClr val="dk2"/>
+                </a:solidFill>
+                <a:latin typeface="Arial"/>
+                <a:ea typeface="Arial"/>
+                <a:cs typeface="Arial"/>
+                <a:sym typeface="Arial"/>
+              </a:defRPr>
+            </a:lvl2pPr>
+            <a:lvl3pPr marL="1371600" marR="0" lvl="2" indent="-355600" algn="l" rtl="0">
+              <a:lnSpc>
+                <a:spcPct val="100000"/>
+              </a:lnSpc>
+              <a:spcBef>
+                <a:spcPts val="400"/>
+              </a:spcBef>
+              <a:spcAft>
+                <a:spcPts val="0"/>
+              </a:spcAft>
+              <a:buClr>
+                <a:schemeClr val="accent1"/>
+              </a:buClr>
+              <a:buSzPts val="2000"/>
+              <a:buFont typeface="Arial"/>
+              <a:buChar char="•"/>
+              <a:defRPr sz="2000" b="0" i="0" u="none" strike="noStrike" cap="none">
+                <a:solidFill>
+                  <a:schemeClr val="dk2"/>
+                </a:solidFill>
+                <a:latin typeface="Arial"/>
+                <a:ea typeface="Arial"/>
+                <a:cs typeface="Arial"/>
+                <a:sym typeface="Arial"/>
+              </a:defRPr>
+            </a:lvl3pPr>
+            <a:lvl4pPr marL="1828800" marR="0" lvl="3" indent="-342900" algn="l" rtl="0">
+              <a:lnSpc>
+                <a:spcPct val="100000"/>
+              </a:lnSpc>
+              <a:spcBef>
+                <a:spcPts val="360"/>
+              </a:spcBef>
+              <a:spcAft>
+                <a:spcPts val="0"/>
+              </a:spcAft>
+              <a:buClr>
+                <a:schemeClr val="accent1"/>
+              </a:buClr>
+              <a:buSzPts val="1800"/>
+              <a:buFont typeface="Arial"/>
+              <a:buChar char="–"/>
+              <a:defRPr sz="1800" b="0" i="0" u="none" strike="noStrike" cap="none">
+                <a:solidFill>
+                  <a:schemeClr val="dk2"/>
+                </a:solidFill>
+                <a:latin typeface="Arial"/>
+                <a:ea typeface="Arial"/>
+                <a:cs typeface="Arial"/>
+                <a:sym typeface="Arial"/>
+              </a:defRPr>
+            </a:lvl4pPr>
+            <a:lvl5pPr marL="2286000" marR="0" lvl="4" indent="-342900" algn="l" rtl="0">
+              <a:lnSpc>
+                <a:spcPct val="100000"/>
+              </a:lnSpc>
+              <a:spcBef>
+                <a:spcPts val="360"/>
+              </a:spcBef>
+              <a:spcAft>
+                <a:spcPts val="0"/>
+              </a:spcAft>
+              <a:buClr>
+                <a:schemeClr val="accent1"/>
+              </a:buClr>
+              <a:buSzPts val="1800"/>
+              <a:buFont typeface="Arial"/>
+              <a:buChar char="»"/>
+              <a:defRPr sz="1800" b="0" i="0" u="none" strike="noStrike" cap="none">
+                <a:solidFill>
+                  <a:schemeClr val="dk2"/>
+                </a:solidFill>
+                <a:latin typeface="Arial"/>
+                <a:ea typeface="Arial"/>
+                <a:cs typeface="Arial"/>
+                <a:sym typeface="Arial"/>
+              </a:defRPr>
+            </a:lvl5pPr>
+            <a:lvl6pPr marL="2743200" marR="0" lvl="5" indent="-342900" algn="l" rtl="0">
+              <a:lnSpc>
+                <a:spcPct val="100000"/>
+              </a:lnSpc>
+              <a:spcBef>
+                <a:spcPts val="360"/>
+              </a:spcBef>
+              <a:spcAft>
+                <a:spcPts val="0"/>
+              </a:spcAft>
+              <a:buClr>
+                <a:schemeClr val="dk1"/>
+              </a:buClr>
+              <a:buSzPts val="1800"/>
+              <a:buFont typeface="Arial"/>
+              <a:buChar char="•"/>
+              <a:defRPr sz="2000" b="0" i="0" u="none" strike="noStrike" cap="none">
+                <a:solidFill>
+                  <a:schemeClr val="dk1"/>
+                </a:solidFill>
+                <a:latin typeface="Arial"/>
+                <a:ea typeface="Arial"/>
+                <a:cs typeface="Arial"/>
+                <a:sym typeface="Arial"/>
+              </a:defRPr>
+            </a:lvl6pPr>
+            <a:lvl7pPr marL="3200400" marR="0" lvl="6" indent="-342900" algn="l" rtl="0">
+              <a:lnSpc>
+                <a:spcPct val="100000"/>
+              </a:lnSpc>
+              <a:spcBef>
+                <a:spcPts val="360"/>
+              </a:spcBef>
+              <a:spcAft>
+                <a:spcPts val="0"/>
+              </a:spcAft>
+              <a:buClr>
+                <a:schemeClr val="dk1"/>
+              </a:buClr>
+              <a:buSzPts val="1800"/>
+              <a:buFont typeface="Arial"/>
+              <a:buChar char="•"/>
+              <a:defRPr sz="2000" b="0" i="0" u="none" strike="noStrike" cap="none">
+                <a:solidFill>
+                  <a:schemeClr val="dk1"/>
+                </a:solidFill>
+                <a:latin typeface="Arial"/>
+                <a:ea typeface="Arial"/>
+                <a:cs typeface="Arial"/>
+                <a:sym typeface="Arial"/>
+              </a:defRPr>
+            </a:lvl7pPr>
+            <a:lvl8pPr marL="3657600" marR="0" lvl="7" indent="-342900" algn="l" rtl="0">
+              <a:lnSpc>
+                <a:spcPct val="100000"/>
+              </a:lnSpc>
+              <a:spcBef>
+                <a:spcPts val="360"/>
+              </a:spcBef>
+              <a:spcAft>
+                <a:spcPts val="0"/>
+              </a:spcAft>
+              <a:buClr>
+                <a:schemeClr val="dk1"/>
+              </a:buClr>
+              <a:buSzPts val="1800"/>
+              <a:buFont typeface="Arial"/>
+              <a:buChar char="•"/>
+              <a:defRPr sz="2000" b="0" i="0" u="none" strike="noStrike" cap="none">
+                <a:solidFill>
+                  <a:schemeClr val="dk1"/>
+                </a:solidFill>
+                <a:latin typeface="Arial"/>
+                <a:ea typeface="Arial"/>
+                <a:cs typeface="Arial"/>
+                <a:sym typeface="Arial"/>
+              </a:defRPr>
+            </a:lvl8pPr>
+            <a:lvl9pPr marL="4114800" marR="0" lvl="8" indent="-342900" algn="l" rtl="0">
+              <a:lnSpc>
+                <a:spcPct val="100000"/>
+              </a:lnSpc>
+              <a:spcBef>
+                <a:spcPts val="360"/>
+              </a:spcBef>
+              <a:spcAft>
+                <a:spcPts val="0"/>
+              </a:spcAft>
+              <a:buClr>
+                <a:schemeClr val="dk1"/>
+              </a:buClr>
+              <a:buSzPts val="1800"/>
+              <a:buFont typeface="Arial"/>
+              <a:buChar char="•"/>
+              <a:defRPr sz="2000" b="0" i="0" u="none" strike="noStrike" cap="none">
+                <a:solidFill>
+                  <a:schemeClr val="dk1"/>
+                </a:solidFill>
+                <a:latin typeface="Arial"/>
+                <a:ea typeface="Arial"/>
+                <a:cs typeface="Arial"/>
+                <a:sym typeface="Arial"/>
+              </a:defRPr>
+            </a:lvl9pPr>
+          </a:lstStyle>
+          <a:p>
+            <a:r>
+              <a:rPr lang="en-US" dirty="0"/>
+              <a:t>Servlets are configured within the Web.xml using the </a:t>
+            </a:r>
+            <a:r>
+              <a:rPr lang="en-US" dirty="0">
+                <a:latin typeface="Courier New" panose="02070309020205020404" pitchFamily="49" charset="0"/>
+                <a:cs typeface="Courier New" panose="02070309020205020404" pitchFamily="49" charset="0"/>
+              </a:rPr>
+              <a:t>&lt;servlet&gt; </a:t>
+            </a:r>
+            <a:r>
+              <a:rPr lang="en-US" dirty="0"/>
+              <a:t>element.</a:t>
+            </a:r>
+          </a:p>
+          <a:p>
+            <a:pPr lvl="1"/>
+            <a:r>
+              <a:rPr lang="en-US" dirty="0"/>
+              <a:t>Servlet elements should include a nested </a:t>
+            </a:r>
+            <a:r>
+              <a:rPr lang="en-US" dirty="0">
+                <a:latin typeface="Courier New" panose="02070309020205020404" pitchFamily="49" charset="0"/>
+                <a:cs typeface="Courier New" panose="02070309020205020404" pitchFamily="49" charset="0"/>
+              </a:rPr>
+              <a:t>&lt;servlet-name&gt;</a:t>
+            </a:r>
+            <a:r>
+              <a:rPr lang="en-US" dirty="0"/>
+              <a:t> and </a:t>
+            </a:r>
+            <a:r>
+              <a:rPr lang="en-US" dirty="0">
+                <a:latin typeface="Courier New" panose="02070309020205020404" pitchFamily="49" charset="0"/>
+                <a:cs typeface="Courier New" panose="02070309020205020404" pitchFamily="49" charset="0"/>
+              </a:rPr>
+              <a:t>&lt;servlet-class&gt; </a:t>
+            </a:r>
+            <a:r>
+              <a:rPr lang="en-US" dirty="0"/>
+              <a:t>elements</a:t>
+            </a:r>
+          </a:p>
+          <a:p>
+            <a:pPr lvl="1"/>
+            <a:r>
+              <a:rPr lang="en-US" dirty="0">
+                <a:latin typeface="Courier New" panose="02070309020205020404" pitchFamily="49" charset="0"/>
+                <a:cs typeface="Courier New" panose="02070309020205020404" pitchFamily="49" charset="0"/>
+              </a:rPr>
+              <a:t>&lt;servlet-name&gt; </a:t>
+            </a:r>
+            <a:r>
+              <a:rPr lang="en-US" dirty="0"/>
+              <a:t>: defines the name. </a:t>
+            </a:r>
+          </a:p>
+          <a:p>
+            <a:pPr lvl="2"/>
+            <a:r>
+              <a:rPr lang="en-US" dirty="0"/>
+              <a:t>The servlet name must be unique across the deployment descriptor.</a:t>
+            </a:r>
+          </a:p>
+          <a:p>
+            <a:pPr lvl="1"/>
+            <a:r>
+              <a:rPr lang="en-US" dirty="0">
+                <a:latin typeface="Courier New" panose="02070309020205020404" pitchFamily="49" charset="0"/>
+                <a:cs typeface="Courier New" panose="02070309020205020404" pitchFamily="49" charset="0"/>
+              </a:rPr>
+              <a:t>&lt;servlet-class&gt; </a:t>
+            </a:r>
+            <a:r>
+              <a:rPr lang="en-US" dirty="0">
+                <a:latin typeface="+mj-lt"/>
+                <a:cs typeface="Courier New" panose="02070309020205020404" pitchFamily="49" charset="0"/>
+              </a:rPr>
+              <a:t>:</a:t>
+            </a:r>
+            <a:r>
+              <a:rPr lang="en-US" dirty="0">
+                <a:latin typeface="Courier New" panose="02070309020205020404" pitchFamily="49" charset="0"/>
+                <a:cs typeface="Courier New" panose="02070309020205020404" pitchFamily="49" charset="0"/>
+              </a:rPr>
+              <a:t> </a:t>
+            </a:r>
+            <a:r>
+              <a:rPr lang="en-US" dirty="0">
+                <a:latin typeface="+mj-lt"/>
+                <a:cs typeface="Courier New" panose="02070309020205020404" pitchFamily="49" charset="0"/>
+              </a:rPr>
+              <a:t>T</a:t>
+            </a:r>
+            <a:r>
+              <a:rPr lang="en-US" dirty="0"/>
+              <a:t>he fully-qualified name for the class of the defined servlet.</a:t>
+            </a:r>
+          </a:p>
+          <a:p>
+            <a:r>
+              <a:rPr lang="en-US" dirty="0"/>
+              <a:t>Servlets are mapped to a URL or URL pattern using the </a:t>
+            </a:r>
+            <a:r>
+              <a:rPr lang="en-US" dirty="0">
+                <a:latin typeface="Courier New" panose="02070309020205020404" pitchFamily="49" charset="0"/>
+                <a:cs typeface="Courier New" panose="02070309020205020404" pitchFamily="49" charset="0"/>
+              </a:rPr>
+              <a:t>&lt;servlet-mapping&gt; </a:t>
+            </a:r>
+            <a:r>
+              <a:rPr lang="en-US" dirty="0"/>
+              <a:t>element.</a:t>
+            </a:r>
+          </a:p>
+          <a:p>
+            <a:pPr lvl="1"/>
+            <a:r>
+              <a:rPr lang="en-US" dirty="0"/>
+              <a:t>Servlet mappings should include a nested </a:t>
+            </a:r>
+            <a:r>
+              <a:rPr lang="en-US" dirty="0">
+                <a:latin typeface="Courier New" panose="02070309020205020404" pitchFamily="49" charset="0"/>
+                <a:cs typeface="Courier New" panose="02070309020205020404" pitchFamily="49" charset="0"/>
+              </a:rPr>
+              <a:t>&lt;servlet-name&gt; </a:t>
+            </a:r>
+            <a:r>
+              <a:rPr lang="en-US" dirty="0"/>
+              <a:t>and </a:t>
+            </a:r>
+            <a:r>
+              <a:rPr lang="en-US" dirty="0">
+                <a:latin typeface="Courier New" panose="02070309020205020404" pitchFamily="49" charset="0"/>
+                <a:cs typeface="Courier New" panose="02070309020205020404" pitchFamily="49" charset="0"/>
+              </a:rPr>
+              <a:t>&lt;</a:t>
+            </a:r>
+            <a:r>
+              <a:rPr lang="en-US" dirty="0" err="1">
+                <a:latin typeface="Courier New" panose="02070309020205020404" pitchFamily="49" charset="0"/>
+                <a:cs typeface="Courier New" panose="02070309020205020404" pitchFamily="49" charset="0"/>
+              </a:rPr>
+              <a:t>url</a:t>
+            </a:r>
+            <a:r>
+              <a:rPr lang="en-US" dirty="0">
+                <a:latin typeface="Courier New" panose="02070309020205020404" pitchFamily="49" charset="0"/>
+                <a:cs typeface="Courier New" panose="02070309020205020404" pitchFamily="49" charset="0"/>
+              </a:rPr>
+              <a:t>-pattern&gt; </a:t>
+            </a:r>
+            <a:r>
+              <a:rPr lang="en-US" dirty="0"/>
+              <a:t>elements:</a:t>
+            </a:r>
+          </a:p>
+          <a:p>
+            <a:pPr lvl="1"/>
+            <a:r>
+              <a:rPr lang="en-US" dirty="0">
+                <a:latin typeface="Courier New" panose="02070309020205020404" pitchFamily="49" charset="0"/>
+                <a:cs typeface="Courier New" panose="02070309020205020404" pitchFamily="49" charset="0"/>
+              </a:rPr>
+              <a:t>&lt;servlet-name&gt;</a:t>
+            </a:r>
+            <a:r>
+              <a:rPr lang="en-US" dirty="0">
+                <a:latin typeface="+mj-lt"/>
+                <a:cs typeface="Courier New" panose="02070309020205020404" pitchFamily="49" charset="0"/>
+              </a:rPr>
+              <a:t> :  </a:t>
+            </a:r>
+            <a:r>
+              <a:rPr lang="en-US" dirty="0"/>
+              <a:t>details the associated servlet used to handle requests</a:t>
+            </a:r>
+          </a:p>
+          <a:p>
+            <a:pPr lvl="1"/>
+            <a:r>
+              <a:rPr lang="en-US" dirty="0">
+                <a:latin typeface="Courier New" panose="02070309020205020404" pitchFamily="49" charset="0"/>
+                <a:cs typeface="Courier New" panose="02070309020205020404" pitchFamily="49" charset="0"/>
+              </a:rPr>
+              <a:t>&lt;</a:t>
+            </a:r>
+            <a:r>
+              <a:rPr lang="en-US" dirty="0" err="1">
+                <a:latin typeface="Courier New" panose="02070309020205020404" pitchFamily="49" charset="0"/>
+                <a:cs typeface="Courier New" panose="02070309020205020404" pitchFamily="49" charset="0"/>
+              </a:rPr>
+              <a:t>url</a:t>
+            </a:r>
+            <a:r>
+              <a:rPr lang="en-US" dirty="0">
+                <a:latin typeface="Courier New" panose="02070309020205020404" pitchFamily="49" charset="0"/>
+                <a:cs typeface="Courier New" panose="02070309020205020404" pitchFamily="49" charset="0"/>
+              </a:rPr>
+              <a:t>-pattern&gt; </a:t>
+            </a:r>
+            <a:r>
+              <a:rPr lang="en-US" dirty="0"/>
+              <a:t>: requests sent to this specified </a:t>
+            </a:r>
+            <a:r>
+              <a:rPr lang="en-US" dirty="0" err="1"/>
+              <a:t>url</a:t>
+            </a:r>
+            <a:r>
+              <a:rPr lang="en-US" dirty="0"/>
+              <a:t> will be handled by the associated named servlet.</a:t>
+            </a:r>
+          </a:p>
+          <a:p>
+            <a:pPr lvl="1"/>
+            <a:endParaRPr lang="en-US" dirty="0"/>
+          </a:p>
+        </p:txBody>
+      </p:sp>
+    </p:spTree>
+    <p:extLst>
+      <p:ext uri="{BB962C8B-B14F-4D97-AF65-F5344CB8AC3E}">
+        <p14:creationId xmlns:p14="http://schemas.microsoft.com/office/powerpoint/2010/main" val="2117209366"/>
       </p:ext>
     </p:extLst>
   </p:cSld>

</xml_diff>